<commit_message>
Updated video03 for Clinical Research Methods
</commit_message>
<xml_diff>
--- a/clinical-research-methodology/results/video03-literature-review.pptx
+++ b/clinical-research-methodology/results/video03-literature-review.pptx
@@ -5,7 +5,7 @@
     <p:sldMasterId id="2147483648" r:id="rId1"/>
   </p:sldMasterIdLst>
   <p:notesMasterIdLst>
-    <p:NotesMasterId r:id="rId23"/>
+    <p:NotesMasterId r:id="rId26"/>
   </p:notesMasterIdLst>
   <p:sldIdLst>
     <p:sldId id="256" r:id="rId2"/>
@@ -29,6 +29,9 @@
     <p:sldId id="274" r:id="rId20"/>
     <p:sldId id="275" r:id="rId21"/>
     <p:sldId id="276" r:id="rId22"/>
+    <p:sldId id="277" r:id="rId23"/>
+    <p:sldId id="278" r:id="rId24"/>
+    <p:sldId id="279" r:id="rId25"/>
   </p:sldIdLst>
   <p:sldSz cx="9144000" cy="6858000" type="screen4x3"/>
   <p:notesSz cx="6858000" cy="9144000"/>
@@ -1226,7 +1229,7 @@
           <a:p>
             <a:fld id="{18BDFEC3-8487-43E8-A154-7C12CBC1FFF2}" type="slidenum">
               <a:rPr lang="en-US"/>
-              <a:t>11</a:t>
+              <a:t>12</a:t>
             </a:fld>
             <a:endParaRPr lang="en-US"/>
           </a:p>
@@ -3740,7 +3743,7 @@
           <a:p>
             <a:fld id="{18BDFEC3-8487-43E8-A154-7C12CBC1FFF2}" type="slidenum">
               <a:rPr lang="en-US"/>
-              <a:t>12</a:t>
+              <a:t>13</a:t>
             </a:fld>
             <a:endParaRPr lang="en-US"/>
           </a:p>
@@ -3982,7 +3985,7 @@
           <a:p>
             <a:fld id="{18BDFEC3-8487-43E8-A154-7C12CBC1FFF2}" type="slidenum">
               <a:rPr lang="en-US"/>
-              <a:t>13</a:t>
+              <a:t>14</a:t>
             </a:fld>
             <a:endParaRPr lang="en-US"/>
           </a:p>
@@ -4470,7 +4473,7 @@
           <a:p>
             <a:fld id="{18BDFEC3-8487-43E8-A154-7C12CBC1FFF2}" type="slidenum">
               <a:rPr lang="en-US"/>
-              <a:t>14</a:t>
+              <a:t>15</a:t>
             </a:fld>
             <a:endParaRPr lang="en-US"/>
           </a:p>
@@ -7226,7 +7229,7 @@
           <a:p>
             <a:fld id="{18BDFEC3-8487-43E8-A154-7C12CBC1FFF2}" type="slidenum">
               <a:rPr lang="en-US"/>
-              <a:t>15</a:t>
+              <a:t>17</a:t>
             </a:fld>
             <a:endParaRPr lang="en-US"/>
           </a:p>
@@ -10064,7 +10067,7 @@
           <a:p>
             <a:fld id="{18BDFEC3-8487-43E8-A154-7C12CBC1FFF2}" type="slidenum">
               <a:rPr lang="en-US"/>
-              <a:t>16</a:t>
+              <a:t>18</a:t>
             </a:fld>
             <a:endParaRPr lang="en-US"/>
           </a:p>
@@ -11762,7 +11765,7 @@
           <a:p>
             <a:fld id="{18BDFEC3-8487-43E8-A154-7C12CBC1FFF2}" type="slidenum">
               <a:rPr lang="en-US"/>
-              <a:t>17</a:t>
+              <a:t>19</a:t>
             </a:fld>
             <a:endParaRPr lang="en-US"/>
           </a:p>
@@ -13102,7 +13105,7 @@
           <a:p>
             <a:fld id="{18BDFEC3-8487-43E8-A154-7C12CBC1FFF2}" type="slidenum">
               <a:rPr lang="en-US"/>
-              <a:t>18</a:t>
+              <a:t>21</a:t>
             </a:fld>
             <a:endParaRPr lang="en-US"/>
           </a:p>
@@ -14842,7 +14845,7 @@
           <a:p>
             <a:fld id="{18BDFEC3-8487-43E8-A154-7C12CBC1FFF2}" type="slidenum">
               <a:rPr lang="en-US"/>
-              <a:t>20</a:t>
+              <a:t>23</a:t>
             </a:fld>
             <a:endParaRPr lang="en-US"/>
           </a:p>
@@ -15554,7 +15557,7 @@
           <a:p>
             <a:fld id="{18BDFEC3-8487-43E8-A154-7C12CBC1FFF2}" type="slidenum">
               <a:rPr lang="en-US"/>
-              <a:t>21</a:t>
+              <a:t>24</a:t>
             </a:fld>
             <a:endParaRPr lang="en-US"/>
           </a:p>
@@ -26292,7 +26295,7 @@
           <a:p>
             <a:fld id="{18BDFEC3-8487-43E8-A154-7C12CBC1FFF2}" type="slidenum">
               <a:rPr lang="en-US"/>
-              <a:t>7</a:t>
+              <a:t>8</a:t>
             </a:fld>
             <a:endParaRPr lang="en-US"/>
           </a:p>
@@ -30520,7 +30523,7 @@
           <a:p>
             <a:fld id="{18BDFEC3-8487-43E8-A154-7C12CBC1FFF2}" type="slidenum">
               <a:rPr lang="en-US"/>
-              <a:t>8</a:t>
+              <a:t>9</a:t>
             </a:fld>
             <a:endParaRPr lang="en-US"/>
           </a:p>
@@ -31138,7 +31141,7 @@
           <a:p>
             <a:fld id="{18BDFEC3-8487-43E8-A154-7C12CBC1FFF2}" type="slidenum">
               <a:rPr lang="en-US"/>
-              <a:t>9</a:t>
+              <a:t>10</a:t>
             </a:fld>
             <a:endParaRPr lang="en-US"/>
           </a:p>
@@ -32530,7 +32533,7 @@
           <a:p>
             <a:fld id="{18BDFEC3-8487-43E8-A154-7C12CBC1FFF2}" type="slidenum">
               <a:rPr lang="en-US"/>
-              <a:t>10</a:t>
+              <a:t>11</a:t>
             </a:fld>
             <a:endParaRPr lang="en-US"/>
           </a:p>
@@ -35652,2174 +35655,6 @@
             </a:pPr>
             <a:r>
               <a:rPr/>
-              <a:t>Summarizing</a:t>
-            </a:r>
-          </a:p>
-        </p:txBody>
-      </p:sp>
-      <p:sp>
-        <p:nvSpPr>
-          <p:cNvPr id="3" name="Content Placeholder 2"/>
-          <p:cNvSpPr>
-            <a:spLocks noGrp="1"/>
-          </p:cNvSpPr>
-          <p:nvPr>
-            <p:ph idx="1"/>
-          </p:nvPr>
-        </p:nvSpPr>
-        <p:spPr/>
-        <p:txBody>
-          <a:bodyPr/>
-          <a:lstStyle/>
-          <a:p>
-            <a:pPr lvl="1"/>
-            <a:r>
-              <a:rPr/>
-              <a:t>No direct quotes.</a:t>
-            </a:r>
-          </a:p>
-          <a:p>
-            <a:pPr lvl="1"/>
-            <a:r>
-              <a:rPr/>
-              <a:t>Contextual clues</a:t>
-            </a:r>
-          </a:p>
-          <a:p>
-            <a:pPr lvl="2"/>
-            <a:r>
-              <a:rPr/>
-              <a:t>Also, in addition</a:t>
-            </a:r>
-          </a:p>
-          <a:p>
-            <a:pPr lvl="2"/>
-            <a:r>
-              <a:rPr/>
-              <a:t>In contrast, on the other hand</a:t>
-            </a:r>
-          </a:p>
-        </p:txBody>
-      </p:sp>
-    </p:spTree>
-  </p:cSld>
-</p:sld>
-</file>
-
-<file path=ppt/slides/slide11.xml><?xml version="1.0" encoding="utf-8"?>
-<p:sld xmlns:a="http://schemas.openxmlformats.org/drawingml/2006/main" xmlns:r="http://schemas.openxmlformats.org/officeDocument/2006/relationships" xmlns:p="http://schemas.openxmlformats.org/presentationml/2006/main">
-  <p:cSld>
-    <p:spTree>
-      <p:nvGrpSpPr>
-        <p:cNvPr id="1" name=""/>
-        <p:cNvGrpSpPr/>
-        <p:nvPr/>
-      </p:nvGrpSpPr>
-      <p:grpSpPr>
-        <a:xfrm>
-          <a:off x="0" y="0"/>
-          <a:ext cx="0" cy="0"/>
-          <a:chOff x="0" y="0"/>
-          <a:chExt cx="0" cy="0"/>
-        </a:xfrm>
-      </p:grpSpPr>
-      <p:sp>
-        <p:nvSpPr>
-          <p:cNvPr id="2" name="Title 1"/>
-          <p:cNvSpPr>
-            <a:spLocks noGrp="1"/>
-          </p:cNvSpPr>
-          <p:nvPr>
-            <p:ph type="title"/>
-          </p:nvPr>
-        </p:nvSpPr>
-        <p:spPr/>
-        <p:txBody>
-          <a:bodyPr/>
-          <a:lstStyle/>
-          <a:p>
-            <a:pPr lvl="0" marL="0" indent="0">
-              <a:buNone/>
-            </a:pPr>
-            <a:r>
-              <a:rPr/>
-              <a:t>Example</a:t>
-            </a:r>
-            <a:r>
-              <a:rPr/>
-              <a:t> </a:t>
-            </a:r>
-            <a:r>
-              <a:rPr/>
-              <a:t>of</a:t>
-            </a:r>
-            <a:r>
-              <a:rPr/>
-              <a:t> </a:t>
-            </a:r>
-            <a:r>
-              <a:rPr/>
-              <a:t>contextual</a:t>
-            </a:r>
-            <a:r>
-              <a:rPr/>
-              <a:t> </a:t>
-            </a:r>
-            <a:r>
-              <a:rPr/>
-              <a:t>words</a:t>
-            </a:r>
-          </a:p>
-        </p:txBody>
-      </p:sp>
-      <p:sp>
-        <p:nvSpPr>
-          <p:cNvPr id="3" name="Content Placeholder 2"/>
-          <p:cNvSpPr>
-            <a:spLocks noGrp="1"/>
-          </p:cNvSpPr>
-          <p:nvPr>
-            <p:ph idx="1"/>
-          </p:nvPr>
-        </p:nvSpPr>
-        <p:spPr/>
-        <p:txBody>
-          <a:bodyPr/>
-          <a:lstStyle/>
-          <a:p>
-            <a:pPr lvl="0" marL="0" indent="0">
-              <a:buNone/>
-            </a:pPr>
-            <a:r>
-              <a:rPr/>
-              <a:t>“Dosage compensation in mammalian females is a recognized phenomenon whereby inactivation of one X chromosome …[1]. </a:t>
-            </a:r>
-            <a:r>
-              <a:rPr b="1"/>
-              <a:t>However,</a:t>
-            </a:r>
-            <a:r>
-              <a:rPr/>
-              <a:t> not all X-linked genes are inactivated. Recently, an inactivation profile…was reported by Carrel and Willard [2]. … </a:t>
-            </a:r>
-            <a:r>
-              <a:rPr b="1"/>
-              <a:t>Subsequently</a:t>
-            </a:r>
-            <a:r>
-              <a:rPr/>
-              <a:t>, Lyon [3] … enhanced our knowledge about X-chromosome inactivation…”</a:t>
-            </a:r>
-          </a:p>
-          <a:p>
-            <a:pPr lvl="1"/>
-            <a:r>
-              <a:rPr/>
-              <a:t>Talebizadeh et al. X chromosome gene expression in human tissues: Male and female comparisons. Genomics 2006.</a:t>
-            </a:r>
-          </a:p>
-        </p:txBody>
-      </p:sp>
-    </p:spTree>
-  </p:cSld>
-</p:sld>
-</file>
-
-<file path=ppt/slides/slide12.xml><?xml version="1.0" encoding="utf-8"?>
-<p:sld xmlns:a="http://schemas.openxmlformats.org/drawingml/2006/main" xmlns:r="http://schemas.openxmlformats.org/officeDocument/2006/relationships" xmlns:p="http://schemas.openxmlformats.org/presentationml/2006/main">
-  <p:cSld>
-    <p:spTree>
-      <p:nvGrpSpPr>
-        <p:cNvPr id="1" name=""/>
-        <p:cNvGrpSpPr/>
-        <p:nvPr/>
-      </p:nvGrpSpPr>
-      <p:grpSpPr>
-        <a:xfrm>
-          <a:off x="0" y="0"/>
-          <a:ext cx="0" cy="0"/>
-          <a:chOff x="0" y="0"/>
-          <a:chExt cx="0" cy="0"/>
-        </a:xfrm>
-      </p:grpSpPr>
-      <p:sp>
-        <p:nvSpPr>
-          <p:cNvPr id="2" name="Title 1"/>
-          <p:cNvSpPr>
-            <a:spLocks noGrp="1"/>
-          </p:cNvSpPr>
-          <p:nvPr>
-            <p:ph type="title"/>
-          </p:nvPr>
-        </p:nvSpPr>
-        <p:spPr/>
-        <p:txBody>
-          <a:bodyPr/>
-          <a:lstStyle/>
-          <a:p>
-            <a:pPr lvl="0" marL="0" indent="0">
-              <a:buNone/>
-            </a:pPr>
-            <a:r>
-              <a:rPr/>
-              <a:t>Analyzing</a:t>
-            </a:r>
-          </a:p>
-        </p:txBody>
-      </p:sp>
-      <p:sp>
-        <p:nvSpPr>
-          <p:cNvPr id="3" name="Content Placeholder 2"/>
-          <p:cNvSpPr>
-            <a:spLocks noGrp="1"/>
-          </p:cNvSpPr>
-          <p:nvPr>
-            <p:ph idx="1"/>
-          </p:nvPr>
-        </p:nvSpPr>
-        <p:spPr/>
-        <p:txBody>
-          <a:bodyPr/>
-          <a:lstStyle/>
-          <a:p>
-            <a:pPr lvl="1"/>
-            <a:r>
-              <a:rPr/>
-              <a:t>More than just the abstract</a:t>
-            </a:r>
-          </a:p>
-          <a:p>
-            <a:pPr lvl="2"/>
-            <a:r>
-              <a:rPr/>
-              <a:t>Inconsistencies with main text</a:t>
-            </a:r>
-          </a:p>
-          <a:p>
-            <a:pPr lvl="2"/>
-            <a:r>
-              <a:rPr/>
-              <a:t>Misplaced emphasis in abstract</a:t>
-            </a:r>
-          </a:p>
-          <a:p>
-            <a:pPr lvl="1"/>
-            <a:r>
-              <a:rPr/>
-              <a:t>Research types</a:t>
-            </a:r>
-          </a:p>
-          <a:p>
-            <a:pPr lvl="2"/>
-            <a:r>
-              <a:rPr/>
-              <a:t>Comparative</a:t>
-            </a:r>
-          </a:p>
-          <a:p>
-            <a:pPr lvl="2"/>
-            <a:r>
-              <a:rPr/>
-              <a:t>Associational</a:t>
-            </a:r>
-          </a:p>
-          <a:p>
-            <a:pPr lvl="2"/>
-            <a:r>
-              <a:rPr/>
-              <a:t>Descriptive (Estimate, Identify)</a:t>
-            </a:r>
-          </a:p>
-          <a:p>
-            <a:pPr lvl="1"/>
-            <a:r>
-              <a:rPr/>
-              <a:t>Put in some passion</a:t>
-            </a:r>
-          </a:p>
-        </p:txBody>
-      </p:sp>
-    </p:spTree>
-  </p:cSld>
-</p:sld>
-</file>
-
-<file path=ppt/slides/slide13.xml><?xml version="1.0" encoding="utf-8"?>
-<p:sld xmlns:a="http://schemas.openxmlformats.org/drawingml/2006/main" xmlns:r="http://schemas.openxmlformats.org/officeDocument/2006/relationships" xmlns:p="http://schemas.openxmlformats.org/presentationml/2006/main">
-  <p:cSld>
-    <p:spTree>
-      <p:nvGrpSpPr>
-        <p:cNvPr id="1" name=""/>
-        <p:cNvGrpSpPr/>
-        <p:nvPr/>
-      </p:nvGrpSpPr>
-      <p:grpSpPr>
-        <a:xfrm>
-          <a:off x="0" y="0"/>
-          <a:ext cx="0" cy="0"/>
-          <a:chOff x="0" y="0"/>
-          <a:chExt cx="0" cy="0"/>
-        </a:xfrm>
-      </p:grpSpPr>
-      <p:sp>
-        <p:nvSpPr>
-          <p:cNvPr id="2" name="Title 1"/>
-          <p:cNvSpPr>
-            <a:spLocks noGrp="1"/>
-          </p:cNvSpPr>
-          <p:nvPr>
-            <p:ph type="title"/>
-          </p:nvPr>
-        </p:nvSpPr>
-        <p:spPr/>
-        <p:txBody>
-          <a:bodyPr/>
-          <a:lstStyle/>
-          <a:p>
-            <a:pPr lvl="0" marL="0" indent="0">
-              <a:buNone/>
-            </a:pPr>
-            <a:r>
-              <a:rPr/>
-              <a:t>Example</a:t>
-            </a:r>
-            <a:r>
-              <a:rPr/>
-              <a:t> </a:t>
-            </a:r>
-            <a:r>
-              <a:rPr/>
-              <a:t>of</a:t>
-            </a:r>
-            <a:r>
-              <a:rPr/>
-              <a:t> </a:t>
-            </a:r>
-            <a:r>
-              <a:rPr/>
-              <a:t>descriptive</a:t>
-            </a:r>
-            <a:r>
-              <a:rPr/>
-              <a:t> </a:t>
-            </a:r>
-            <a:r>
-              <a:rPr/>
-              <a:t>and</a:t>
-            </a:r>
-            <a:r>
-              <a:rPr/>
-              <a:t> </a:t>
-            </a:r>
-            <a:r>
-              <a:rPr/>
-              <a:t>comparative</a:t>
-            </a:r>
-            <a:r>
-              <a:rPr/>
-              <a:t> </a:t>
-            </a:r>
-            <a:r>
-              <a:rPr/>
-              <a:t>analysis</a:t>
-            </a:r>
-          </a:p>
-        </p:txBody>
-      </p:sp>
-      <p:sp>
-        <p:nvSpPr>
-          <p:cNvPr id="3" name="Content Placeholder 2"/>
-          <p:cNvSpPr>
-            <a:spLocks noGrp="1"/>
-          </p:cNvSpPr>
-          <p:nvPr>
-            <p:ph idx="1"/>
-          </p:nvPr>
-        </p:nvSpPr>
-        <p:spPr/>
-        <p:txBody>
-          <a:bodyPr/>
-          <a:lstStyle/>
-          <a:p>
-            <a:pPr lvl="0" marL="0" indent="0">
-              <a:buNone/>
-            </a:pPr>
-            <a:r>
-              <a:rPr/>
-              <a:t>“African Americans represent nearly 45% of new HIV cases each year (1–2). Due to delayed HIV diagnosis, African Americans tend to enter HIV treatment at advanced stages and die from AIDS sooner than Whites (1).”</a:t>
-            </a:r>
-          </a:p>
-          <a:p>
-            <a:pPr lvl="1"/>
-            <a:r>
-              <a:rPr/>
-              <a:t>Berkley-Patton et al. An HIV Testing Intervention in African American Churches: Pilot Study Findings. Ann Behav Med. 2016.</a:t>
-            </a:r>
-          </a:p>
-        </p:txBody>
-      </p:sp>
-    </p:spTree>
-  </p:cSld>
-</p:sld>
-</file>
-
-<file path=ppt/slides/slide14.xml><?xml version="1.0" encoding="utf-8"?>
-<p:sld xmlns:a="http://schemas.openxmlformats.org/drawingml/2006/main" xmlns:r="http://schemas.openxmlformats.org/officeDocument/2006/relationships" xmlns:p="http://schemas.openxmlformats.org/presentationml/2006/main">
-  <p:cSld>
-    <p:spTree>
-      <p:nvGrpSpPr>
-        <p:cNvPr id="1" name=""/>
-        <p:cNvGrpSpPr/>
-        <p:nvPr/>
-      </p:nvGrpSpPr>
-      <p:grpSpPr>
-        <a:xfrm>
-          <a:off x="0" y="0"/>
-          <a:ext cx="0" cy="0"/>
-          <a:chOff x="0" y="0"/>
-          <a:chExt cx="0" cy="0"/>
-        </a:xfrm>
-      </p:grpSpPr>
-      <p:sp>
-        <p:nvSpPr>
-          <p:cNvPr id="2" name="Title 1"/>
-          <p:cNvSpPr>
-            <a:spLocks noGrp="1"/>
-          </p:cNvSpPr>
-          <p:nvPr>
-            <p:ph type="title"/>
-          </p:nvPr>
-        </p:nvSpPr>
-        <p:spPr/>
-        <p:txBody>
-          <a:bodyPr/>
-          <a:lstStyle/>
-          <a:p>
-            <a:pPr lvl="0" marL="0" indent="0">
-              <a:buNone/>
-            </a:pPr>
-            <a:r>
-              <a:rPr/>
-              <a:t>Example</a:t>
-            </a:r>
-            <a:r>
-              <a:rPr/>
-              <a:t> </a:t>
-            </a:r>
-            <a:r>
-              <a:rPr/>
-              <a:t>of</a:t>
-            </a:r>
-            <a:r>
-              <a:rPr/>
-              <a:t> </a:t>
-            </a:r>
-            <a:r>
-              <a:rPr/>
-              <a:t>descriptive</a:t>
-            </a:r>
-            <a:r>
-              <a:rPr/>
-              <a:t> </a:t>
-            </a:r>
-            <a:r>
-              <a:rPr/>
-              <a:t>analysis</a:t>
-            </a:r>
-          </a:p>
-        </p:txBody>
-      </p:sp>
-      <p:sp>
-        <p:nvSpPr>
-          <p:cNvPr id="3" name="Content Placeholder 2"/>
-          <p:cNvSpPr>
-            <a:spLocks noGrp="1"/>
-          </p:cNvSpPr>
-          <p:nvPr>
-            <p:ph idx="1"/>
-          </p:nvPr>
-        </p:nvSpPr>
-        <p:spPr/>
-        <p:txBody>
-          <a:bodyPr/>
-          <a:lstStyle/>
-          <a:p>
-            <a:pPr lvl="0" marL="0" indent="0">
-              <a:buNone/>
-            </a:pPr>
-            <a:r>
-              <a:rPr/>
-              <a:t>“Studies suggest many African American faith leaders are willing to provide HIV education …(14–17); however, their reported challenges in doing so have included church capacity issues (e.g., lack of HIV training, church-appropriate HIV materials, time, and resources), controversial church issues (e.g., condom use, premarital sex, homophobia), and HIV stigma (18–22).”</a:t>
-            </a:r>
-          </a:p>
-          <a:p>
-            <a:pPr lvl="1"/>
-            <a:r>
-              <a:rPr/>
-              <a:t>Berkley-Patton et al 2016.</a:t>
-            </a:r>
-          </a:p>
-        </p:txBody>
-      </p:sp>
-    </p:spTree>
-  </p:cSld>
-</p:sld>
-</file>
-
-<file path=ppt/slides/slide15.xml><?xml version="1.0" encoding="utf-8"?>
-<p:sld xmlns:a="http://schemas.openxmlformats.org/drawingml/2006/main" xmlns:r="http://schemas.openxmlformats.org/officeDocument/2006/relationships" xmlns:p="http://schemas.openxmlformats.org/presentationml/2006/main">
-  <p:cSld>
-    <p:spTree>
-      <p:nvGrpSpPr>
-        <p:cNvPr id="1" name=""/>
-        <p:cNvGrpSpPr/>
-        <p:nvPr/>
-      </p:nvGrpSpPr>
-      <p:grpSpPr>
-        <a:xfrm>
-          <a:off x="0" y="0"/>
-          <a:ext cx="0" cy="0"/>
-          <a:chOff x="0" y="0"/>
-          <a:chExt cx="0" cy="0"/>
-        </a:xfrm>
-      </p:grpSpPr>
-      <p:sp>
-        <p:nvSpPr>
-          <p:cNvPr id="2" name="Title 1"/>
-          <p:cNvSpPr>
-            <a:spLocks noGrp="1"/>
-          </p:cNvSpPr>
-          <p:nvPr>
-            <p:ph type="title"/>
-          </p:nvPr>
-        </p:nvSpPr>
-        <p:spPr/>
-        <p:txBody>
-          <a:bodyPr/>
-          <a:lstStyle/>
-          <a:p>
-            <a:pPr lvl="0" marL="0" indent="0">
-              <a:buNone/>
-            </a:pPr>
-            <a:r>
-              <a:rPr/>
-              <a:t>Evaluating</a:t>
-            </a:r>
-          </a:p>
-        </p:txBody>
-      </p:sp>
-      <p:sp>
-        <p:nvSpPr>
-          <p:cNvPr id="3" name="Content Placeholder 2"/>
-          <p:cNvSpPr>
-            <a:spLocks noGrp="1"/>
-          </p:cNvSpPr>
-          <p:nvPr>
-            <p:ph idx="1"/>
-          </p:nvPr>
-        </p:nvSpPr>
-        <p:spPr/>
-        <p:txBody>
-          <a:bodyPr/>
-          <a:lstStyle/>
-          <a:p>
-            <a:pPr lvl="1"/>
-            <a:r>
-              <a:rPr/>
-              <a:t>No “bad” or “good” studies</a:t>
-            </a:r>
-          </a:p>
-          <a:p>
-            <a:pPr lvl="2"/>
-            <a:r>
-              <a:rPr/>
-              <a:t>Degrees of evidence</a:t>
-            </a:r>
-          </a:p>
-          <a:p>
-            <a:pPr lvl="2"/>
-            <a:r>
-              <a:rPr/>
-              <a:t>Weak studies better than no studies</a:t>
-            </a:r>
-          </a:p>
-          <a:p>
-            <a:pPr lvl="1"/>
-            <a:r>
-              <a:rPr/>
-              <a:t>Questions you can ask</a:t>
-            </a:r>
-          </a:p>
-          <a:p>
-            <a:pPr lvl="2"/>
-            <a:r>
-              <a:rPr/>
-              <a:t>Do the results support the conclusion?</a:t>
-            </a:r>
-          </a:p>
-          <a:p>
-            <a:pPr lvl="2"/>
-            <a:r>
-              <a:rPr/>
-              <a:t>What are the stated limitations?</a:t>
-            </a:r>
-          </a:p>
-          <a:p>
-            <a:pPr lvl="2"/>
-            <a:r>
-              <a:rPr/>
-              <a:t>Can you place this article in “the bigger picture”?</a:t>
-            </a:r>
-          </a:p>
-        </p:txBody>
-      </p:sp>
-    </p:spTree>
-  </p:cSld>
-</p:sld>
-</file>
-
-<file path=ppt/slides/slide16.xml><?xml version="1.0" encoding="utf-8"?>
-<p:sld xmlns:a="http://schemas.openxmlformats.org/drawingml/2006/main" xmlns:r="http://schemas.openxmlformats.org/officeDocument/2006/relationships" xmlns:p="http://schemas.openxmlformats.org/presentationml/2006/main">
-  <p:cSld>
-    <p:spTree>
-      <p:nvGrpSpPr>
-        <p:cNvPr id="1" name=""/>
-        <p:cNvGrpSpPr/>
-        <p:nvPr/>
-      </p:nvGrpSpPr>
-      <p:grpSpPr>
-        <a:xfrm>
-          <a:off x="0" y="0"/>
-          <a:ext cx="0" cy="0"/>
-          <a:chOff x="0" y="0"/>
-          <a:chExt cx="0" cy="0"/>
-        </a:xfrm>
-      </p:grpSpPr>
-      <p:sp>
-        <p:nvSpPr>
-          <p:cNvPr id="2" name="Title 1"/>
-          <p:cNvSpPr>
-            <a:spLocks noGrp="1"/>
-          </p:cNvSpPr>
-          <p:nvPr>
-            <p:ph type="title"/>
-          </p:nvPr>
-        </p:nvSpPr>
-        <p:spPr/>
-        <p:txBody>
-          <a:bodyPr/>
-          <a:lstStyle/>
-          <a:p>
-            <a:pPr lvl="0" marL="0" indent="0">
-              <a:buNone/>
-            </a:pPr>
-            <a:r>
-              <a:rPr/>
-              <a:t>Evaluating</a:t>
-            </a:r>
-          </a:p>
-        </p:txBody>
-      </p:sp>
-      <p:sp>
-        <p:nvSpPr>
-          <p:cNvPr id="3" name="Content Placeholder 2"/>
-          <p:cNvSpPr>
-            <a:spLocks noGrp="1"/>
-          </p:cNvSpPr>
-          <p:nvPr>
-            <p:ph idx="1"/>
-          </p:nvPr>
-        </p:nvSpPr>
-        <p:spPr/>
-        <p:txBody>
-          <a:bodyPr/>
-          <a:lstStyle/>
-          <a:p>
-            <a:pPr lvl="1"/>
-            <a:r>
-              <a:rPr/>
-              <a:t>Positive features</a:t>
-            </a:r>
-          </a:p>
-          <a:p>
-            <a:pPr lvl="2"/>
-            <a:r>
-              <a:rPr/>
-              <a:t>Randomization</a:t>
-            </a:r>
-          </a:p>
-          <a:p>
-            <a:pPr lvl="2"/>
-            <a:r>
-              <a:rPr/>
-              <a:t>Blinding</a:t>
-            </a:r>
-          </a:p>
-          <a:p>
-            <a:pPr lvl="2"/>
-            <a:r>
-              <a:rPr/>
-              <a:t>Strong effect</a:t>
-            </a:r>
-          </a:p>
-          <a:p>
-            <a:pPr lvl="2"/>
-            <a:r>
-              <a:rPr/>
-              <a:t>Plausible mechanism</a:t>
-            </a:r>
-          </a:p>
-        </p:txBody>
-      </p:sp>
-    </p:spTree>
-  </p:cSld>
-</p:sld>
-</file>
-
-<file path=ppt/slides/slide17.xml><?xml version="1.0" encoding="utf-8"?>
-<p:sld xmlns:a="http://schemas.openxmlformats.org/drawingml/2006/main" xmlns:r="http://schemas.openxmlformats.org/officeDocument/2006/relationships" xmlns:p="http://schemas.openxmlformats.org/presentationml/2006/main">
-  <p:cSld>
-    <p:spTree>
-      <p:nvGrpSpPr>
-        <p:cNvPr id="1" name=""/>
-        <p:cNvGrpSpPr/>
-        <p:nvPr/>
-      </p:nvGrpSpPr>
-      <p:grpSpPr>
-        <a:xfrm>
-          <a:off x="0" y="0"/>
-          <a:ext cx="0" cy="0"/>
-          <a:chOff x="0" y="0"/>
-          <a:chExt cx="0" cy="0"/>
-        </a:xfrm>
-      </p:grpSpPr>
-      <p:sp>
-        <p:nvSpPr>
-          <p:cNvPr id="2" name="Title 1"/>
-          <p:cNvSpPr>
-            <a:spLocks noGrp="1"/>
-          </p:cNvSpPr>
-          <p:nvPr>
-            <p:ph type="title"/>
-          </p:nvPr>
-        </p:nvSpPr>
-        <p:spPr/>
-        <p:txBody>
-          <a:bodyPr/>
-          <a:lstStyle/>
-          <a:p>
-            <a:pPr lvl="0" marL="0" indent="0">
-              <a:buNone/>
-            </a:pPr>
-            <a:r>
-              <a:rPr/>
-              <a:t>Evaluating</a:t>
-            </a:r>
-          </a:p>
-        </p:txBody>
-      </p:sp>
-      <p:sp>
-        <p:nvSpPr>
-          <p:cNvPr id="3" name="Content Placeholder 2"/>
-          <p:cNvSpPr>
-            <a:spLocks noGrp="1"/>
-          </p:cNvSpPr>
-          <p:nvPr>
-            <p:ph idx="1"/>
-          </p:nvPr>
-        </p:nvSpPr>
-        <p:spPr/>
-        <p:txBody>
-          <a:bodyPr/>
-          <a:lstStyle/>
-          <a:p>
-            <a:pPr lvl="1"/>
-            <a:r>
-              <a:rPr/>
-              <a:t>Negative features</a:t>
-            </a:r>
-          </a:p>
-          <a:p>
-            <a:pPr lvl="2"/>
-            <a:r>
-              <a:rPr/>
-              <a:t>Post hoc changes</a:t>
-            </a:r>
-          </a:p>
-          <a:p>
-            <a:pPr lvl="2"/>
-            <a:r>
-              <a:rPr/>
-              <a:t>High dropout rate</a:t>
-            </a:r>
-          </a:p>
-          <a:p>
-            <a:pPr lvl="2"/>
-            <a:r>
-              <a:rPr/>
-              <a:t>Poor compliance</a:t>
-            </a:r>
-          </a:p>
-          <a:p>
-            <a:pPr lvl="1"/>
-            <a:r>
-              <a:rPr/>
-              <a:t>Things not to fuss over</a:t>
-            </a:r>
-          </a:p>
-          <a:p>
-            <a:pPr lvl="2"/>
-            <a:r>
-              <a:rPr/>
-              <a:t>Quality of the journal</a:t>
-            </a:r>
-          </a:p>
-          <a:p>
-            <a:pPr lvl="2"/>
-            <a:r>
-              <a:rPr/>
-              <a:t>Intention to treat analysis</a:t>
-            </a:r>
-          </a:p>
-        </p:txBody>
-      </p:sp>
-    </p:spTree>
-  </p:cSld>
-</p:sld>
-</file>
-
-<file path=ppt/slides/slide18.xml><?xml version="1.0" encoding="utf-8"?>
-<p:sld xmlns:a="http://schemas.openxmlformats.org/drawingml/2006/main" xmlns:r="http://schemas.openxmlformats.org/officeDocument/2006/relationships" xmlns:p="http://schemas.openxmlformats.org/presentationml/2006/main">
-  <p:cSld>
-    <p:spTree>
-      <p:nvGrpSpPr>
-        <p:cNvPr id="1" name=""/>
-        <p:cNvGrpSpPr/>
-        <p:nvPr/>
-      </p:nvGrpSpPr>
-      <p:grpSpPr>
-        <a:xfrm>
-          <a:off x="0" y="0"/>
-          <a:ext cx="0" cy="0"/>
-          <a:chOff x="0" y="0"/>
-          <a:chExt cx="0" cy="0"/>
-        </a:xfrm>
-      </p:grpSpPr>
-      <p:sp>
-        <p:nvSpPr>
-          <p:cNvPr id="2" name="Title 1"/>
-          <p:cNvSpPr>
-            <a:spLocks noGrp="1"/>
-          </p:cNvSpPr>
-          <p:nvPr>
-            <p:ph type="title"/>
-          </p:nvPr>
-        </p:nvSpPr>
-        <p:spPr/>
-        <p:txBody>
-          <a:bodyPr/>
-          <a:lstStyle/>
-          <a:p>
-            <a:pPr lvl="0" marL="0" indent="0">
-              <a:buNone/>
-            </a:pPr>
-            <a:r>
-              <a:rPr/>
-              <a:t>Synthesizing</a:t>
-            </a:r>
-          </a:p>
-        </p:txBody>
-      </p:sp>
-      <p:sp>
-        <p:nvSpPr>
-          <p:cNvPr id="3" name="Content Placeholder 2"/>
-          <p:cNvSpPr>
-            <a:spLocks noGrp="1"/>
-          </p:cNvSpPr>
-          <p:nvPr>
-            <p:ph idx="1"/>
-          </p:nvPr>
-        </p:nvSpPr>
-        <p:spPr/>
-        <p:txBody>
-          <a:bodyPr/>
-          <a:lstStyle/>
-          <a:p>
-            <a:pPr lvl="1"/>
-            <a:r>
-              <a:rPr/>
-              <a:t>Organization of a literature review</a:t>
-            </a:r>
-          </a:p>
-          <a:p>
-            <a:pPr lvl="2"/>
-            <a:r>
-              <a:rPr/>
-              <a:t>Chronologic (warning: can be boring!)</a:t>
-            </a:r>
-          </a:p>
-          <a:p>
-            <a:pPr lvl="2"/>
-            <a:r>
-              <a:rPr/>
-              <a:t>From general to specific</a:t>
-            </a:r>
-          </a:p>
-          <a:p>
-            <a:pPr lvl="2"/>
-            <a:r>
-              <a:rPr/>
-              <a:t>Thematic</a:t>
-            </a:r>
-          </a:p>
-          <a:p>
-            <a:pPr lvl="1"/>
-            <a:r>
-              <a:rPr/>
-              <a:t>End with your research</a:t>
-            </a:r>
-          </a:p>
-        </p:txBody>
-      </p:sp>
-    </p:spTree>
-  </p:cSld>
-</p:sld>
-</file>
-
-<file path=ppt/slides/slide19.xml><?xml version="1.0" encoding="utf-8"?>
-<p:sld xmlns:a="http://schemas.openxmlformats.org/drawingml/2006/main" xmlns:r="http://schemas.openxmlformats.org/officeDocument/2006/relationships" xmlns:p="http://schemas.openxmlformats.org/presentationml/2006/main">
-  <p:cSld>
-    <p:spTree>
-      <p:nvGrpSpPr>
-        <p:cNvPr id="1" name=""/>
-        <p:cNvGrpSpPr/>
-        <p:nvPr/>
-      </p:nvGrpSpPr>
-      <p:grpSpPr>
-        <a:xfrm>
-          <a:off x="0" y="0"/>
-          <a:ext cx="0" cy="0"/>
-          <a:chOff x="0" y="0"/>
-          <a:chExt cx="0" cy="0"/>
-        </a:xfrm>
-      </p:grpSpPr>
-      <p:sp>
-        <p:nvSpPr>
-          <p:cNvPr id="2" name="Title 1"/>
-          <p:cNvSpPr>
-            <a:spLocks noGrp="1"/>
-          </p:cNvSpPr>
-          <p:nvPr>
-            <p:ph type="title"/>
-          </p:nvPr>
-        </p:nvSpPr>
-        <p:spPr/>
-        <p:txBody>
-          <a:bodyPr/>
-          <a:lstStyle/>
-          <a:p>
-            <a:pPr lvl="0" marL="0" indent="0">
-              <a:buNone/>
-            </a:pPr>
-            <a:r>
-              <a:rPr/>
-              <a:t>Example</a:t>
-            </a:r>
-            <a:r>
-              <a:rPr/>
-              <a:t> </a:t>
-            </a:r>
-            <a:r>
-              <a:rPr/>
-              <a:t>of</a:t>
-            </a:r>
-            <a:r>
-              <a:rPr/>
-              <a:t> </a:t>
-            </a:r>
-            <a:r>
-              <a:rPr/>
-              <a:t>general</a:t>
-            </a:r>
-            <a:r>
-              <a:rPr/>
-              <a:t> </a:t>
-            </a:r>
-            <a:r>
-              <a:rPr/>
-              <a:t>to</a:t>
-            </a:r>
-            <a:r>
-              <a:rPr/>
-              <a:t> </a:t>
-            </a:r>
-            <a:r>
-              <a:rPr/>
-              <a:t>specific</a:t>
-            </a:r>
-          </a:p>
-        </p:txBody>
-      </p:sp>
-      <p:sp>
-        <p:nvSpPr>
-          <p:cNvPr id="3" name="Content Placeholder 2"/>
-          <p:cNvSpPr>
-            <a:spLocks noGrp="1"/>
-          </p:cNvSpPr>
-          <p:nvPr>
-            <p:ph idx="1"/>
-          </p:nvPr>
-        </p:nvSpPr>
-        <p:spPr/>
-        <p:txBody>
-          <a:bodyPr/>
-          <a:lstStyle/>
-          <a:p>
-            <a:pPr lvl="0" marL="0" indent="0">
-              <a:buNone/>
-            </a:pPr>
-            <a:r>
-              <a:rPr/>
-              <a:t>1st paragraph. “African Americans represent nearly 45% of new HIV cases each year (1–2).”</a:t>
-            </a:r>
-          </a:p>
-          <a:p>
-            <a:pPr lvl="0" marL="0" indent="0">
-              <a:buNone/>
-            </a:pPr>
-            <a:r>
-              <a:rPr/>
-              <a:t>2nd paragraph. “The Black Church is a powerful institution with a history of mobilizing African American communities for social change (5)…”</a:t>
-            </a:r>
-          </a:p>
-          <a:p>
-            <a:pPr lvl="0" marL="0" indent="0">
-              <a:buNone/>
-            </a:pPr>
-            <a:r>
-              <a:rPr/>
-              <a:t>3rd paragraph. “Studies suggest many African American faith leaders are willing to provide HIV education and testing for their church/community members (14–17)…”</a:t>
-            </a:r>
-          </a:p>
-          <a:p>
-            <a:pPr lvl="1"/>
-            <a:r>
-              <a:rPr/>
-              <a:t>Berkley-Patton et al 2016.</a:t>
-            </a:r>
-          </a:p>
-        </p:txBody>
-      </p:sp>
-    </p:spTree>
-  </p:cSld>
-</p:sld>
-</file>
-
-<file path=ppt/slides/slide2.xml><?xml version="1.0" encoding="utf-8"?>
-<p:sld xmlns:a="http://schemas.openxmlformats.org/drawingml/2006/main" xmlns:r="http://schemas.openxmlformats.org/officeDocument/2006/relationships" xmlns:p="http://schemas.openxmlformats.org/presentationml/2006/main">
-  <p:cSld>
-    <p:spTree>
-      <p:nvGrpSpPr>
-        <p:cNvPr id="1" name=""/>
-        <p:cNvGrpSpPr/>
-        <p:nvPr/>
-      </p:nvGrpSpPr>
-      <p:grpSpPr>
-        <a:xfrm>
-          <a:off x="0" y="0"/>
-          <a:ext cx="0" cy="0"/>
-          <a:chOff x="0" y="0"/>
-          <a:chExt cx="0" cy="0"/>
-        </a:xfrm>
-      </p:grpSpPr>
-      <p:sp>
-        <p:nvSpPr>
-          <p:cNvPr id="2" name="Title 1"/>
-          <p:cNvSpPr>
-            <a:spLocks noGrp="1"/>
-          </p:cNvSpPr>
-          <p:nvPr>
-            <p:ph type="title"/>
-          </p:nvPr>
-        </p:nvSpPr>
-        <p:spPr/>
-        <p:txBody>
-          <a:bodyPr/>
-          <a:lstStyle/>
-          <a:p>
-            <a:pPr lvl="0" marL="0" indent="0">
-              <a:buNone/>
-            </a:pPr>
-            <a:r>
-              <a:rPr/>
-              <a:t>Learning</a:t>
-            </a:r>
-            <a:r>
-              <a:rPr/>
-              <a:t> </a:t>
-            </a:r>
-            <a:r>
-              <a:rPr/>
-              <a:t>objectives</a:t>
-            </a:r>
-          </a:p>
-        </p:txBody>
-      </p:sp>
-      <p:sp>
-        <p:nvSpPr>
-          <p:cNvPr id="3" name="Content Placeholder 2"/>
-          <p:cNvSpPr>
-            <a:spLocks noGrp="1"/>
-          </p:cNvSpPr>
-          <p:nvPr>
-            <p:ph idx="1"/>
-          </p:nvPr>
-        </p:nvSpPr>
-        <p:spPr/>
-        <p:txBody>
-          <a:bodyPr/>
-          <a:lstStyle/>
-          <a:p>
-            <a:pPr lvl="1">
-              <a:buAutoNum type="arabicPeriod"/>
-            </a:pPr>
-            <a:r>
-              <a:rPr/>
-              <a:t>To define what a literature review is and to contrast it with an annotated bibliography and a systematic overview.</a:t>
-            </a:r>
-          </a:p>
-          <a:p>
-            <a:pPr lvl="1">
-              <a:buAutoNum type="arabicPeriod"/>
-            </a:pPr>
-            <a:r>
-              <a:rPr/>
-              <a:t>To recognize the different approaches to organizing a literature review.</a:t>
-            </a:r>
-          </a:p>
-        </p:txBody>
-      </p:sp>
-    </p:spTree>
-  </p:cSld>
-</p:sld>
-</file>
-
-<file path=ppt/slides/slide20.xml><?xml version="1.0" encoding="utf-8"?>
-<p:sld xmlns:a="http://schemas.openxmlformats.org/drawingml/2006/main" xmlns:r="http://schemas.openxmlformats.org/officeDocument/2006/relationships" xmlns:p="http://schemas.openxmlformats.org/presentationml/2006/main">
-  <p:cSld>
-    <p:spTree>
-      <p:nvGrpSpPr>
-        <p:cNvPr id="1" name=""/>
-        <p:cNvGrpSpPr/>
-        <p:nvPr/>
-      </p:nvGrpSpPr>
-      <p:grpSpPr>
-        <a:xfrm>
-          <a:off x="0" y="0"/>
-          <a:ext cx="0" cy="0"/>
-          <a:chOff x="0" y="0"/>
-          <a:chExt cx="0" cy="0"/>
-        </a:xfrm>
-      </p:grpSpPr>
-      <p:sp>
-        <p:nvSpPr>
-          <p:cNvPr id="2" name="Title 1"/>
-          <p:cNvSpPr>
-            <a:spLocks noGrp="1"/>
-          </p:cNvSpPr>
-          <p:nvPr>
-            <p:ph type="title"/>
-          </p:nvPr>
-        </p:nvSpPr>
-        <p:spPr/>
-        <p:txBody>
-          <a:bodyPr/>
-          <a:lstStyle/>
-          <a:p>
-            <a:pPr lvl="0" marL="0" indent="0">
-              <a:buNone/>
-            </a:pPr>
-            <a:r>
-              <a:rPr/>
-              <a:t>Synthesizing</a:t>
-            </a:r>
-          </a:p>
-        </p:txBody>
-      </p:sp>
-      <p:sp>
-        <p:nvSpPr>
-          <p:cNvPr id="3" name="Content Placeholder 2"/>
-          <p:cNvSpPr>
-            <a:spLocks noGrp="1"/>
-          </p:cNvSpPr>
-          <p:nvPr>
-            <p:ph idx="1"/>
-          </p:nvPr>
-        </p:nvSpPr>
-        <p:spPr/>
-        <p:txBody>
-          <a:bodyPr/>
-          <a:lstStyle/>
-          <a:p>
-            <a:pPr lvl="1"/>
-            <a:r>
-              <a:rPr/>
-              <a:t>Possible themes</a:t>
-            </a:r>
-          </a:p>
-          <a:p>
-            <a:pPr lvl="2"/>
-            <a:r>
-              <a:rPr/>
-              <a:t>Consensus, disagreements, the unknown</a:t>
-            </a:r>
-          </a:p>
-          <a:p>
-            <a:pPr lvl="2"/>
-            <a:r>
-              <a:rPr/>
-              <a:t>Problem, old remedies, new needs</a:t>
-            </a:r>
-          </a:p>
-          <a:p>
-            <a:pPr lvl="2"/>
-            <a:r>
-              <a:rPr/>
-              <a:t>Supportive, then non-supportive</a:t>
-            </a:r>
-          </a:p>
-          <a:p>
-            <a:pPr lvl="2"/>
-            <a:r>
-              <a:rPr/>
-              <a:t>Methodologies</a:t>
-            </a:r>
-          </a:p>
-          <a:p>
-            <a:pPr lvl="2"/>
-            <a:r>
-              <a:rPr/>
-              <a:t>Theories</a:t>
-            </a:r>
-          </a:p>
-          <a:p>
-            <a:pPr lvl="2"/>
-            <a:r>
-              <a:rPr/>
-              <a:t>Schools of thought</a:t>
-            </a:r>
-          </a:p>
-        </p:txBody>
-      </p:sp>
-    </p:spTree>
-  </p:cSld>
-</p:sld>
-</file>
-
-<file path=ppt/slides/slide21.xml><?xml version="1.0" encoding="utf-8"?>
-<p:sld xmlns:a="http://schemas.openxmlformats.org/drawingml/2006/main" xmlns:r="http://schemas.openxmlformats.org/officeDocument/2006/relationships" xmlns:p="http://schemas.openxmlformats.org/presentationml/2006/main">
-  <p:cSld>
-    <p:spTree>
-      <p:nvGrpSpPr>
-        <p:cNvPr id="1" name=""/>
-        <p:cNvGrpSpPr/>
-        <p:nvPr/>
-      </p:nvGrpSpPr>
-      <p:grpSpPr>
-        <a:xfrm>
-          <a:off x="0" y="0"/>
-          <a:ext cx="0" cy="0"/>
-          <a:chOff x="0" y="0"/>
-          <a:chExt cx="0" cy="0"/>
-        </a:xfrm>
-      </p:grpSpPr>
-      <p:sp>
-        <p:nvSpPr>
-          <p:cNvPr id="2" name="Title 1"/>
-          <p:cNvSpPr>
-            <a:spLocks noGrp="1"/>
-          </p:cNvSpPr>
-          <p:nvPr>
-            <p:ph type="title"/>
-          </p:nvPr>
-        </p:nvSpPr>
-        <p:spPr/>
-        <p:txBody>
-          <a:bodyPr/>
-          <a:lstStyle/>
-          <a:p>
-            <a:pPr lvl="0" marL="0" indent="0">
-              <a:buNone/>
-            </a:pPr>
-            <a:r>
-              <a:rPr/>
-              <a:t>Some</a:t>
-            </a:r>
-            <a:r>
-              <a:rPr/>
-              <a:t> </a:t>
-            </a:r>
-            <a:r>
-              <a:rPr/>
-              <a:t>last</a:t>
-            </a:r>
-            <a:r>
-              <a:rPr/>
-              <a:t> </a:t>
-            </a:r>
-            <a:r>
-              <a:rPr/>
-              <a:t>thoughts</a:t>
-            </a:r>
-          </a:p>
-        </p:txBody>
-      </p:sp>
-      <p:sp>
-        <p:nvSpPr>
-          <p:cNvPr id="3" name="Content Placeholder 2"/>
-          <p:cNvSpPr>
-            <a:spLocks noGrp="1"/>
-          </p:cNvSpPr>
-          <p:nvPr>
-            <p:ph idx="1"/>
-          </p:nvPr>
-        </p:nvSpPr>
-        <p:spPr/>
-        <p:txBody>
-          <a:bodyPr/>
-          <a:lstStyle/>
-          <a:p>
-            <a:pPr lvl="1"/>
-            <a:r>
-              <a:rPr/>
-              <a:t>Revisit your literature review after writing the discussion section of your paper.</a:t>
-            </a:r>
-          </a:p>
-          <a:p>
-            <a:pPr lvl="1"/>
-            <a:r>
-              <a:rPr/>
-              <a:t>Standard format for a thesis.</a:t>
-            </a:r>
-          </a:p>
-        </p:txBody>
-      </p:sp>
-    </p:spTree>
-  </p:cSld>
-</p:sld>
-</file>
-
-<file path=ppt/slides/slide3.xml><?xml version="1.0" encoding="utf-8"?>
-<p:sld xmlns:a="http://schemas.openxmlformats.org/drawingml/2006/main" xmlns:r="http://schemas.openxmlformats.org/officeDocument/2006/relationships" xmlns:p="http://schemas.openxmlformats.org/presentationml/2006/main">
-  <p:cSld>
-    <p:spTree>
-      <p:nvGrpSpPr>
-        <p:cNvPr id="1" name=""/>
-        <p:cNvGrpSpPr/>
-        <p:nvPr/>
-      </p:nvGrpSpPr>
-      <p:grpSpPr>
-        <a:xfrm>
-          <a:off x="0" y="0"/>
-          <a:ext cx="0" cy="0"/>
-          <a:chOff x="0" y="0"/>
-          <a:chExt cx="0" cy="0"/>
-        </a:xfrm>
-      </p:grpSpPr>
-      <p:sp>
-        <p:nvSpPr>
-          <p:cNvPr id="2" name="Title 1"/>
-          <p:cNvSpPr>
-            <a:spLocks noGrp="1"/>
-          </p:cNvSpPr>
-          <p:nvPr>
-            <p:ph type="title"/>
-          </p:nvPr>
-        </p:nvSpPr>
-        <p:spPr/>
-        <p:txBody>
-          <a:bodyPr/>
-          <a:lstStyle/>
-          <a:p>
-            <a:pPr lvl="0" marL="0" indent="0">
-              <a:buNone/>
-            </a:pPr>
-            <a:r>
-              <a:rPr/>
-              <a:t>What</a:t>
-            </a:r>
-            <a:r>
-              <a:rPr/>
-              <a:t> </a:t>
-            </a:r>
-            <a:r>
-              <a:rPr/>
-              <a:t>is</a:t>
-            </a:r>
-            <a:r>
-              <a:rPr/>
-              <a:t> </a:t>
-            </a:r>
-            <a:r>
-              <a:rPr/>
-              <a:t>a</a:t>
-            </a:r>
-            <a:r>
-              <a:rPr/>
-              <a:t> </a:t>
-            </a:r>
-            <a:r>
-              <a:rPr/>
-              <a:t>literature</a:t>
-            </a:r>
-            <a:r>
-              <a:rPr/>
-              <a:t> </a:t>
-            </a:r>
-            <a:r>
-              <a:rPr/>
-              <a:t>review</a:t>
-            </a:r>
-          </a:p>
-        </p:txBody>
-      </p:sp>
-      <p:sp>
-        <p:nvSpPr>
-          <p:cNvPr id="3" name="Content Placeholder 2"/>
-          <p:cNvSpPr>
-            <a:spLocks noGrp="1"/>
-          </p:cNvSpPr>
-          <p:nvPr>
-            <p:ph idx="1"/>
-          </p:nvPr>
-        </p:nvSpPr>
-        <p:spPr/>
-        <p:txBody>
-          <a:bodyPr/>
-          <a:lstStyle/>
-          <a:p>
-            <a:pPr lvl="0" marL="0" indent="0">
-              <a:buNone/>
-            </a:pPr>
-            <a:r>
-              <a:rPr/>
-              <a:t>Definition (from your book): “An interpretation of a selection of documents (published or unpublished) on a specific topic that involves summarization, analysis, evaluation, and synthesis of the documents.”</a:t>
-            </a:r>
-          </a:p>
-        </p:txBody>
-      </p:sp>
-    </p:spTree>
-  </p:cSld>
-</p:sld>
-</file>
-
-<file path=ppt/slides/slide4.xml><?xml version="1.0" encoding="utf-8"?>
-<p:sld xmlns:a="http://schemas.openxmlformats.org/drawingml/2006/main" xmlns:r="http://schemas.openxmlformats.org/officeDocument/2006/relationships" xmlns:p="http://schemas.openxmlformats.org/presentationml/2006/main">
-  <p:cSld>
-    <p:spTree>
-      <p:nvGrpSpPr>
-        <p:cNvPr id="1" name=""/>
-        <p:cNvGrpSpPr/>
-        <p:nvPr/>
-      </p:nvGrpSpPr>
-      <p:grpSpPr>
-        <a:xfrm>
-          <a:off x="0" y="0"/>
-          <a:ext cx="0" cy="0"/>
-          <a:chOff x="0" y="0"/>
-          <a:chExt cx="0" cy="0"/>
-        </a:xfrm>
-      </p:grpSpPr>
-      <p:sp>
-        <p:nvSpPr>
-          <p:cNvPr id="2" name="Title 1"/>
-          <p:cNvSpPr>
-            <a:spLocks noGrp="1"/>
-          </p:cNvSpPr>
-          <p:nvPr>
-            <p:ph type="title"/>
-          </p:nvPr>
-        </p:nvSpPr>
-        <p:spPr/>
-        <p:txBody>
-          <a:bodyPr/>
-          <a:lstStyle/>
-          <a:p>
-            <a:pPr lvl="0" marL="0" indent="0">
-              <a:buNone/>
-            </a:pPr>
-            <a:r>
-              <a:rPr/>
-              <a:t>Why</a:t>
-            </a:r>
-            <a:r>
-              <a:rPr/>
-              <a:t> </a:t>
-            </a:r>
-            <a:r>
-              <a:rPr/>
-              <a:t>do</a:t>
-            </a:r>
-            <a:r>
-              <a:rPr/>
-              <a:t> </a:t>
-            </a:r>
-            <a:r>
-              <a:rPr/>
-              <a:t>a</a:t>
-            </a:r>
-            <a:r>
-              <a:rPr/>
-              <a:t> </a:t>
-            </a:r>
-            <a:r>
-              <a:rPr/>
-              <a:t>literature</a:t>
-            </a:r>
-            <a:r>
-              <a:rPr/>
-              <a:t> </a:t>
-            </a:r>
-            <a:r>
-              <a:rPr/>
-              <a:t>review?</a:t>
-            </a:r>
-          </a:p>
-        </p:txBody>
-      </p:sp>
-      <p:sp>
-        <p:nvSpPr>
-          <p:cNvPr id="3" name="Content Placeholder 2"/>
-          <p:cNvSpPr>
-            <a:spLocks noGrp="1"/>
-          </p:cNvSpPr>
-          <p:nvPr>
-            <p:ph idx="1"/>
-          </p:nvPr>
-        </p:nvSpPr>
-        <p:spPr/>
-        <p:txBody>
-          <a:bodyPr/>
-          <a:lstStyle/>
-          <a:p>
-            <a:pPr lvl="0" marL="0" indent="0">
-              <a:buNone/>
-            </a:pPr>
-            <a:r>
-              <a:rPr/>
-              <a:t>(From your book)</a:t>
-            </a:r>
-          </a:p>
-          <a:p>
-            <a:pPr lvl="1"/>
-            <a:r>
-              <a:rPr/>
-              <a:t>“Identify gaps in the literature”</a:t>
-            </a:r>
-          </a:p>
-          <a:p>
-            <a:pPr lvl="1"/>
-            <a:r>
-              <a:rPr/>
-              <a:t>“Help to select appropriate methods for your new topic”</a:t>
-            </a:r>
-          </a:p>
-          <a:p>
-            <a:pPr lvl="1"/>
-            <a:r>
-              <a:rPr/>
-              <a:t>“Describe the inferences that have come from past research”</a:t>
-            </a:r>
-          </a:p>
-          <a:p>
-            <a:pPr lvl="1"/>
-            <a:r>
-              <a:rPr/>
-              <a:t>Other reasons???</a:t>
-            </a:r>
-          </a:p>
-          <a:p>
-            <a:pPr lvl="2"/>
-            <a:r>
-              <a:rPr/>
-              <a:t>Because you have to.</a:t>
-            </a:r>
-          </a:p>
-        </p:txBody>
-      </p:sp>
-    </p:spTree>
-  </p:cSld>
-</p:sld>
-</file>
-
-<file path=ppt/slides/slide5.xml><?xml version="1.0" encoding="utf-8"?>
-<p:sld xmlns:a="http://schemas.openxmlformats.org/drawingml/2006/main" xmlns:r="http://schemas.openxmlformats.org/officeDocument/2006/relationships" xmlns:p="http://schemas.openxmlformats.org/presentationml/2006/main">
-  <p:cSld>
-    <p:spTree>
-      <p:nvGrpSpPr>
-        <p:cNvPr id="1" name=""/>
-        <p:cNvGrpSpPr/>
-        <p:nvPr/>
-      </p:nvGrpSpPr>
-      <p:grpSpPr>
-        <a:xfrm>
-          <a:off x="0" y="0"/>
-          <a:ext cx="0" cy="0"/>
-          <a:chOff x="0" y="0"/>
-          <a:chExt cx="0" cy="0"/>
-        </a:xfrm>
-      </p:grpSpPr>
-      <p:sp>
-        <p:nvSpPr>
-          <p:cNvPr id="2" name="Title 1"/>
-          <p:cNvSpPr>
-            <a:spLocks noGrp="1"/>
-          </p:cNvSpPr>
-          <p:nvPr>
-            <p:ph type="title"/>
-          </p:nvPr>
-        </p:nvSpPr>
-        <p:spPr/>
-        <p:txBody>
-          <a:bodyPr/>
-          <a:lstStyle/>
-          <a:p>
-            <a:pPr lvl="0" marL="0" indent="0">
-              <a:buNone/>
-            </a:pPr>
-            <a:r>
-              <a:rPr/>
-              <a:t>Contrasts</a:t>
-            </a:r>
-            <a:r>
-              <a:rPr/>
-              <a:t> </a:t>
-            </a:r>
-            <a:r>
-              <a:rPr/>
-              <a:t>to</a:t>
-            </a:r>
-            <a:r>
-              <a:rPr/>
-              <a:t> </a:t>
-            </a:r>
-            <a:r>
-              <a:rPr/>
-              <a:t>the</a:t>
-            </a:r>
-            <a:r>
-              <a:rPr/>
-              <a:t> </a:t>
-            </a:r>
-            <a:r>
-              <a:rPr/>
-              <a:t>literature</a:t>
-            </a:r>
-            <a:r>
-              <a:rPr/>
-              <a:t> </a:t>
-            </a:r>
-            <a:r>
-              <a:rPr/>
-              <a:t>review</a:t>
-            </a:r>
-          </a:p>
-        </p:txBody>
-      </p:sp>
-      <p:sp>
-        <p:nvSpPr>
-          <p:cNvPr id="3" name="Content Placeholder 2"/>
-          <p:cNvSpPr>
-            <a:spLocks noGrp="1"/>
-          </p:cNvSpPr>
-          <p:nvPr>
-            <p:ph idx="1"/>
-          </p:nvPr>
-        </p:nvSpPr>
-        <p:spPr/>
-        <p:txBody>
-          <a:bodyPr/>
-          <a:lstStyle/>
-          <a:p>
-            <a:pPr lvl="1"/>
-            <a:r>
-              <a:rPr/>
-              <a:t>Annotated bibliography</a:t>
-            </a:r>
-          </a:p>
-          <a:p>
-            <a:pPr lvl="2"/>
-            <a:r>
-              <a:rPr/>
-              <a:t>Also requires summarization</a:t>
-            </a:r>
-          </a:p>
-          <a:p>
-            <a:pPr lvl="2"/>
-            <a:r>
-              <a:rPr/>
-              <a:t>Often requires analysis and evaluation</a:t>
-            </a:r>
-          </a:p>
-          <a:p>
-            <a:pPr lvl="2"/>
-            <a:r>
-              <a:rPr/>
-              <a:t>Lacks synthesis (no organization)</a:t>
-            </a:r>
-          </a:p>
-          <a:p>
-            <a:pPr lvl="2"/>
-            <a:r>
-              <a:rPr/>
-              <a:t>Strives for completeness</a:t>
-            </a:r>
-          </a:p>
-        </p:txBody>
-      </p:sp>
-    </p:spTree>
-  </p:cSld>
-</p:sld>
-</file>
-
-<file path=ppt/slides/slide6.xml><?xml version="1.0" encoding="utf-8"?>
-<p:sld xmlns:a="http://schemas.openxmlformats.org/drawingml/2006/main" xmlns:r="http://schemas.openxmlformats.org/officeDocument/2006/relationships" xmlns:p="http://schemas.openxmlformats.org/presentationml/2006/main">
-  <p:cSld>
-    <p:spTree>
-      <p:nvGrpSpPr>
-        <p:cNvPr id="1" name=""/>
-        <p:cNvGrpSpPr/>
-        <p:nvPr/>
-      </p:nvGrpSpPr>
-      <p:grpSpPr>
-        <a:xfrm>
-          <a:off x="0" y="0"/>
-          <a:ext cx="0" cy="0"/>
-          <a:chOff x="0" y="0"/>
-          <a:chExt cx="0" cy="0"/>
-        </a:xfrm>
-      </p:grpSpPr>
-      <p:sp>
-        <p:nvSpPr>
-          <p:cNvPr id="2" name="Title 1"/>
-          <p:cNvSpPr>
-            <a:spLocks noGrp="1"/>
-          </p:cNvSpPr>
-          <p:nvPr>
-            <p:ph type="title"/>
-          </p:nvPr>
-        </p:nvSpPr>
-        <p:spPr/>
-        <p:txBody>
-          <a:bodyPr/>
-          <a:lstStyle/>
-          <a:p>
-            <a:pPr lvl="0" marL="0" indent="0">
-              <a:buNone/>
-            </a:pPr>
-            <a:r>
-              <a:rPr/>
-              <a:t>Contrasts</a:t>
-            </a:r>
-            <a:r>
-              <a:rPr/>
-              <a:t> </a:t>
-            </a:r>
-            <a:r>
-              <a:rPr/>
-              <a:t>to</a:t>
-            </a:r>
-            <a:r>
-              <a:rPr/>
-              <a:t> </a:t>
-            </a:r>
-            <a:r>
-              <a:rPr/>
-              <a:t>the</a:t>
-            </a:r>
-            <a:r>
-              <a:rPr/>
-              <a:t> </a:t>
-            </a:r>
-            <a:r>
-              <a:rPr/>
-              <a:t>literature</a:t>
-            </a:r>
-            <a:r>
-              <a:rPr/>
-              <a:t> </a:t>
-            </a:r>
-            <a:r>
-              <a:rPr/>
-              <a:t>review</a:t>
-            </a:r>
-          </a:p>
-        </p:txBody>
-      </p:sp>
-      <p:sp>
-        <p:nvSpPr>
-          <p:cNvPr id="3" name="Content Placeholder 2"/>
-          <p:cNvSpPr>
-            <a:spLocks noGrp="1"/>
-          </p:cNvSpPr>
-          <p:nvPr>
-            <p:ph idx="1"/>
-          </p:nvPr>
-        </p:nvSpPr>
-        <p:spPr/>
-        <p:txBody>
-          <a:bodyPr/>
-          <a:lstStyle/>
-          <a:p>
-            <a:pPr lvl="1"/>
-            <a:r>
-              <a:rPr/>
-              <a:t>Systematic overview</a:t>
-            </a:r>
-          </a:p>
-          <a:p>
-            <a:pPr lvl="2"/>
-            <a:r>
-              <a:rPr/>
-              <a:t>Systematic</a:t>
-            </a:r>
-          </a:p>
-          <a:p>
-            <a:pPr lvl="2"/>
-            <a:r>
-              <a:rPr/>
-              <a:t>Exhaustive search</a:t>
-            </a:r>
-          </a:p>
-          <a:p>
-            <a:pPr lvl="2"/>
-            <a:r>
-              <a:rPr/>
-              <a:t>Usually a quantitative summary</a:t>
-            </a:r>
-          </a:p>
-          <a:p>
-            <a:pPr lvl="2"/>
-            <a:r>
-              <a:rPr/>
-              <a:t>Lacks synthesis</a:t>
-            </a:r>
-          </a:p>
-        </p:txBody>
-      </p:sp>
-    </p:spTree>
-  </p:cSld>
-</p:sld>
-</file>
-
-<file path=ppt/slides/slide7.xml><?xml version="1.0" encoding="utf-8"?>
-<p:sld xmlns:a="http://schemas.openxmlformats.org/drawingml/2006/main" xmlns:r="http://schemas.openxmlformats.org/officeDocument/2006/relationships" xmlns:p="http://schemas.openxmlformats.org/presentationml/2006/main">
-  <p:cSld>
-    <p:spTree>
-      <p:nvGrpSpPr>
-        <p:cNvPr id="1" name=""/>
-        <p:cNvGrpSpPr/>
-        <p:nvPr/>
-      </p:nvGrpSpPr>
-      <p:grpSpPr>
-        <a:xfrm>
-          <a:off x="0" y="0"/>
-          <a:ext cx="0" cy="0"/>
-          <a:chOff x="0" y="0"/>
-          <a:chExt cx="0" cy="0"/>
-        </a:xfrm>
-      </p:grpSpPr>
-      <p:sp>
-        <p:nvSpPr>
-          <p:cNvPr id="2" name="Title 1"/>
-          <p:cNvSpPr>
-            <a:spLocks noGrp="1"/>
-          </p:cNvSpPr>
-          <p:nvPr>
-            <p:ph type="title"/>
-          </p:nvPr>
-        </p:nvSpPr>
-        <p:spPr/>
-        <p:txBody>
-          <a:bodyPr/>
-          <a:lstStyle/>
-          <a:p>
-            <a:pPr lvl="0" marL="0" indent="0">
-              <a:buNone/>
-            </a:pPr>
-            <a:r>
-              <a:rPr/>
-              <a:t>Finding</a:t>
-            </a:r>
-            <a:r>
-              <a:rPr/>
-              <a:t> </a:t>
-            </a:r>
-            <a:r>
-              <a:rPr/>
-              <a:t>sources</a:t>
-            </a:r>
-            <a:r>
-              <a:rPr/>
-              <a:t> </a:t>
-            </a:r>
-            <a:r>
-              <a:rPr/>
-              <a:t>for</a:t>
-            </a:r>
-            <a:r>
-              <a:rPr/>
-              <a:t> </a:t>
-            </a:r>
-            <a:r>
-              <a:rPr/>
-              <a:t>your</a:t>
-            </a:r>
-            <a:r>
-              <a:rPr/>
-              <a:t> </a:t>
-            </a:r>
-            <a:r>
-              <a:rPr/>
-              <a:t>literature</a:t>
-            </a:r>
-            <a:r>
-              <a:rPr/>
-              <a:t> </a:t>
-            </a:r>
-            <a:r>
-              <a:rPr/>
-              <a:t>review</a:t>
-            </a:r>
-          </a:p>
-        </p:txBody>
-      </p:sp>
-      <p:sp>
-        <p:nvSpPr>
-          <p:cNvPr id="3" name="Content Placeholder 2"/>
-          <p:cNvSpPr>
-            <a:spLocks noGrp="1"/>
-          </p:cNvSpPr>
-          <p:nvPr>
-            <p:ph idx="1"/>
-          </p:nvPr>
-        </p:nvSpPr>
-        <p:spPr/>
-        <p:txBody>
-          <a:bodyPr/>
-          <a:lstStyle/>
-          <a:p>
-            <a:pPr lvl="1"/>
-            <a:r>
-              <a:rPr/>
-              <a:t>Talk to a librarian</a:t>
-            </a:r>
-          </a:p>
-          <a:p>
-            <a:pPr lvl="1"/>
-            <a:r>
-              <a:rPr/>
-              <a:t>Specify your scope</a:t>
-            </a:r>
-          </a:p>
-          <a:p>
-            <a:pPr lvl="1"/>
-            <a:r>
-              <a:rPr/>
-              <a:t>Use primary sources, peer-reviewed</a:t>
-            </a:r>
-          </a:p>
-          <a:p>
-            <a:pPr lvl="1"/>
-            <a:r>
-              <a:rPr/>
-              <a:t>Talk to a librarian</a:t>
-            </a:r>
-          </a:p>
-          <a:p>
-            <a:pPr lvl="1"/>
-            <a:r>
-              <a:rPr/>
-              <a:t>Snowball sampling</a:t>
-            </a:r>
-          </a:p>
-          <a:p>
-            <a:pPr lvl="1"/>
-            <a:r>
-              <a:rPr/>
-              <a:t>Iterate between writing and searching</a:t>
-            </a:r>
-          </a:p>
-          <a:p>
-            <a:pPr lvl="1"/>
-            <a:r>
-              <a:rPr/>
-              <a:t>Talk to a librarian</a:t>
-            </a:r>
-          </a:p>
-        </p:txBody>
-      </p:sp>
-    </p:spTree>
-  </p:cSld>
-</p:sld>
-</file>
-
-<file path=ppt/slides/slide8.xml><?xml version="1.0" encoding="utf-8"?>
-<p:sld xmlns:a="http://schemas.openxmlformats.org/drawingml/2006/main" xmlns:r="http://schemas.openxmlformats.org/officeDocument/2006/relationships" xmlns:p="http://schemas.openxmlformats.org/presentationml/2006/main">
-  <p:cSld>
-    <p:spTree>
-      <p:nvGrpSpPr>
-        <p:cNvPr id="1" name=""/>
-        <p:cNvGrpSpPr/>
-        <p:nvPr/>
-      </p:nvGrpSpPr>
-      <p:grpSpPr>
-        <a:xfrm>
-          <a:off x="0" y="0"/>
-          <a:ext cx="0" cy="0"/>
-          <a:chOff x="0" y="0"/>
-          <a:chExt cx="0" cy="0"/>
-        </a:xfrm>
-      </p:grpSpPr>
-      <p:sp>
-        <p:nvSpPr>
-          <p:cNvPr id="2" name="Title 1"/>
-          <p:cNvSpPr>
-            <a:spLocks noGrp="1"/>
-          </p:cNvSpPr>
-          <p:nvPr>
-            <p:ph type="title"/>
-          </p:nvPr>
-        </p:nvSpPr>
-        <p:spPr/>
-        <p:txBody>
-          <a:bodyPr/>
-          <a:lstStyle/>
-          <a:p>
-            <a:pPr lvl="0" marL="0" indent="0">
-              <a:buNone/>
-            </a:pPr>
-            <a:r>
-              <a:rPr/>
-              <a:t>Organization</a:t>
-            </a:r>
-          </a:p>
-        </p:txBody>
-      </p:sp>
-      <p:sp>
-        <p:nvSpPr>
-          <p:cNvPr id="3" name="Content Placeholder 2"/>
-          <p:cNvSpPr>
-            <a:spLocks noGrp="1"/>
-          </p:cNvSpPr>
-          <p:nvPr>
-            <p:ph idx="1"/>
-          </p:nvPr>
-        </p:nvSpPr>
-        <p:spPr/>
-        <p:txBody>
-          <a:bodyPr/>
-          <a:lstStyle/>
-          <a:p>
-            <a:pPr lvl="1"/>
-            <a:r>
-              <a:rPr/>
-              <a:t>Note cards</a:t>
-            </a:r>
-          </a:p>
-          <a:p>
-            <a:pPr lvl="1"/>
-            <a:r>
-              <a:rPr/>
-              <a:t>Spreadsheets</a:t>
-            </a:r>
-          </a:p>
-          <a:p>
-            <a:pPr lvl="1"/>
-            <a:r>
-              <a:rPr/>
-              <a:t>Bibliographic software</a:t>
-            </a:r>
-          </a:p>
-          <a:p>
-            <a:pPr lvl="2"/>
-            <a:r>
-              <a:rPr/>
-              <a:t>Endnotes</a:t>
-            </a:r>
-          </a:p>
-          <a:p>
-            <a:pPr lvl="2"/>
-            <a:r>
-              <a:rPr/>
-              <a:t>Zotero</a:t>
-            </a:r>
-          </a:p>
-          <a:p>
-            <a:pPr lvl="2"/>
-            <a:r>
-              <a:rPr/>
-              <a:t>Mendelay</a:t>
-            </a:r>
-          </a:p>
-          <a:p>
-            <a:pPr lvl="2"/>
-            <a:r>
-              <a:rPr/>
-              <a:t>BibTeX</a:t>
-            </a:r>
-          </a:p>
-          <a:p>
-            <a:pPr lvl="1"/>
-            <a:r>
-              <a:rPr/>
-              <a:t>Talk to a librarian</a:t>
-            </a:r>
-          </a:p>
-        </p:txBody>
-      </p:sp>
-    </p:spTree>
-  </p:cSld>
-</p:sld>
-</file>
-
-<file path=ppt/slides/slide9.xml><?xml version="1.0" encoding="utf-8"?>
-<p:sld xmlns:a="http://schemas.openxmlformats.org/drawingml/2006/main" xmlns:r="http://schemas.openxmlformats.org/officeDocument/2006/relationships" xmlns:p="http://schemas.openxmlformats.org/presentationml/2006/main">
-  <p:cSld>
-    <p:spTree>
-      <p:nvGrpSpPr>
-        <p:cNvPr id="1" name=""/>
-        <p:cNvGrpSpPr/>
-        <p:nvPr/>
-      </p:nvGrpSpPr>
-      <p:grpSpPr>
-        <a:xfrm>
-          <a:off x="0" y="0"/>
-          <a:ext cx="0" cy="0"/>
-          <a:chOff x="0" y="0"/>
-          <a:chExt cx="0" cy="0"/>
-        </a:xfrm>
-      </p:grpSpPr>
-      <p:sp>
-        <p:nvSpPr>
-          <p:cNvPr id="2" name="Title 1"/>
-          <p:cNvSpPr>
-            <a:spLocks noGrp="1"/>
-          </p:cNvSpPr>
-          <p:nvPr>
-            <p:ph type="title"/>
-          </p:nvPr>
-        </p:nvSpPr>
-        <p:spPr/>
-        <p:txBody>
-          <a:bodyPr/>
-          <a:lstStyle/>
-          <a:p>
-            <a:pPr lvl="0" marL="0" indent="0">
-              <a:buNone/>
-            </a:pPr>
-            <a:r>
-              <a:rPr/>
               <a:t>Scraping</a:t>
             </a:r>
             <a:r>
@@ -37977,6 +35812,2478 @@
             <a:r>
               <a:rPr/>
               <a:t>article</a:t>
+            </a:r>
+          </a:p>
+        </p:txBody>
+      </p:sp>
+    </p:spTree>
+  </p:cSld>
+</p:sld>
+</file>
+
+<file path=ppt/slides/slide11.xml><?xml version="1.0" encoding="utf-8"?>
+<p:sld xmlns:a="http://schemas.openxmlformats.org/drawingml/2006/main" xmlns:r="http://schemas.openxmlformats.org/officeDocument/2006/relationships" xmlns:p="http://schemas.openxmlformats.org/presentationml/2006/main">
+  <p:cSld>
+    <p:spTree>
+      <p:nvGrpSpPr>
+        <p:cNvPr id="1" name=""/>
+        <p:cNvGrpSpPr/>
+        <p:nvPr/>
+      </p:nvGrpSpPr>
+      <p:grpSpPr>
+        <a:xfrm>
+          <a:off x="0" y="0"/>
+          <a:ext cx="0" cy="0"/>
+          <a:chOff x="0" y="0"/>
+          <a:chExt cx="0" cy="0"/>
+        </a:xfrm>
+      </p:grpSpPr>
+      <p:sp>
+        <p:nvSpPr>
+          <p:cNvPr id="2" name="Title 1"/>
+          <p:cNvSpPr>
+            <a:spLocks noGrp="1"/>
+          </p:cNvSpPr>
+          <p:nvPr>
+            <p:ph type="title"/>
+          </p:nvPr>
+        </p:nvSpPr>
+        <p:spPr/>
+        <p:txBody>
+          <a:bodyPr/>
+          <a:lstStyle/>
+          <a:p>
+            <a:pPr lvl="0" marL="0" indent="0">
+              <a:buNone/>
+            </a:pPr>
+            <a:r>
+              <a:rPr/>
+              <a:t>Summarizing</a:t>
+            </a:r>
+          </a:p>
+        </p:txBody>
+      </p:sp>
+      <p:sp>
+        <p:nvSpPr>
+          <p:cNvPr id="3" name="Content Placeholder 2"/>
+          <p:cNvSpPr>
+            <a:spLocks noGrp="1"/>
+          </p:cNvSpPr>
+          <p:nvPr>
+            <p:ph idx="1"/>
+          </p:nvPr>
+        </p:nvSpPr>
+        <p:spPr/>
+        <p:txBody>
+          <a:bodyPr/>
+          <a:lstStyle/>
+          <a:p>
+            <a:pPr lvl="1"/>
+            <a:r>
+              <a:rPr/>
+              <a:t>No direct quotes.</a:t>
+            </a:r>
+          </a:p>
+          <a:p>
+            <a:pPr lvl="1"/>
+            <a:r>
+              <a:rPr/>
+              <a:t>Contextual clues</a:t>
+            </a:r>
+          </a:p>
+          <a:p>
+            <a:pPr lvl="2"/>
+            <a:r>
+              <a:rPr/>
+              <a:t>Also, in addition</a:t>
+            </a:r>
+          </a:p>
+          <a:p>
+            <a:pPr lvl="2"/>
+            <a:r>
+              <a:rPr/>
+              <a:t>In contrast, on the other hand</a:t>
+            </a:r>
+          </a:p>
+        </p:txBody>
+      </p:sp>
+    </p:spTree>
+  </p:cSld>
+</p:sld>
+</file>
+
+<file path=ppt/slides/slide12.xml><?xml version="1.0" encoding="utf-8"?>
+<p:sld xmlns:a="http://schemas.openxmlformats.org/drawingml/2006/main" xmlns:r="http://schemas.openxmlformats.org/officeDocument/2006/relationships" xmlns:p="http://schemas.openxmlformats.org/presentationml/2006/main">
+  <p:cSld>
+    <p:spTree>
+      <p:nvGrpSpPr>
+        <p:cNvPr id="1" name=""/>
+        <p:cNvGrpSpPr/>
+        <p:nvPr/>
+      </p:nvGrpSpPr>
+      <p:grpSpPr>
+        <a:xfrm>
+          <a:off x="0" y="0"/>
+          <a:ext cx="0" cy="0"/>
+          <a:chOff x="0" y="0"/>
+          <a:chExt cx="0" cy="0"/>
+        </a:xfrm>
+      </p:grpSpPr>
+      <p:sp>
+        <p:nvSpPr>
+          <p:cNvPr id="2" name="Title 1"/>
+          <p:cNvSpPr>
+            <a:spLocks noGrp="1"/>
+          </p:cNvSpPr>
+          <p:nvPr>
+            <p:ph type="title"/>
+          </p:nvPr>
+        </p:nvSpPr>
+        <p:spPr/>
+        <p:txBody>
+          <a:bodyPr/>
+          <a:lstStyle/>
+          <a:p>
+            <a:pPr lvl="0" marL="0" indent="0">
+              <a:buNone/>
+            </a:pPr>
+            <a:r>
+              <a:rPr/>
+              <a:t>Example</a:t>
+            </a:r>
+            <a:r>
+              <a:rPr/>
+              <a:t> </a:t>
+            </a:r>
+            <a:r>
+              <a:rPr/>
+              <a:t>of</a:t>
+            </a:r>
+            <a:r>
+              <a:rPr/>
+              <a:t> </a:t>
+            </a:r>
+            <a:r>
+              <a:rPr/>
+              <a:t>contextual</a:t>
+            </a:r>
+            <a:r>
+              <a:rPr/>
+              <a:t> </a:t>
+            </a:r>
+            <a:r>
+              <a:rPr/>
+              <a:t>words</a:t>
+            </a:r>
+          </a:p>
+        </p:txBody>
+      </p:sp>
+      <p:sp>
+        <p:nvSpPr>
+          <p:cNvPr id="3" name="Content Placeholder 2"/>
+          <p:cNvSpPr>
+            <a:spLocks noGrp="1"/>
+          </p:cNvSpPr>
+          <p:nvPr>
+            <p:ph idx="1"/>
+          </p:nvPr>
+        </p:nvSpPr>
+        <p:spPr/>
+        <p:txBody>
+          <a:bodyPr/>
+          <a:lstStyle/>
+          <a:p>
+            <a:pPr lvl="0" marL="0" indent="0">
+              <a:buNone/>
+            </a:pPr>
+            <a:r>
+              <a:rPr/>
+              <a:t>“Dosage compensation in mammalian females is a recognized phenomenon whereby inactivation of one X chromosome …[1]. </a:t>
+            </a:r>
+            <a:r>
+              <a:rPr b="1"/>
+              <a:t>However,</a:t>
+            </a:r>
+            <a:r>
+              <a:rPr/>
+              <a:t> not all X-linked genes are inactivated. Recently, an inactivation profile…was reported by Carrel and Willard [2]. … </a:t>
+            </a:r>
+            <a:r>
+              <a:rPr b="1"/>
+              <a:t>Subsequently</a:t>
+            </a:r>
+            <a:r>
+              <a:rPr/>
+              <a:t>, Lyon [3] … enhanced our knowledge about X-chromosome inactivation…”</a:t>
+            </a:r>
+          </a:p>
+          <a:p>
+            <a:pPr lvl="1"/>
+            <a:r>
+              <a:rPr/>
+              <a:t>Talebizadeh et al. X chromosome gene expression in human tissues: Male and female comparisons. Genomics 2006.</a:t>
+            </a:r>
+          </a:p>
+        </p:txBody>
+      </p:sp>
+    </p:spTree>
+  </p:cSld>
+</p:sld>
+</file>
+
+<file path=ppt/slides/slide13.xml><?xml version="1.0" encoding="utf-8"?>
+<p:sld xmlns:a="http://schemas.openxmlformats.org/drawingml/2006/main" xmlns:r="http://schemas.openxmlformats.org/officeDocument/2006/relationships" xmlns:p="http://schemas.openxmlformats.org/presentationml/2006/main">
+  <p:cSld>
+    <p:spTree>
+      <p:nvGrpSpPr>
+        <p:cNvPr id="1" name=""/>
+        <p:cNvGrpSpPr/>
+        <p:nvPr/>
+      </p:nvGrpSpPr>
+      <p:grpSpPr>
+        <a:xfrm>
+          <a:off x="0" y="0"/>
+          <a:ext cx="0" cy="0"/>
+          <a:chOff x="0" y="0"/>
+          <a:chExt cx="0" cy="0"/>
+        </a:xfrm>
+      </p:grpSpPr>
+      <p:sp>
+        <p:nvSpPr>
+          <p:cNvPr id="2" name="Title 1"/>
+          <p:cNvSpPr>
+            <a:spLocks noGrp="1"/>
+          </p:cNvSpPr>
+          <p:nvPr>
+            <p:ph type="title"/>
+          </p:nvPr>
+        </p:nvSpPr>
+        <p:spPr/>
+        <p:txBody>
+          <a:bodyPr/>
+          <a:lstStyle/>
+          <a:p>
+            <a:pPr lvl="0" marL="0" indent="0">
+              <a:buNone/>
+            </a:pPr>
+            <a:r>
+              <a:rPr/>
+              <a:t>Analyzing</a:t>
+            </a:r>
+          </a:p>
+        </p:txBody>
+      </p:sp>
+      <p:sp>
+        <p:nvSpPr>
+          <p:cNvPr id="3" name="Content Placeholder 2"/>
+          <p:cNvSpPr>
+            <a:spLocks noGrp="1"/>
+          </p:cNvSpPr>
+          <p:nvPr>
+            <p:ph idx="1"/>
+          </p:nvPr>
+        </p:nvSpPr>
+        <p:spPr/>
+        <p:txBody>
+          <a:bodyPr/>
+          <a:lstStyle/>
+          <a:p>
+            <a:pPr lvl="1"/>
+            <a:r>
+              <a:rPr/>
+              <a:t>More than just the abstract</a:t>
+            </a:r>
+          </a:p>
+          <a:p>
+            <a:pPr lvl="2"/>
+            <a:r>
+              <a:rPr/>
+              <a:t>Inconsistencies with main text</a:t>
+            </a:r>
+          </a:p>
+          <a:p>
+            <a:pPr lvl="2"/>
+            <a:r>
+              <a:rPr/>
+              <a:t>Misplaced emphasis in abstract</a:t>
+            </a:r>
+          </a:p>
+          <a:p>
+            <a:pPr lvl="1"/>
+            <a:r>
+              <a:rPr/>
+              <a:t>Research types</a:t>
+            </a:r>
+          </a:p>
+          <a:p>
+            <a:pPr lvl="2"/>
+            <a:r>
+              <a:rPr/>
+              <a:t>Comparative</a:t>
+            </a:r>
+          </a:p>
+          <a:p>
+            <a:pPr lvl="2"/>
+            <a:r>
+              <a:rPr/>
+              <a:t>Associational</a:t>
+            </a:r>
+          </a:p>
+          <a:p>
+            <a:pPr lvl="2"/>
+            <a:r>
+              <a:rPr/>
+              <a:t>Descriptive (Estimate, Identify)</a:t>
+            </a:r>
+          </a:p>
+          <a:p>
+            <a:pPr lvl="1"/>
+            <a:r>
+              <a:rPr/>
+              <a:t>Put in some passion</a:t>
+            </a:r>
+          </a:p>
+        </p:txBody>
+      </p:sp>
+    </p:spTree>
+  </p:cSld>
+</p:sld>
+</file>
+
+<file path=ppt/slides/slide14.xml><?xml version="1.0" encoding="utf-8"?>
+<p:sld xmlns:a="http://schemas.openxmlformats.org/drawingml/2006/main" xmlns:r="http://schemas.openxmlformats.org/officeDocument/2006/relationships" xmlns:p="http://schemas.openxmlformats.org/presentationml/2006/main">
+  <p:cSld>
+    <p:spTree>
+      <p:nvGrpSpPr>
+        <p:cNvPr id="1" name=""/>
+        <p:cNvGrpSpPr/>
+        <p:nvPr/>
+      </p:nvGrpSpPr>
+      <p:grpSpPr>
+        <a:xfrm>
+          <a:off x="0" y="0"/>
+          <a:ext cx="0" cy="0"/>
+          <a:chOff x="0" y="0"/>
+          <a:chExt cx="0" cy="0"/>
+        </a:xfrm>
+      </p:grpSpPr>
+      <p:sp>
+        <p:nvSpPr>
+          <p:cNvPr id="2" name="Title 1"/>
+          <p:cNvSpPr>
+            <a:spLocks noGrp="1"/>
+          </p:cNvSpPr>
+          <p:nvPr>
+            <p:ph type="title"/>
+          </p:nvPr>
+        </p:nvSpPr>
+        <p:spPr/>
+        <p:txBody>
+          <a:bodyPr/>
+          <a:lstStyle/>
+          <a:p>
+            <a:pPr lvl="0" marL="0" indent="0">
+              <a:buNone/>
+            </a:pPr>
+            <a:r>
+              <a:rPr/>
+              <a:t>Example</a:t>
+            </a:r>
+            <a:r>
+              <a:rPr/>
+              <a:t> </a:t>
+            </a:r>
+            <a:r>
+              <a:rPr/>
+              <a:t>of</a:t>
+            </a:r>
+            <a:r>
+              <a:rPr/>
+              <a:t> </a:t>
+            </a:r>
+            <a:r>
+              <a:rPr/>
+              <a:t>descriptive</a:t>
+            </a:r>
+            <a:r>
+              <a:rPr/>
+              <a:t> </a:t>
+            </a:r>
+            <a:r>
+              <a:rPr/>
+              <a:t>and</a:t>
+            </a:r>
+            <a:r>
+              <a:rPr/>
+              <a:t> </a:t>
+            </a:r>
+            <a:r>
+              <a:rPr/>
+              <a:t>comparative</a:t>
+            </a:r>
+            <a:r>
+              <a:rPr/>
+              <a:t> </a:t>
+            </a:r>
+            <a:r>
+              <a:rPr/>
+              <a:t>analysis</a:t>
+            </a:r>
+          </a:p>
+        </p:txBody>
+      </p:sp>
+      <p:sp>
+        <p:nvSpPr>
+          <p:cNvPr id="3" name="Content Placeholder 2"/>
+          <p:cNvSpPr>
+            <a:spLocks noGrp="1"/>
+          </p:cNvSpPr>
+          <p:nvPr>
+            <p:ph idx="1"/>
+          </p:nvPr>
+        </p:nvSpPr>
+        <p:spPr/>
+        <p:txBody>
+          <a:bodyPr/>
+          <a:lstStyle/>
+          <a:p>
+            <a:pPr lvl="0" marL="0" indent="0">
+              <a:buNone/>
+            </a:pPr>
+            <a:r>
+              <a:rPr/>
+              <a:t>“African Americans represent nearly 45% of new HIV cases each year (1–2). Due to delayed HIV diagnosis, African Americans tend to enter HIV treatment at advanced stages and die from AIDS sooner than Whites (1).”</a:t>
+            </a:r>
+          </a:p>
+          <a:p>
+            <a:pPr lvl="1"/>
+            <a:r>
+              <a:rPr/>
+              <a:t>Berkley-Patton et al. An HIV Testing Intervention in African American Churches: Pilot Study Findings. Ann Behav Med. 2016.</a:t>
+            </a:r>
+          </a:p>
+        </p:txBody>
+      </p:sp>
+    </p:spTree>
+  </p:cSld>
+</p:sld>
+</file>
+
+<file path=ppt/slides/slide15.xml><?xml version="1.0" encoding="utf-8"?>
+<p:sld xmlns:a="http://schemas.openxmlformats.org/drawingml/2006/main" xmlns:r="http://schemas.openxmlformats.org/officeDocument/2006/relationships" xmlns:p="http://schemas.openxmlformats.org/presentationml/2006/main">
+  <p:cSld>
+    <p:spTree>
+      <p:nvGrpSpPr>
+        <p:cNvPr id="1" name=""/>
+        <p:cNvGrpSpPr/>
+        <p:nvPr/>
+      </p:nvGrpSpPr>
+      <p:grpSpPr>
+        <a:xfrm>
+          <a:off x="0" y="0"/>
+          <a:ext cx="0" cy="0"/>
+          <a:chOff x="0" y="0"/>
+          <a:chExt cx="0" cy="0"/>
+        </a:xfrm>
+      </p:grpSpPr>
+      <p:sp>
+        <p:nvSpPr>
+          <p:cNvPr id="2" name="Title 1"/>
+          <p:cNvSpPr>
+            <a:spLocks noGrp="1"/>
+          </p:cNvSpPr>
+          <p:nvPr>
+            <p:ph type="title"/>
+          </p:nvPr>
+        </p:nvSpPr>
+        <p:spPr/>
+        <p:txBody>
+          <a:bodyPr/>
+          <a:lstStyle/>
+          <a:p>
+            <a:pPr lvl="0" marL="0" indent="0">
+              <a:buNone/>
+            </a:pPr>
+            <a:r>
+              <a:rPr/>
+              <a:t>Example</a:t>
+            </a:r>
+            <a:r>
+              <a:rPr/>
+              <a:t> </a:t>
+            </a:r>
+            <a:r>
+              <a:rPr/>
+              <a:t>of</a:t>
+            </a:r>
+            <a:r>
+              <a:rPr/>
+              <a:t> </a:t>
+            </a:r>
+            <a:r>
+              <a:rPr/>
+              <a:t>descriptive</a:t>
+            </a:r>
+            <a:r>
+              <a:rPr/>
+              <a:t> </a:t>
+            </a:r>
+            <a:r>
+              <a:rPr/>
+              <a:t>analysis</a:t>
+            </a:r>
+          </a:p>
+        </p:txBody>
+      </p:sp>
+      <p:sp>
+        <p:nvSpPr>
+          <p:cNvPr id="3" name="Content Placeholder 2"/>
+          <p:cNvSpPr>
+            <a:spLocks noGrp="1"/>
+          </p:cNvSpPr>
+          <p:nvPr>
+            <p:ph idx="1"/>
+          </p:nvPr>
+        </p:nvSpPr>
+        <p:spPr/>
+        <p:txBody>
+          <a:bodyPr/>
+          <a:lstStyle/>
+          <a:p>
+            <a:pPr lvl="0" marL="0" indent="0">
+              <a:buNone/>
+            </a:pPr>
+            <a:r>
+              <a:rPr/>
+              <a:t>“Studies suggest many African American faith leaders are willing to provide HIV education …(14–17); however, their reported challenges in doing so have included church capacity issues (e.g., lack of HIV training, church-appropriate HIV materials, time, and resources), controversial church issues (e.g., condom use, premarital sex, homophobia), and HIV stigma (18–22).”</a:t>
+            </a:r>
+          </a:p>
+          <a:p>
+            <a:pPr lvl="1"/>
+            <a:r>
+              <a:rPr/>
+              <a:t>Berkley-Patton et al 2016.</a:t>
+            </a:r>
+          </a:p>
+        </p:txBody>
+      </p:sp>
+    </p:spTree>
+  </p:cSld>
+</p:sld>
+</file>
+
+<file path=ppt/slides/slide16.xml><?xml version="1.0" encoding="utf-8"?>
+<p:sld xmlns:a="http://schemas.openxmlformats.org/drawingml/2006/main" xmlns:r="http://schemas.openxmlformats.org/officeDocument/2006/relationships" xmlns:p="http://schemas.openxmlformats.org/presentationml/2006/main">
+  <p:cSld>
+    <p:spTree>
+      <p:nvGrpSpPr>
+        <p:cNvPr id="1" name=""/>
+        <p:cNvGrpSpPr/>
+        <p:nvPr/>
+      </p:nvGrpSpPr>
+      <p:grpSpPr>
+        <a:xfrm>
+          <a:off x="0" y="0"/>
+          <a:ext cx="0" cy="0"/>
+          <a:chOff x="0" y="0"/>
+          <a:chExt cx="0" cy="0"/>
+        </a:xfrm>
+      </p:grpSpPr>
+      <p:sp>
+        <p:nvSpPr>
+          <p:cNvPr id="2" name="Title 1"/>
+          <p:cNvSpPr>
+            <a:spLocks noGrp="1"/>
+          </p:cNvSpPr>
+          <p:nvPr>
+            <p:ph type="title"/>
+          </p:nvPr>
+        </p:nvSpPr>
+        <p:spPr/>
+        <p:txBody>
+          <a:bodyPr/>
+          <a:lstStyle/>
+          <a:p>
+            <a:pPr lvl="0" marL="0" indent="0">
+              <a:buNone/>
+            </a:pPr>
+            <a:r>
+              <a:rPr/>
+              <a:t>Break</a:t>
+            </a:r>
+            <a:r>
+              <a:rPr/>
+              <a:t> </a:t>
+            </a:r>
+            <a:r>
+              <a:rPr/>
+              <a:t>#2</a:t>
+            </a:r>
+          </a:p>
+        </p:txBody>
+      </p:sp>
+      <p:sp>
+        <p:nvSpPr>
+          <p:cNvPr id="3" name="Content Placeholder 2"/>
+          <p:cNvSpPr>
+            <a:spLocks noGrp="1"/>
+          </p:cNvSpPr>
+          <p:nvPr>
+            <p:ph idx="1"/>
+          </p:nvPr>
+        </p:nvSpPr>
+        <p:spPr/>
+        <p:txBody>
+          <a:bodyPr/>
+          <a:lstStyle/>
+          <a:p>
+            <a:pPr lvl="1"/>
+            <a:r>
+              <a:rPr/>
+              <a:t>What have you learned?</a:t>
+            </a:r>
+          </a:p>
+          <a:p>
+            <a:pPr lvl="2"/>
+            <a:r>
+              <a:rPr/>
+              <a:t>Organizing your literature review</a:t>
+            </a:r>
+          </a:p>
+          <a:p>
+            <a:pPr lvl="1"/>
+            <a:r>
+              <a:rPr/>
+              <a:t>What’s next</a:t>
+            </a:r>
+          </a:p>
+          <a:p>
+            <a:pPr lvl="2"/>
+            <a:r>
+              <a:rPr/>
+              <a:t>Evaluating individual articles</a:t>
+            </a:r>
+          </a:p>
+        </p:txBody>
+      </p:sp>
+    </p:spTree>
+  </p:cSld>
+</p:sld>
+</file>
+
+<file path=ppt/slides/slide17.xml><?xml version="1.0" encoding="utf-8"?>
+<p:sld xmlns:a="http://schemas.openxmlformats.org/drawingml/2006/main" xmlns:r="http://schemas.openxmlformats.org/officeDocument/2006/relationships" xmlns:p="http://schemas.openxmlformats.org/presentationml/2006/main">
+  <p:cSld>
+    <p:spTree>
+      <p:nvGrpSpPr>
+        <p:cNvPr id="1" name=""/>
+        <p:cNvGrpSpPr/>
+        <p:nvPr/>
+      </p:nvGrpSpPr>
+      <p:grpSpPr>
+        <a:xfrm>
+          <a:off x="0" y="0"/>
+          <a:ext cx="0" cy="0"/>
+          <a:chOff x="0" y="0"/>
+          <a:chExt cx="0" cy="0"/>
+        </a:xfrm>
+      </p:grpSpPr>
+      <p:sp>
+        <p:nvSpPr>
+          <p:cNvPr id="2" name="Title 1"/>
+          <p:cNvSpPr>
+            <a:spLocks noGrp="1"/>
+          </p:cNvSpPr>
+          <p:nvPr>
+            <p:ph type="title"/>
+          </p:nvPr>
+        </p:nvSpPr>
+        <p:spPr/>
+        <p:txBody>
+          <a:bodyPr/>
+          <a:lstStyle/>
+          <a:p>
+            <a:pPr lvl="0" marL="0" indent="0">
+              <a:buNone/>
+            </a:pPr>
+            <a:r>
+              <a:rPr/>
+              <a:t>Evaluating</a:t>
+            </a:r>
+          </a:p>
+        </p:txBody>
+      </p:sp>
+      <p:sp>
+        <p:nvSpPr>
+          <p:cNvPr id="3" name="Content Placeholder 2"/>
+          <p:cNvSpPr>
+            <a:spLocks noGrp="1"/>
+          </p:cNvSpPr>
+          <p:nvPr>
+            <p:ph idx="1"/>
+          </p:nvPr>
+        </p:nvSpPr>
+        <p:spPr/>
+        <p:txBody>
+          <a:bodyPr/>
+          <a:lstStyle/>
+          <a:p>
+            <a:pPr lvl="1"/>
+            <a:r>
+              <a:rPr/>
+              <a:t>No “bad” or “good” studies</a:t>
+            </a:r>
+          </a:p>
+          <a:p>
+            <a:pPr lvl="2"/>
+            <a:r>
+              <a:rPr/>
+              <a:t>Degrees of evidence</a:t>
+            </a:r>
+          </a:p>
+          <a:p>
+            <a:pPr lvl="2"/>
+            <a:r>
+              <a:rPr/>
+              <a:t>Weak studies better than no studies</a:t>
+            </a:r>
+          </a:p>
+          <a:p>
+            <a:pPr lvl="1"/>
+            <a:r>
+              <a:rPr/>
+              <a:t>Questions you can ask</a:t>
+            </a:r>
+          </a:p>
+          <a:p>
+            <a:pPr lvl="2"/>
+            <a:r>
+              <a:rPr/>
+              <a:t>Do the results support the conclusion?</a:t>
+            </a:r>
+          </a:p>
+          <a:p>
+            <a:pPr lvl="2"/>
+            <a:r>
+              <a:rPr/>
+              <a:t>What are the stated limitations?</a:t>
+            </a:r>
+          </a:p>
+          <a:p>
+            <a:pPr lvl="2"/>
+            <a:r>
+              <a:rPr/>
+              <a:t>Can you place this article in “the bigger picture”?</a:t>
+            </a:r>
+          </a:p>
+        </p:txBody>
+      </p:sp>
+    </p:spTree>
+  </p:cSld>
+</p:sld>
+</file>
+
+<file path=ppt/slides/slide18.xml><?xml version="1.0" encoding="utf-8"?>
+<p:sld xmlns:a="http://schemas.openxmlformats.org/drawingml/2006/main" xmlns:r="http://schemas.openxmlformats.org/officeDocument/2006/relationships" xmlns:p="http://schemas.openxmlformats.org/presentationml/2006/main">
+  <p:cSld>
+    <p:spTree>
+      <p:nvGrpSpPr>
+        <p:cNvPr id="1" name=""/>
+        <p:cNvGrpSpPr/>
+        <p:nvPr/>
+      </p:nvGrpSpPr>
+      <p:grpSpPr>
+        <a:xfrm>
+          <a:off x="0" y="0"/>
+          <a:ext cx="0" cy="0"/>
+          <a:chOff x="0" y="0"/>
+          <a:chExt cx="0" cy="0"/>
+        </a:xfrm>
+      </p:grpSpPr>
+      <p:sp>
+        <p:nvSpPr>
+          <p:cNvPr id="2" name="Title 1"/>
+          <p:cNvSpPr>
+            <a:spLocks noGrp="1"/>
+          </p:cNvSpPr>
+          <p:nvPr>
+            <p:ph type="title"/>
+          </p:nvPr>
+        </p:nvSpPr>
+        <p:spPr/>
+        <p:txBody>
+          <a:bodyPr/>
+          <a:lstStyle/>
+          <a:p>
+            <a:pPr lvl="0" marL="0" indent="0">
+              <a:buNone/>
+            </a:pPr>
+            <a:r>
+              <a:rPr/>
+              <a:t>Evaluating</a:t>
+            </a:r>
+          </a:p>
+        </p:txBody>
+      </p:sp>
+      <p:sp>
+        <p:nvSpPr>
+          <p:cNvPr id="3" name="Content Placeholder 2"/>
+          <p:cNvSpPr>
+            <a:spLocks noGrp="1"/>
+          </p:cNvSpPr>
+          <p:nvPr>
+            <p:ph idx="1"/>
+          </p:nvPr>
+        </p:nvSpPr>
+        <p:spPr/>
+        <p:txBody>
+          <a:bodyPr/>
+          <a:lstStyle/>
+          <a:p>
+            <a:pPr lvl="1"/>
+            <a:r>
+              <a:rPr/>
+              <a:t>Positive features</a:t>
+            </a:r>
+          </a:p>
+          <a:p>
+            <a:pPr lvl="2"/>
+            <a:r>
+              <a:rPr/>
+              <a:t>Randomization</a:t>
+            </a:r>
+          </a:p>
+          <a:p>
+            <a:pPr lvl="2"/>
+            <a:r>
+              <a:rPr/>
+              <a:t>Blinding</a:t>
+            </a:r>
+          </a:p>
+          <a:p>
+            <a:pPr lvl="2"/>
+            <a:r>
+              <a:rPr/>
+              <a:t>Strong effect</a:t>
+            </a:r>
+          </a:p>
+          <a:p>
+            <a:pPr lvl="2"/>
+            <a:r>
+              <a:rPr/>
+              <a:t>Plausible mechanism</a:t>
+            </a:r>
+          </a:p>
+        </p:txBody>
+      </p:sp>
+    </p:spTree>
+  </p:cSld>
+</p:sld>
+</file>
+
+<file path=ppt/slides/slide19.xml><?xml version="1.0" encoding="utf-8"?>
+<p:sld xmlns:a="http://schemas.openxmlformats.org/drawingml/2006/main" xmlns:r="http://schemas.openxmlformats.org/officeDocument/2006/relationships" xmlns:p="http://schemas.openxmlformats.org/presentationml/2006/main">
+  <p:cSld>
+    <p:spTree>
+      <p:nvGrpSpPr>
+        <p:cNvPr id="1" name=""/>
+        <p:cNvGrpSpPr/>
+        <p:nvPr/>
+      </p:nvGrpSpPr>
+      <p:grpSpPr>
+        <a:xfrm>
+          <a:off x="0" y="0"/>
+          <a:ext cx="0" cy="0"/>
+          <a:chOff x="0" y="0"/>
+          <a:chExt cx="0" cy="0"/>
+        </a:xfrm>
+      </p:grpSpPr>
+      <p:sp>
+        <p:nvSpPr>
+          <p:cNvPr id="2" name="Title 1"/>
+          <p:cNvSpPr>
+            <a:spLocks noGrp="1"/>
+          </p:cNvSpPr>
+          <p:nvPr>
+            <p:ph type="title"/>
+          </p:nvPr>
+        </p:nvSpPr>
+        <p:spPr/>
+        <p:txBody>
+          <a:bodyPr/>
+          <a:lstStyle/>
+          <a:p>
+            <a:pPr lvl="0" marL="0" indent="0">
+              <a:buNone/>
+            </a:pPr>
+            <a:r>
+              <a:rPr/>
+              <a:t>Evaluating</a:t>
+            </a:r>
+          </a:p>
+        </p:txBody>
+      </p:sp>
+      <p:sp>
+        <p:nvSpPr>
+          <p:cNvPr id="3" name="Content Placeholder 2"/>
+          <p:cNvSpPr>
+            <a:spLocks noGrp="1"/>
+          </p:cNvSpPr>
+          <p:nvPr>
+            <p:ph idx="1"/>
+          </p:nvPr>
+        </p:nvSpPr>
+        <p:spPr/>
+        <p:txBody>
+          <a:bodyPr/>
+          <a:lstStyle/>
+          <a:p>
+            <a:pPr lvl="1"/>
+            <a:r>
+              <a:rPr/>
+              <a:t>Negative features</a:t>
+            </a:r>
+          </a:p>
+          <a:p>
+            <a:pPr lvl="2"/>
+            <a:r>
+              <a:rPr/>
+              <a:t>Post hoc changes</a:t>
+            </a:r>
+          </a:p>
+          <a:p>
+            <a:pPr lvl="2"/>
+            <a:r>
+              <a:rPr/>
+              <a:t>High dropout rate</a:t>
+            </a:r>
+          </a:p>
+          <a:p>
+            <a:pPr lvl="2"/>
+            <a:r>
+              <a:rPr/>
+              <a:t>Poor compliance</a:t>
+            </a:r>
+          </a:p>
+          <a:p>
+            <a:pPr lvl="1"/>
+            <a:r>
+              <a:rPr/>
+              <a:t>Things not to fuss over</a:t>
+            </a:r>
+          </a:p>
+          <a:p>
+            <a:pPr lvl="2"/>
+            <a:r>
+              <a:rPr/>
+              <a:t>Quality of the journal</a:t>
+            </a:r>
+          </a:p>
+          <a:p>
+            <a:pPr lvl="2"/>
+            <a:r>
+              <a:rPr/>
+              <a:t>Intention to treat analysis</a:t>
+            </a:r>
+          </a:p>
+        </p:txBody>
+      </p:sp>
+    </p:spTree>
+  </p:cSld>
+</p:sld>
+</file>
+
+<file path=ppt/slides/slide2.xml><?xml version="1.0" encoding="utf-8"?>
+<p:sld xmlns:a="http://schemas.openxmlformats.org/drawingml/2006/main" xmlns:r="http://schemas.openxmlformats.org/officeDocument/2006/relationships" xmlns:p="http://schemas.openxmlformats.org/presentationml/2006/main">
+  <p:cSld>
+    <p:spTree>
+      <p:nvGrpSpPr>
+        <p:cNvPr id="1" name=""/>
+        <p:cNvGrpSpPr/>
+        <p:nvPr/>
+      </p:nvGrpSpPr>
+      <p:grpSpPr>
+        <a:xfrm>
+          <a:off x="0" y="0"/>
+          <a:ext cx="0" cy="0"/>
+          <a:chOff x="0" y="0"/>
+          <a:chExt cx="0" cy="0"/>
+        </a:xfrm>
+      </p:grpSpPr>
+      <p:sp>
+        <p:nvSpPr>
+          <p:cNvPr id="2" name="Title 1"/>
+          <p:cNvSpPr>
+            <a:spLocks noGrp="1"/>
+          </p:cNvSpPr>
+          <p:nvPr>
+            <p:ph type="title"/>
+          </p:nvPr>
+        </p:nvSpPr>
+        <p:spPr/>
+        <p:txBody>
+          <a:bodyPr/>
+          <a:lstStyle/>
+          <a:p>
+            <a:pPr lvl="0" marL="0" indent="0">
+              <a:buNone/>
+            </a:pPr>
+            <a:r>
+              <a:rPr/>
+              <a:t>Learning</a:t>
+            </a:r>
+            <a:r>
+              <a:rPr/>
+              <a:t> </a:t>
+            </a:r>
+            <a:r>
+              <a:rPr/>
+              <a:t>objectives</a:t>
+            </a:r>
+          </a:p>
+        </p:txBody>
+      </p:sp>
+      <p:sp>
+        <p:nvSpPr>
+          <p:cNvPr id="3" name="Content Placeholder 2"/>
+          <p:cNvSpPr>
+            <a:spLocks noGrp="1"/>
+          </p:cNvSpPr>
+          <p:nvPr>
+            <p:ph idx="1"/>
+          </p:nvPr>
+        </p:nvSpPr>
+        <p:spPr/>
+        <p:txBody>
+          <a:bodyPr/>
+          <a:lstStyle/>
+          <a:p>
+            <a:pPr lvl="1">
+              <a:buAutoNum type="arabicPeriod"/>
+            </a:pPr>
+            <a:r>
+              <a:rPr/>
+              <a:t>To define what a literature review is and to contrast it with an annotated bibliography and a systematic overview.</a:t>
+            </a:r>
+          </a:p>
+          <a:p>
+            <a:pPr lvl="1">
+              <a:buAutoNum type="arabicPeriod"/>
+            </a:pPr>
+            <a:r>
+              <a:rPr/>
+              <a:t>To recognize the different approaches to organizing a literature review.</a:t>
+            </a:r>
+          </a:p>
+        </p:txBody>
+      </p:sp>
+    </p:spTree>
+  </p:cSld>
+</p:sld>
+</file>
+
+<file path=ppt/slides/slide20.xml><?xml version="1.0" encoding="utf-8"?>
+<p:sld xmlns:a="http://schemas.openxmlformats.org/drawingml/2006/main" xmlns:r="http://schemas.openxmlformats.org/officeDocument/2006/relationships" xmlns:p="http://schemas.openxmlformats.org/presentationml/2006/main">
+  <p:cSld>
+    <p:spTree>
+      <p:nvGrpSpPr>
+        <p:cNvPr id="1" name=""/>
+        <p:cNvGrpSpPr/>
+        <p:nvPr/>
+      </p:nvGrpSpPr>
+      <p:grpSpPr>
+        <a:xfrm>
+          <a:off x="0" y="0"/>
+          <a:ext cx="0" cy="0"/>
+          <a:chOff x="0" y="0"/>
+          <a:chExt cx="0" cy="0"/>
+        </a:xfrm>
+      </p:grpSpPr>
+      <p:sp>
+        <p:nvSpPr>
+          <p:cNvPr id="2" name="Title 1"/>
+          <p:cNvSpPr>
+            <a:spLocks noGrp="1"/>
+          </p:cNvSpPr>
+          <p:nvPr>
+            <p:ph type="title"/>
+          </p:nvPr>
+        </p:nvSpPr>
+        <p:spPr/>
+        <p:txBody>
+          <a:bodyPr/>
+          <a:lstStyle/>
+          <a:p>
+            <a:pPr lvl="0" marL="0" indent="0">
+              <a:buNone/>
+            </a:pPr>
+            <a:r>
+              <a:rPr/>
+              <a:t>Break</a:t>
+            </a:r>
+            <a:r>
+              <a:rPr/>
+              <a:t> </a:t>
+            </a:r>
+            <a:r>
+              <a:rPr/>
+              <a:t>#3</a:t>
+            </a:r>
+          </a:p>
+        </p:txBody>
+      </p:sp>
+      <p:sp>
+        <p:nvSpPr>
+          <p:cNvPr id="3" name="Content Placeholder 2"/>
+          <p:cNvSpPr>
+            <a:spLocks noGrp="1"/>
+          </p:cNvSpPr>
+          <p:nvPr>
+            <p:ph idx="1"/>
+          </p:nvPr>
+        </p:nvSpPr>
+        <p:spPr/>
+        <p:txBody>
+          <a:bodyPr/>
+          <a:lstStyle/>
+          <a:p>
+            <a:pPr lvl="1"/>
+            <a:r>
+              <a:rPr/>
+              <a:t>What have you learned?</a:t>
+            </a:r>
+          </a:p>
+          <a:p>
+            <a:pPr lvl="2"/>
+            <a:r>
+              <a:rPr/>
+              <a:t>Evaluating individual articles</a:t>
+            </a:r>
+          </a:p>
+          <a:p>
+            <a:pPr lvl="1"/>
+            <a:r>
+              <a:rPr/>
+              <a:t>What’s next</a:t>
+            </a:r>
+          </a:p>
+          <a:p>
+            <a:pPr lvl="2"/>
+            <a:r>
+              <a:rPr/>
+              <a:t>An organizing structure to your literature review</a:t>
+            </a:r>
+          </a:p>
+        </p:txBody>
+      </p:sp>
+    </p:spTree>
+  </p:cSld>
+</p:sld>
+</file>
+
+<file path=ppt/slides/slide21.xml><?xml version="1.0" encoding="utf-8"?>
+<p:sld xmlns:a="http://schemas.openxmlformats.org/drawingml/2006/main" xmlns:r="http://schemas.openxmlformats.org/officeDocument/2006/relationships" xmlns:p="http://schemas.openxmlformats.org/presentationml/2006/main">
+  <p:cSld>
+    <p:spTree>
+      <p:nvGrpSpPr>
+        <p:cNvPr id="1" name=""/>
+        <p:cNvGrpSpPr/>
+        <p:nvPr/>
+      </p:nvGrpSpPr>
+      <p:grpSpPr>
+        <a:xfrm>
+          <a:off x="0" y="0"/>
+          <a:ext cx="0" cy="0"/>
+          <a:chOff x="0" y="0"/>
+          <a:chExt cx="0" cy="0"/>
+        </a:xfrm>
+      </p:grpSpPr>
+      <p:sp>
+        <p:nvSpPr>
+          <p:cNvPr id="2" name="Title 1"/>
+          <p:cNvSpPr>
+            <a:spLocks noGrp="1"/>
+          </p:cNvSpPr>
+          <p:nvPr>
+            <p:ph type="title"/>
+          </p:nvPr>
+        </p:nvSpPr>
+        <p:spPr/>
+        <p:txBody>
+          <a:bodyPr/>
+          <a:lstStyle/>
+          <a:p>
+            <a:pPr lvl="0" marL="0" indent="0">
+              <a:buNone/>
+            </a:pPr>
+            <a:r>
+              <a:rPr/>
+              <a:t>Synthesizing</a:t>
+            </a:r>
+          </a:p>
+        </p:txBody>
+      </p:sp>
+      <p:sp>
+        <p:nvSpPr>
+          <p:cNvPr id="3" name="Content Placeholder 2"/>
+          <p:cNvSpPr>
+            <a:spLocks noGrp="1"/>
+          </p:cNvSpPr>
+          <p:nvPr>
+            <p:ph idx="1"/>
+          </p:nvPr>
+        </p:nvSpPr>
+        <p:spPr/>
+        <p:txBody>
+          <a:bodyPr/>
+          <a:lstStyle/>
+          <a:p>
+            <a:pPr lvl="1"/>
+            <a:r>
+              <a:rPr/>
+              <a:t>Organization of a literature review</a:t>
+            </a:r>
+          </a:p>
+          <a:p>
+            <a:pPr lvl="2"/>
+            <a:r>
+              <a:rPr/>
+              <a:t>Chronologic (warning: can be boring!)</a:t>
+            </a:r>
+          </a:p>
+          <a:p>
+            <a:pPr lvl="2"/>
+            <a:r>
+              <a:rPr/>
+              <a:t>From general to specific</a:t>
+            </a:r>
+          </a:p>
+          <a:p>
+            <a:pPr lvl="2"/>
+            <a:r>
+              <a:rPr/>
+              <a:t>Thematic</a:t>
+            </a:r>
+          </a:p>
+          <a:p>
+            <a:pPr lvl="1"/>
+            <a:r>
+              <a:rPr/>
+              <a:t>End with your research</a:t>
+            </a:r>
+          </a:p>
+        </p:txBody>
+      </p:sp>
+    </p:spTree>
+  </p:cSld>
+</p:sld>
+</file>
+
+<file path=ppt/slides/slide22.xml><?xml version="1.0" encoding="utf-8"?>
+<p:sld xmlns:a="http://schemas.openxmlformats.org/drawingml/2006/main" xmlns:r="http://schemas.openxmlformats.org/officeDocument/2006/relationships" xmlns:p="http://schemas.openxmlformats.org/presentationml/2006/main">
+  <p:cSld>
+    <p:spTree>
+      <p:nvGrpSpPr>
+        <p:cNvPr id="1" name=""/>
+        <p:cNvGrpSpPr/>
+        <p:nvPr/>
+      </p:nvGrpSpPr>
+      <p:grpSpPr>
+        <a:xfrm>
+          <a:off x="0" y="0"/>
+          <a:ext cx="0" cy="0"/>
+          <a:chOff x="0" y="0"/>
+          <a:chExt cx="0" cy="0"/>
+        </a:xfrm>
+      </p:grpSpPr>
+      <p:sp>
+        <p:nvSpPr>
+          <p:cNvPr id="2" name="Title 1"/>
+          <p:cNvSpPr>
+            <a:spLocks noGrp="1"/>
+          </p:cNvSpPr>
+          <p:nvPr>
+            <p:ph type="title"/>
+          </p:nvPr>
+        </p:nvSpPr>
+        <p:spPr/>
+        <p:txBody>
+          <a:bodyPr/>
+          <a:lstStyle/>
+          <a:p>
+            <a:pPr lvl="0" marL="0" indent="0">
+              <a:buNone/>
+            </a:pPr>
+            <a:r>
+              <a:rPr/>
+              <a:t>Example</a:t>
+            </a:r>
+            <a:r>
+              <a:rPr/>
+              <a:t> </a:t>
+            </a:r>
+            <a:r>
+              <a:rPr/>
+              <a:t>of</a:t>
+            </a:r>
+            <a:r>
+              <a:rPr/>
+              <a:t> </a:t>
+            </a:r>
+            <a:r>
+              <a:rPr/>
+              <a:t>general</a:t>
+            </a:r>
+            <a:r>
+              <a:rPr/>
+              <a:t> </a:t>
+            </a:r>
+            <a:r>
+              <a:rPr/>
+              <a:t>to</a:t>
+            </a:r>
+            <a:r>
+              <a:rPr/>
+              <a:t> </a:t>
+            </a:r>
+            <a:r>
+              <a:rPr/>
+              <a:t>specific</a:t>
+            </a:r>
+          </a:p>
+        </p:txBody>
+      </p:sp>
+      <p:sp>
+        <p:nvSpPr>
+          <p:cNvPr id="3" name="Content Placeholder 2"/>
+          <p:cNvSpPr>
+            <a:spLocks noGrp="1"/>
+          </p:cNvSpPr>
+          <p:nvPr>
+            <p:ph idx="1"/>
+          </p:nvPr>
+        </p:nvSpPr>
+        <p:spPr/>
+        <p:txBody>
+          <a:bodyPr/>
+          <a:lstStyle/>
+          <a:p>
+            <a:pPr lvl="0" marL="0" indent="0">
+              <a:buNone/>
+            </a:pPr>
+            <a:r>
+              <a:rPr/>
+              <a:t>1st paragraph. “African Americans represent nearly 45% of new HIV cases each year (1–2).”</a:t>
+            </a:r>
+          </a:p>
+          <a:p>
+            <a:pPr lvl="0" marL="0" indent="0">
+              <a:buNone/>
+            </a:pPr>
+            <a:r>
+              <a:rPr/>
+              <a:t>2nd paragraph. “The Black Church is a powerful institution with a history of mobilizing African American communities for social change (5)…”</a:t>
+            </a:r>
+          </a:p>
+          <a:p>
+            <a:pPr lvl="0" marL="0" indent="0">
+              <a:buNone/>
+            </a:pPr>
+            <a:r>
+              <a:rPr/>
+              <a:t>3rd paragraph. “Studies suggest many African American faith leaders are willing to provide HIV education and testing for their church/community members (14–17)…”</a:t>
+            </a:r>
+          </a:p>
+          <a:p>
+            <a:pPr lvl="1"/>
+            <a:r>
+              <a:rPr/>
+              <a:t>Berkley-Patton et al 2016.</a:t>
+            </a:r>
+          </a:p>
+        </p:txBody>
+      </p:sp>
+    </p:spTree>
+  </p:cSld>
+</p:sld>
+</file>
+
+<file path=ppt/slides/slide23.xml><?xml version="1.0" encoding="utf-8"?>
+<p:sld xmlns:a="http://schemas.openxmlformats.org/drawingml/2006/main" xmlns:r="http://schemas.openxmlformats.org/officeDocument/2006/relationships" xmlns:p="http://schemas.openxmlformats.org/presentationml/2006/main">
+  <p:cSld>
+    <p:spTree>
+      <p:nvGrpSpPr>
+        <p:cNvPr id="1" name=""/>
+        <p:cNvGrpSpPr/>
+        <p:nvPr/>
+      </p:nvGrpSpPr>
+      <p:grpSpPr>
+        <a:xfrm>
+          <a:off x="0" y="0"/>
+          <a:ext cx="0" cy="0"/>
+          <a:chOff x="0" y="0"/>
+          <a:chExt cx="0" cy="0"/>
+        </a:xfrm>
+      </p:grpSpPr>
+      <p:sp>
+        <p:nvSpPr>
+          <p:cNvPr id="2" name="Title 1"/>
+          <p:cNvSpPr>
+            <a:spLocks noGrp="1"/>
+          </p:cNvSpPr>
+          <p:nvPr>
+            <p:ph type="title"/>
+          </p:nvPr>
+        </p:nvSpPr>
+        <p:spPr/>
+        <p:txBody>
+          <a:bodyPr/>
+          <a:lstStyle/>
+          <a:p>
+            <a:pPr lvl="0" marL="0" indent="0">
+              <a:buNone/>
+            </a:pPr>
+            <a:r>
+              <a:rPr/>
+              <a:t>Synthesizing</a:t>
+            </a:r>
+          </a:p>
+        </p:txBody>
+      </p:sp>
+      <p:sp>
+        <p:nvSpPr>
+          <p:cNvPr id="3" name="Content Placeholder 2"/>
+          <p:cNvSpPr>
+            <a:spLocks noGrp="1"/>
+          </p:cNvSpPr>
+          <p:nvPr>
+            <p:ph idx="1"/>
+          </p:nvPr>
+        </p:nvSpPr>
+        <p:spPr/>
+        <p:txBody>
+          <a:bodyPr/>
+          <a:lstStyle/>
+          <a:p>
+            <a:pPr lvl="1"/>
+            <a:r>
+              <a:rPr/>
+              <a:t>Possible themes</a:t>
+            </a:r>
+          </a:p>
+          <a:p>
+            <a:pPr lvl="2"/>
+            <a:r>
+              <a:rPr/>
+              <a:t>Consensus, disagreements, the unknown</a:t>
+            </a:r>
+          </a:p>
+          <a:p>
+            <a:pPr lvl="2"/>
+            <a:r>
+              <a:rPr/>
+              <a:t>Problem, old remedies, new needs</a:t>
+            </a:r>
+          </a:p>
+          <a:p>
+            <a:pPr lvl="2"/>
+            <a:r>
+              <a:rPr/>
+              <a:t>Supportive, then non-supportive</a:t>
+            </a:r>
+          </a:p>
+          <a:p>
+            <a:pPr lvl="2"/>
+            <a:r>
+              <a:rPr/>
+              <a:t>Methodologies</a:t>
+            </a:r>
+          </a:p>
+          <a:p>
+            <a:pPr lvl="2"/>
+            <a:r>
+              <a:rPr/>
+              <a:t>Theories</a:t>
+            </a:r>
+          </a:p>
+          <a:p>
+            <a:pPr lvl="2"/>
+            <a:r>
+              <a:rPr/>
+              <a:t>Schools of thought</a:t>
+            </a:r>
+          </a:p>
+        </p:txBody>
+      </p:sp>
+    </p:spTree>
+  </p:cSld>
+</p:sld>
+</file>
+
+<file path=ppt/slides/slide24.xml><?xml version="1.0" encoding="utf-8"?>
+<p:sld xmlns:a="http://schemas.openxmlformats.org/drawingml/2006/main" xmlns:r="http://schemas.openxmlformats.org/officeDocument/2006/relationships" xmlns:p="http://schemas.openxmlformats.org/presentationml/2006/main">
+  <p:cSld>
+    <p:spTree>
+      <p:nvGrpSpPr>
+        <p:cNvPr id="1" name=""/>
+        <p:cNvGrpSpPr/>
+        <p:nvPr/>
+      </p:nvGrpSpPr>
+      <p:grpSpPr>
+        <a:xfrm>
+          <a:off x="0" y="0"/>
+          <a:ext cx="0" cy="0"/>
+          <a:chOff x="0" y="0"/>
+          <a:chExt cx="0" cy="0"/>
+        </a:xfrm>
+      </p:grpSpPr>
+      <p:sp>
+        <p:nvSpPr>
+          <p:cNvPr id="2" name="Title 1"/>
+          <p:cNvSpPr>
+            <a:spLocks noGrp="1"/>
+          </p:cNvSpPr>
+          <p:nvPr>
+            <p:ph type="title"/>
+          </p:nvPr>
+        </p:nvSpPr>
+        <p:spPr/>
+        <p:txBody>
+          <a:bodyPr/>
+          <a:lstStyle/>
+          <a:p>
+            <a:pPr lvl="0" marL="0" indent="0">
+              <a:buNone/>
+            </a:pPr>
+            <a:r>
+              <a:rPr/>
+              <a:t>Some</a:t>
+            </a:r>
+            <a:r>
+              <a:rPr/>
+              <a:t> </a:t>
+            </a:r>
+            <a:r>
+              <a:rPr/>
+              <a:t>last</a:t>
+            </a:r>
+            <a:r>
+              <a:rPr/>
+              <a:t> </a:t>
+            </a:r>
+            <a:r>
+              <a:rPr/>
+              <a:t>thoughts</a:t>
+            </a:r>
+          </a:p>
+        </p:txBody>
+      </p:sp>
+      <p:sp>
+        <p:nvSpPr>
+          <p:cNvPr id="3" name="Content Placeholder 2"/>
+          <p:cNvSpPr>
+            <a:spLocks noGrp="1"/>
+          </p:cNvSpPr>
+          <p:nvPr>
+            <p:ph idx="1"/>
+          </p:nvPr>
+        </p:nvSpPr>
+        <p:spPr/>
+        <p:txBody>
+          <a:bodyPr/>
+          <a:lstStyle/>
+          <a:p>
+            <a:pPr lvl="1"/>
+            <a:r>
+              <a:rPr/>
+              <a:t>Revisit your literature review after writing the discussion section of your paper.</a:t>
+            </a:r>
+          </a:p>
+          <a:p>
+            <a:pPr lvl="1"/>
+            <a:r>
+              <a:rPr/>
+              <a:t>Standard format for a thesis.</a:t>
+            </a:r>
+          </a:p>
+        </p:txBody>
+      </p:sp>
+    </p:spTree>
+  </p:cSld>
+</p:sld>
+</file>
+
+<file path=ppt/slides/slide3.xml><?xml version="1.0" encoding="utf-8"?>
+<p:sld xmlns:a="http://schemas.openxmlformats.org/drawingml/2006/main" xmlns:r="http://schemas.openxmlformats.org/officeDocument/2006/relationships" xmlns:p="http://schemas.openxmlformats.org/presentationml/2006/main">
+  <p:cSld>
+    <p:spTree>
+      <p:nvGrpSpPr>
+        <p:cNvPr id="1" name=""/>
+        <p:cNvGrpSpPr/>
+        <p:nvPr/>
+      </p:nvGrpSpPr>
+      <p:grpSpPr>
+        <a:xfrm>
+          <a:off x="0" y="0"/>
+          <a:ext cx="0" cy="0"/>
+          <a:chOff x="0" y="0"/>
+          <a:chExt cx="0" cy="0"/>
+        </a:xfrm>
+      </p:grpSpPr>
+      <p:sp>
+        <p:nvSpPr>
+          <p:cNvPr id="2" name="Title 1"/>
+          <p:cNvSpPr>
+            <a:spLocks noGrp="1"/>
+          </p:cNvSpPr>
+          <p:nvPr>
+            <p:ph type="title"/>
+          </p:nvPr>
+        </p:nvSpPr>
+        <p:spPr/>
+        <p:txBody>
+          <a:bodyPr/>
+          <a:lstStyle/>
+          <a:p>
+            <a:pPr lvl="0" marL="0" indent="0">
+              <a:buNone/>
+            </a:pPr>
+            <a:r>
+              <a:rPr/>
+              <a:t>What</a:t>
+            </a:r>
+            <a:r>
+              <a:rPr/>
+              <a:t> </a:t>
+            </a:r>
+            <a:r>
+              <a:rPr/>
+              <a:t>is</a:t>
+            </a:r>
+            <a:r>
+              <a:rPr/>
+              <a:t> </a:t>
+            </a:r>
+            <a:r>
+              <a:rPr/>
+              <a:t>a</a:t>
+            </a:r>
+            <a:r>
+              <a:rPr/>
+              <a:t> </a:t>
+            </a:r>
+            <a:r>
+              <a:rPr/>
+              <a:t>literature</a:t>
+            </a:r>
+            <a:r>
+              <a:rPr/>
+              <a:t> </a:t>
+            </a:r>
+            <a:r>
+              <a:rPr/>
+              <a:t>review</a:t>
+            </a:r>
+          </a:p>
+        </p:txBody>
+      </p:sp>
+      <p:sp>
+        <p:nvSpPr>
+          <p:cNvPr id="3" name="Content Placeholder 2"/>
+          <p:cNvSpPr>
+            <a:spLocks noGrp="1"/>
+          </p:cNvSpPr>
+          <p:nvPr>
+            <p:ph idx="1"/>
+          </p:nvPr>
+        </p:nvSpPr>
+        <p:spPr/>
+        <p:txBody>
+          <a:bodyPr/>
+          <a:lstStyle/>
+          <a:p>
+            <a:pPr lvl="0" marL="0" indent="0">
+              <a:buNone/>
+            </a:pPr>
+            <a:r>
+              <a:rPr/>
+              <a:t>Definition (from your book): “An interpretation of a selection of documents (published or unpublished) on a specific topic that involves summarization, analysis, evaluation, and synthesis of the documents.”</a:t>
+            </a:r>
+          </a:p>
+        </p:txBody>
+      </p:sp>
+    </p:spTree>
+  </p:cSld>
+</p:sld>
+</file>
+
+<file path=ppt/slides/slide4.xml><?xml version="1.0" encoding="utf-8"?>
+<p:sld xmlns:a="http://schemas.openxmlformats.org/drawingml/2006/main" xmlns:r="http://schemas.openxmlformats.org/officeDocument/2006/relationships" xmlns:p="http://schemas.openxmlformats.org/presentationml/2006/main">
+  <p:cSld>
+    <p:spTree>
+      <p:nvGrpSpPr>
+        <p:cNvPr id="1" name=""/>
+        <p:cNvGrpSpPr/>
+        <p:nvPr/>
+      </p:nvGrpSpPr>
+      <p:grpSpPr>
+        <a:xfrm>
+          <a:off x="0" y="0"/>
+          <a:ext cx="0" cy="0"/>
+          <a:chOff x="0" y="0"/>
+          <a:chExt cx="0" cy="0"/>
+        </a:xfrm>
+      </p:grpSpPr>
+      <p:sp>
+        <p:nvSpPr>
+          <p:cNvPr id="2" name="Title 1"/>
+          <p:cNvSpPr>
+            <a:spLocks noGrp="1"/>
+          </p:cNvSpPr>
+          <p:nvPr>
+            <p:ph type="title"/>
+          </p:nvPr>
+        </p:nvSpPr>
+        <p:spPr/>
+        <p:txBody>
+          <a:bodyPr/>
+          <a:lstStyle/>
+          <a:p>
+            <a:pPr lvl="0" marL="0" indent="0">
+              <a:buNone/>
+            </a:pPr>
+            <a:r>
+              <a:rPr/>
+              <a:t>Why</a:t>
+            </a:r>
+            <a:r>
+              <a:rPr/>
+              <a:t> </a:t>
+            </a:r>
+            <a:r>
+              <a:rPr/>
+              <a:t>do</a:t>
+            </a:r>
+            <a:r>
+              <a:rPr/>
+              <a:t> </a:t>
+            </a:r>
+            <a:r>
+              <a:rPr/>
+              <a:t>a</a:t>
+            </a:r>
+            <a:r>
+              <a:rPr/>
+              <a:t> </a:t>
+            </a:r>
+            <a:r>
+              <a:rPr/>
+              <a:t>literature</a:t>
+            </a:r>
+            <a:r>
+              <a:rPr/>
+              <a:t> </a:t>
+            </a:r>
+            <a:r>
+              <a:rPr/>
+              <a:t>review?</a:t>
+            </a:r>
+          </a:p>
+        </p:txBody>
+      </p:sp>
+      <p:sp>
+        <p:nvSpPr>
+          <p:cNvPr id="3" name="Content Placeholder 2"/>
+          <p:cNvSpPr>
+            <a:spLocks noGrp="1"/>
+          </p:cNvSpPr>
+          <p:nvPr>
+            <p:ph idx="1"/>
+          </p:nvPr>
+        </p:nvSpPr>
+        <p:spPr/>
+        <p:txBody>
+          <a:bodyPr/>
+          <a:lstStyle/>
+          <a:p>
+            <a:pPr lvl="0" marL="0" indent="0">
+              <a:buNone/>
+            </a:pPr>
+            <a:r>
+              <a:rPr/>
+              <a:t>(From your book)</a:t>
+            </a:r>
+          </a:p>
+          <a:p>
+            <a:pPr lvl="1"/>
+            <a:r>
+              <a:rPr/>
+              <a:t>“Identify gaps in the literature”</a:t>
+            </a:r>
+          </a:p>
+          <a:p>
+            <a:pPr lvl="1"/>
+            <a:r>
+              <a:rPr/>
+              <a:t>“Help to select appropriate methods for your new topic”</a:t>
+            </a:r>
+          </a:p>
+          <a:p>
+            <a:pPr lvl="1"/>
+            <a:r>
+              <a:rPr/>
+              <a:t>“Describe the inferences that have come from past research”</a:t>
+            </a:r>
+          </a:p>
+          <a:p>
+            <a:pPr lvl="1"/>
+            <a:r>
+              <a:rPr/>
+              <a:t>Other reasons???</a:t>
+            </a:r>
+          </a:p>
+          <a:p>
+            <a:pPr lvl="2"/>
+            <a:r>
+              <a:rPr/>
+              <a:t>Because you have to.</a:t>
+            </a:r>
+          </a:p>
+        </p:txBody>
+      </p:sp>
+    </p:spTree>
+  </p:cSld>
+</p:sld>
+</file>
+
+<file path=ppt/slides/slide5.xml><?xml version="1.0" encoding="utf-8"?>
+<p:sld xmlns:a="http://schemas.openxmlformats.org/drawingml/2006/main" xmlns:r="http://schemas.openxmlformats.org/officeDocument/2006/relationships" xmlns:p="http://schemas.openxmlformats.org/presentationml/2006/main">
+  <p:cSld>
+    <p:spTree>
+      <p:nvGrpSpPr>
+        <p:cNvPr id="1" name=""/>
+        <p:cNvGrpSpPr/>
+        <p:nvPr/>
+      </p:nvGrpSpPr>
+      <p:grpSpPr>
+        <a:xfrm>
+          <a:off x="0" y="0"/>
+          <a:ext cx="0" cy="0"/>
+          <a:chOff x="0" y="0"/>
+          <a:chExt cx="0" cy="0"/>
+        </a:xfrm>
+      </p:grpSpPr>
+      <p:sp>
+        <p:nvSpPr>
+          <p:cNvPr id="2" name="Title 1"/>
+          <p:cNvSpPr>
+            <a:spLocks noGrp="1"/>
+          </p:cNvSpPr>
+          <p:nvPr>
+            <p:ph type="title"/>
+          </p:nvPr>
+        </p:nvSpPr>
+        <p:spPr/>
+        <p:txBody>
+          <a:bodyPr/>
+          <a:lstStyle/>
+          <a:p>
+            <a:pPr lvl="0" marL="0" indent="0">
+              <a:buNone/>
+            </a:pPr>
+            <a:r>
+              <a:rPr/>
+              <a:t>Contrasts</a:t>
+            </a:r>
+            <a:r>
+              <a:rPr/>
+              <a:t> </a:t>
+            </a:r>
+            <a:r>
+              <a:rPr/>
+              <a:t>to</a:t>
+            </a:r>
+            <a:r>
+              <a:rPr/>
+              <a:t> </a:t>
+            </a:r>
+            <a:r>
+              <a:rPr/>
+              <a:t>the</a:t>
+            </a:r>
+            <a:r>
+              <a:rPr/>
+              <a:t> </a:t>
+            </a:r>
+            <a:r>
+              <a:rPr/>
+              <a:t>literature</a:t>
+            </a:r>
+            <a:r>
+              <a:rPr/>
+              <a:t> </a:t>
+            </a:r>
+            <a:r>
+              <a:rPr/>
+              <a:t>review</a:t>
+            </a:r>
+          </a:p>
+        </p:txBody>
+      </p:sp>
+      <p:sp>
+        <p:nvSpPr>
+          <p:cNvPr id="3" name="Content Placeholder 2"/>
+          <p:cNvSpPr>
+            <a:spLocks noGrp="1"/>
+          </p:cNvSpPr>
+          <p:nvPr>
+            <p:ph idx="1"/>
+          </p:nvPr>
+        </p:nvSpPr>
+        <p:spPr/>
+        <p:txBody>
+          <a:bodyPr/>
+          <a:lstStyle/>
+          <a:p>
+            <a:pPr lvl="1"/>
+            <a:r>
+              <a:rPr/>
+              <a:t>Annotated bibliography</a:t>
+            </a:r>
+          </a:p>
+          <a:p>
+            <a:pPr lvl="2"/>
+            <a:r>
+              <a:rPr/>
+              <a:t>Also requires summarization</a:t>
+            </a:r>
+          </a:p>
+          <a:p>
+            <a:pPr lvl="2"/>
+            <a:r>
+              <a:rPr/>
+              <a:t>Often requires analysis and evaluation</a:t>
+            </a:r>
+          </a:p>
+          <a:p>
+            <a:pPr lvl="2"/>
+            <a:r>
+              <a:rPr/>
+              <a:t>Lacks synthesis (no organization)</a:t>
+            </a:r>
+          </a:p>
+          <a:p>
+            <a:pPr lvl="2"/>
+            <a:r>
+              <a:rPr/>
+              <a:t>Strives for completeness</a:t>
+            </a:r>
+          </a:p>
+        </p:txBody>
+      </p:sp>
+    </p:spTree>
+  </p:cSld>
+</p:sld>
+</file>
+
+<file path=ppt/slides/slide6.xml><?xml version="1.0" encoding="utf-8"?>
+<p:sld xmlns:a="http://schemas.openxmlformats.org/drawingml/2006/main" xmlns:r="http://schemas.openxmlformats.org/officeDocument/2006/relationships" xmlns:p="http://schemas.openxmlformats.org/presentationml/2006/main">
+  <p:cSld>
+    <p:spTree>
+      <p:nvGrpSpPr>
+        <p:cNvPr id="1" name=""/>
+        <p:cNvGrpSpPr/>
+        <p:nvPr/>
+      </p:nvGrpSpPr>
+      <p:grpSpPr>
+        <a:xfrm>
+          <a:off x="0" y="0"/>
+          <a:ext cx="0" cy="0"/>
+          <a:chOff x="0" y="0"/>
+          <a:chExt cx="0" cy="0"/>
+        </a:xfrm>
+      </p:grpSpPr>
+      <p:sp>
+        <p:nvSpPr>
+          <p:cNvPr id="2" name="Title 1"/>
+          <p:cNvSpPr>
+            <a:spLocks noGrp="1"/>
+          </p:cNvSpPr>
+          <p:nvPr>
+            <p:ph type="title"/>
+          </p:nvPr>
+        </p:nvSpPr>
+        <p:spPr/>
+        <p:txBody>
+          <a:bodyPr/>
+          <a:lstStyle/>
+          <a:p>
+            <a:pPr lvl="0" marL="0" indent="0">
+              <a:buNone/>
+            </a:pPr>
+            <a:r>
+              <a:rPr/>
+              <a:t>Contrasts</a:t>
+            </a:r>
+            <a:r>
+              <a:rPr/>
+              <a:t> </a:t>
+            </a:r>
+            <a:r>
+              <a:rPr/>
+              <a:t>to</a:t>
+            </a:r>
+            <a:r>
+              <a:rPr/>
+              <a:t> </a:t>
+            </a:r>
+            <a:r>
+              <a:rPr/>
+              <a:t>the</a:t>
+            </a:r>
+            <a:r>
+              <a:rPr/>
+              <a:t> </a:t>
+            </a:r>
+            <a:r>
+              <a:rPr/>
+              <a:t>literature</a:t>
+            </a:r>
+            <a:r>
+              <a:rPr/>
+              <a:t> </a:t>
+            </a:r>
+            <a:r>
+              <a:rPr/>
+              <a:t>review</a:t>
+            </a:r>
+          </a:p>
+        </p:txBody>
+      </p:sp>
+      <p:sp>
+        <p:nvSpPr>
+          <p:cNvPr id="3" name="Content Placeholder 2"/>
+          <p:cNvSpPr>
+            <a:spLocks noGrp="1"/>
+          </p:cNvSpPr>
+          <p:nvPr>
+            <p:ph idx="1"/>
+          </p:nvPr>
+        </p:nvSpPr>
+        <p:spPr/>
+        <p:txBody>
+          <a:bodyPr/>
+          <a:lstStyle/>
+          <a:p>
+            <a:pPr lvl="1"/>
+            <a:r>
+              <a:rPr/>
+              <a:t>Systematic overview</a:t>
+            </a:r>
+          </a:p>
+          <a:p>
+            <a:pPr lvl="2"/>
+            <a:r>
+              <a:rPr/>
+              <a:t>Systematic</a:t>
+            </a:r>
+          </a:p>
+          <a:p>
+            <a:pPr lvl="2"/>
+            <a:r>
+              <a:rPr/>
+              <a:t>Exhaustive search</a:t>
+            </a:r>
+          </a:p>
+          <a:p>
+            <a:pPr lvl="2"/>
+            <a:r>
+              <a:rPr/>
+              <a:t>Usually a quantitative summary</a:t>
+            </a:r>
+          </a:p>
+          <a:p>
+            <a:pPr lvl="2"/>
+            <a:r>
+              <a:rPr/>
+              <a:t>Lacks synthesis</a:t>
+            </a:r>
+          </a:p>
+        </p:txBody>
+      </p:sp>
+    </p:spTree>
+  </p:cSld>
+</p:sld>
+</file>
+
+<file path=ppt/slides/slide7.xml><?xml version="1.0" encoding="utf-8"?>
+<p:sld xmlns:a="http://schemas.openxmlformats.org/drawingml/2006/main" xmlns:r="http://schemas.openxmlformats.org/officeDocument/2006/relationships" xmlns:p="http://schemas.openxmlformats.org/presentationml/2006/main">
+  <p:cSld>
+    <p:spTree>
+      <p:nvGrpSpPr>
+        <p:cNvPr id="1" name=""/>
+        <p:cNvGrpSpPr/>
+        <p:nvPr/>
+      </p:nvGrpSpPr>
+      <p:grpSpPr>
+        <a:xfrm>
+          <a:off x="0" y="0"/>
+          <a:ext cx="0" cy="0"/>
+          <a:chOff x="0" y="0"/>
+          <a:chExt cx="0" cy="0"/>
+        </a:xfrm>
+      </p:grpSpPr>
+      <p:sp>
+        <p:nvSpPr>
+          <p:cNvPr id="2" name="Title 1"/>
+          <p:cNvSpPr>
+            <a:spLocks noGrp="1"/>
+          </p:cNvSpPr>
+          <p:nvPr>
+            <p:ph type="title"/>
+          </p:nvPr>
+        </p:nvSpPr>
+        <p:spPr/>
+        <p:txBody>
+          <a:bodyPr/>
+          <a:lstStyle/>
+          <a:p>
+            <a:pPr lvl="0" marL="0" indent="0">
+              <a:buNone/>
+            </a:pPr>
+            <a:r>
+              <a:rPr/>
+              <a:t>Break</a:t>
+            </a:r>
+            <a:r>
+              <a:rPr/>
+              <a:t> </a:t>
+            </a:r>
+            <a:r>
+              <a:rPr/>
+              <a:t>#1</a:t>
+            </a:r>
+          </a:p>
+        </p:txBody>
+      </p:sp>
+      <p:sp>
+        <p:nvSpPr>
+          <p:cNvPr id="3" name="Content Placeholder 2"/>
+          <p:cNvSpPr>
+            <a:spLocks noGrp="1"/>
+          </p:cNvSpPr>
+          <p:nvPr>
+            <p:ph idx="1"/>
+          </p:nvPr>
+        </p:nvSpPr>
+        <p:spPr/>
+        <p:txBody>
+          <a:bodyPr/>
+          <a:lstStyle/>
+          <a:p>
+            <a:pPr lvl="1"/>
+            <a:r>
+              <a:rPr/>
+              <a:t>What have you learned</a:t>
+            </a:r>
+          </a:p>
+          <a:p>
+            <a:pPr lvl="2"/>
+            <a:r>
+              <a:rPr/>
+              <a:t>What is a literature review</a:t>
+            </a:r>
+          </a:p>
+          <a:p>
+            <a:pPr lvl="2"/>
+            <a:r>
+              <a:rPr/>
+              <a:t>Contrasts to systematic overview, annotated bibliography</a:t>
+            </a:r>
+          </a:p>
+          <a:p>
+            <a:pPr lvl="1"/>
+            <a:r>
+              <a:rPr/>
+              <a:t>What’s next</a:t>
+            </a:r>
+          </a:p>
+          <a:p>
+            <a:pPr lvl="2"/>
+            <a:r>
+              <a:rPr/>
+              <a:t>Finding articles for your literature review</a:t>
+            </a:r>
+          </a:p>
+        </p:txBody>
+      </p:sp>
+    </p:spTree>
+  </p:cSld>
+</p:sld>
+</file>
+
+<file path=ppt/slides/slide8.xml><?xml version="1.0" encoding="utf-8"?>
+<p:sld xmlns:a="http://schemas.openxmlformats.org/drawingml/2006/main" xmlns:r="http://schemas.openxmlformats.org/officeDocument/2006/relationships" xmlns:p="http://schemas.openxmlformats.org/presentationml/2006/main">
+  <p:cSld>
+    <p:spTree>
+      <p:nvGrpSpPr>
+        <p:cNvPr id="1" name=""/>
+        <p:cNvGrpSpPr/>
+        <p:nvPr/>
+      </p:nvGrpSpPr>
+      <p:grpSpPr>
+        <a:xfrm>
+          <a:off x="0" y="0"/>
+          <a:ext cx="0" cy="0"/>
+          <a:chOff x="0" y="0"/>
+          <a:chExt cx="0" cy="0"/>
+        </a:xfrm>
+      </p:grpSpPr>
+      <p:sp>
+        <p:nvSpPr>
+          <p:cNvPr id="2" name="Title 1"/>
+          <p:cNvSpPr>
+            <a:spLocks noGrp="1"/>
+          </p:cNvSpPr>
+          <p:nvPr>
+            <p:ph type="title"/>
+          </p:nvPr>
+        </p:nvSpPr>
+        <p:spPr/>
+        <p:txBody>
+          <a:bodyPr/>
+          <a:lstStyle/>
+          <a:p>
+            <a:pPr lvl="0" marL="0" indent="0">
+              <a:buNone/>
+            </a:pPr>
+            <a:r>
+              <a:rPr/>
+              <a:t>Finding</a:t>
+            </a:r>
+            <a:r>
+              <a:rPr/>
+              <a:t> </a:t>
+            </a:r>
+            <a:r>
+              <a:rPr/>
+              <a:t>sources</a:t>
+            </a:r>
+            <a:r>
+              <a:rPr/>
+              <a:t> </a:t>
+            </a:r>
+            <a:r>
+              <a:rPr/>
+              <a:t>for</a:t>
+            </a:r>
+            <a:r>
+              <a:rPr/>
+              <a:t> </a:t>
+            </a:r>
+            <a:r>
+              <a:rPr/>
+              <a:t>your</a:t>
+            </a:r>
+            <a:r>
+              <a:rPr/>
+              <a:t> </a:t>
+            </a:r>
+            <a:r>
+              <a:rPr/>
+              <a:t>literature</a:t>
+            </a:r>
+            <a:r>
+              <a:rPr/>
+              <a:t> </a:t>
+            </a:r>
+            <a:r>
+              <a:rPr/>
+              <a:t>review</a:t>
+            </a:r>
+          </a:p>
+        </p:txBody>
+      </p:sp>
+      <p:sp>
+        <p:nvSpPr>
+          <p:cNvPr id="3" name="Content Placeholder 2"/>
+          <p:cNvSpPr>
+            <a:spLocks noGrp="1"/>
+          </p:cNvSpPr>
+          <p:nvPr>
+            <p:ph idx="1"/>
+          </p:nvPr>
+        </p:nvSpPr>
+        <p:spPr/>
+        <p:txBody>
+          <a:bodyPr/>
+          <a:lstStyle/>
+          <a:p>
+            <a:pPr lvl="1"/>
+            <a:r>
+              <a:rPr/>
+              <a:t>Talk to a librarian</a:t>
+            </a:r>
+          </a:p>
+          <a:p>
+            <a:pPr lvl="1"/>
+            <a:r>
+              <a:rPr/>
+              <a:t>Specify your scope</a:t>
+            </a:r>
+          </a:p>
+          <a:p>
+            <a:pPr lvl="1"/>
+            <a:r>
+              <a:rPr/>
+              <a:t>Use primary sources, peer-reviewed</a:t>
+            </a:r>
+          </a:p>
+          <a:p>
+            <a:pPr lvl="1"/>
+            <a:r>
+              <a:rPr/>
+              <a:t>Talk to a librarian</a:t>
+            </a:r>
+          </a:p>
+          <a:p>
+            <a:pPr lvl="1"/>
+            <a:r>
+              <a:rPr/>
+              <a:t>Snowball sampling</a:t>
+            </a:r>
+          </a:p>
+          <a:p>
+            <a:pPr lvl="1"/>
+            <a:r>
+              <a:rPr/>
+              <a:t>Iterate between writing and searching</a:t>
+            </a:r>
+          </a:p>
+          <a:p>
+            <a:pPr lvl="1"/>
+            <a:r>
+              <a:rPr/>
+              <a:t>Talk to a librarian</a:t>
+            </a:r>
+          </a:p>
+        </p:txBody>
+      </p:sp>
+    </p:spTree>
+  </p:cSld>
+</p:sld>
+</file>
+
+<file path=ppt/slides/slide9.xml><?xml version="1.0" encoding="utf-8"?>
+<p:sld xmlns:a="http://schemas.openxmlformats.org/drawingml/2006/main" xmlns:r="http://schemas.openxmlformats.org/officeDocument/2006/relationships" xmlns:p="http://schemas.openxmlformats.org/presentationml/2006/main">
+  <p:cSld>
+    <p:spTree>
+      <p:nvGrpSpPr>
+        <p:cNvPr id="1" name=""/>
+        <p:cNvGrpSpPr/>
+        <p:nvPr/>
+      </p:nvGrpSpPr>
+      <p:grpSpPr>
+        <a:xfrm>
+          <a:off x="0" y="0"/>
+          <a:ext cx="0" cy="0"/>
+          <a:chOff x="0" y="0"/>
+          <a:chExt cx="0" cy="0"/>
+        </a:xfrm>
+      </p:grpSpPr>
+      <p:sp>
+        <p:nvSpPr>
+          <p:cNvPr id="2" name="Title 1"/>
+          <p:cNvSpPr>
+            <a:spLocks noGrp="1"/>
+          </p:cNvSpPr>
+          <p:nvPr>
+            <p:ph type="title"/>
+          </p:nvPr>
+        </p:nvSpPr>
+        <p:spPr/>
+        <p:txBody>
+          <a:bodyPr/>
+          <a:lstStyle/>
+          <a:p>
+            <a:pPr lvl="0" marL="0" indent="0">
+              <a:buNone/>
+            </a:pPr>
+            <a:r>
+              <a:rPr/>
+              <a:t>Organization</a:t>
+            </a:r>
+          </a:p>
+        </p:txBody>
+      </p:sp>
+      <p:sp>
+        <p:nvSpPr>
+          <p:cNvPr id="3" name="Content Placeholder 2"/>
+          <p:cNvSpPr>
+            <a:spLocks noGrp="1"/>
+          </p:cNvSpPr>
+          <p:nvPr>
+            <p:ph idx="1"/>
+          </p:nvPr>
+        </p:nvSpPr>
+        <p:spPr/>
+        <p:txBody>
+          <a:bodyPr/>
+          <a:lstStyle/>
+          <a:p>
+            <a:pPr lvl="1"/>
+            <a:r>
+              <a:rPr/>
+              <a:t>Note cards</a:t>
+            </a:r>
+          </a:p>
+          <a:p>
+            <a:pPr lvl="1"/>
+            <a:r>
+              <a:rPr/>
+              <a:t>Spreadsheets</a:t>
+            </a:r>
+          </a:p>
+          <a:p>
+            <a:pPr lvl="1"/>
+            <a:r>
+              <a:rPr/>
+              <a:t>Bibliographic software</a:t>
+            </a:r>
+          </a:p>
+          <a:p>
+            <a:pPr lvl="2"/>
+            <a:r>
+              <a:rPr/>
+              <a:t>Endnotes</a:t>
+            </a:r>
+          </a:p>
+          <a:p>
+            <a:pPr lvl="2"/>
+            <a:r>
+              <a:rPr/>
+              <a:t>Zotero</a:t>
+            </a:r>
+          </a:p>
+          <a:p>
+            <a:pPr lvl="2"/>
+            <a:r>
+              <a:rPr/>
+              <a:t>Mendelay</a:t>
+            </a:r>
+          </a:p>
+          <a:p>
+            <a:pPr lvl="2"/>
+            <a:r>
+              <a:rPr/>
+              <a:t>BibTeX</a:t>
+            </a:r>
+          </a:p>
+          <a:p>
+            <a:pPr lvl="1"/>
+            <a:r>
+              <a:rPr/>
+              <a:t>Talk to a librarian</a:t>
             </a:r>
           </a:p>
         </p:txBody>

</xml_diff>

<commit_message>
Added extra break to 5510 video03
</commit_message>
<xml_diff>
--- a/clinical-research-methodology/results/video03-literature-review.pptx
+++ b/clinical-research-methodology/results/video03-literature-review.pptx
@@ -1,11 +1,11 @@
 
 <file path=ppt/presentation.xml><?xml version="1.0" encoding="utf-8"?>
-<p:presentation xmlns:a="http://schemas.openxmlformats.org/drawingml/2006/main" xmlns:r="http://schemas.openxmlformats.org/officeDocument/2006/relationships" xmlns:p="http://schemas.openxmlformats.org/presentationml/2006/main" saveSubsetFonts="1" autoCompressPictures="0">
+<p:presentation xmlns:a="http://schemas.openxmlformats.org/drawingml/2006/main" xmlns:p="http://schemas.openxmlformats.org/presentationml/2006/main" xmlns:r="http://schemas.openxmlformats.org/officeDocument/2006/relationships" autoCompressPictures="0" saveSubsetFonts="1">
   <p:sldMasterIdLst>
     <p:sldMasterId id="2147483648" r:id="rId1"/>
   </p:sldMasterIdLst>
   <p:notesMasterIdLst>
-    <p:NotesMasterId r:id="rId26"/>
+    <p:NotesMasterId r:id="rId27"/>
   </p:notesMasterIdLst>
   <p:sldIdLst>
     <p:sldId id="256" r:id="rId2"/>
@@ -32,6 +32,7 @@
     <p:sldId id="277" r:id="rId23"/>
     <p:sldId id="278" r:id="rId24"/>
     <p:sldId id="279" r:id="rId25"/>
+    <p:sldId id="280" r:id="rId26"/>
   </p:sldIdLst>
   <p:sldSz cx="9144000" cy="6858000" type="screen4x3"/>
   <p:notesSz cx="6858000" cy="9144000"/>
@@ -39,8 +40,8 @@
     <a:defPPr>
       <a:defRPr lang="en-US"/>
     </a:defPPr>
-    <a:lvl1pPr marL="0" algn="l" defTabSz="457200" rtl="0" eaLnBrk="1" latinLnBrk="0" hangingPunct="1">
-      <a:defRPr sz="1800" kern="1200">
+    <a:lvl1pPr algn="l" defTabSz="457200" eaLnBrk="1" hangingPunct="1" latinLnBrk="0" marL="0" rtl="0">
+      <a:defRPr kern="1200" sz="1800">
         <a:solidFill>
           <a:schemeClr val="tx1"/>
         </a:solidFill>
@@ -49,8 +50,8 @@
         <a:cs typeface="+mn-cs"/>
       </a:defRPr>
     </a:lvl1pPr>
-    <a:lvl2pPr marL="457200" algn="l" defTabSz="457200" rtl="0" eaLnBrk="1" latinLnBrk="0" hangingPunct="1">
-      <a:defRPr sz="1800" kern="1200">
+    <a:lvl2pPr algn="l" defTabSz="457200" eaLnBrk="1" hangingPunct="1" latinLnBrk="0" marL="457200" rtl="0">
+      <a:defRPr kern="1200" sz="1800">
         <a:solidFill>
           <a:schemeClr val="tx1"/>
         </a:solidFill>
@@ -59,8 +60,8 @@
         <a:cs typeface="+mn-cs"/>
       </a:defRPr>
     </a:lvl2pPr>
-    <a:lvl3pPr marL="914400" algn="l" defTabSz="457200" rtl="0" eaLnBrk="1" latinLnBrk="0" hangingPunct="1">
-      <a:defRPr sz="1800" kern="1200">
+    <a:lvl3pPr algn="l" defTabSz="457200" eaLnBrk="1" hangingPunct="1" latinLnBrk="0" marL="914400" rtl="0">
+      <a:defRPr kern="1200" sz="1800">
         <a:solidFill>
           <a:schemeClr val="tx1"/>
         </a:solidFill>
@@ -69,8 +70,8 @@
         <a:cs typeface="+mn-cs"/>
       </a:defRPr>
     </a:lvl3pPr>
-    <a:lvl4pPr marL="1371600" algn="l" defTabSz="457200" rtl="0" eaLnBrk="1" latinLnBrk="0" hangingPunct="1">
-      <a:defRPr sz="1800" kern="1200">
+    <a:lvl4pPr algn="l" defTabSz="457200" eaLnBrk="1" hangingPunct="1" latinLnBrk="0" marL="1371600" rtl="0">
+      <a:defRPr kern="1200" sz="1800">
         <a:solidFill>
           <a:schemeClr val="tx1"/>
         </a:solidFill>
@@ -79,8 +80,8 @@
         <a:cs typeface="+mn-cs"/>
       </a:defRPr>
     </a:lvl4pPr>
-    <a:lvl5pPr marL="1828800" algn="l" defTabSz="457200" rtl="0" eaLnBrk="1" latinLnBrk="0" hangingPunct="1">
-      <a:defRPr sz="1800" kern="1200">
+    <a:lvl5pPr algn="l" defTabSz="457200" eaLnBrk="1" hangingPunct="1" latinLnBrk="0" marL="1828800" rtl="0">
+      <a:defRPr kern="1200" sz="1800">
         <a:solidFill>
           <a:schemeClr val="tx1"/>
         </a:solidFill>
@@ -89,8 +90,8 @@
         <a:cs typeface="+mn-cs"/>
       </a:defRPr>
     </a:lvl5pPr>
-    <a:lvl6pPr marL="2286000" algn="l" defTabSz="457200" rtl="0" eaLnBrk="1" latinLnBrk="0" hangingPunct="1">
-      <a:defRPr sz="1800" kern="1200">
+    <a:lvl6pPr algn="l" defTabSz="457200" eaLnBrk="1" hangingPunct="1" latinLnBrk="0" marL="2286000" rtl="0">
+      <a:defRPr kern="1200" sz="1800">
         <a:solidFill>
           <a:schemeClr val="tx1"/>
         </a:solidFill>
@@ -99,8 +100,8 @@
         <a:cs typeface="+mn-cs"/>
       </a:defRPr>
     </a:lvl6pPr>
-    <a:lvl7pPr marL="2743200" algn="l" defTabSz="457200" rtl="0" eaLnBrk="1" latinLnBrk="0" hangingPunct="1">
-      <a:defRPr sz="1800" kern="1200">
+    <a:lvl7pPr algn="l" defTabSz="457200" eaLnBrk="1" hangingPunct="1" latinLnBrk="0" marL="2743200" rtl="0">
+      <a:defRPr kern="1200" sz="1800">
         <a:solidFill>
           <a:schemeClr val="tx1"/>
         </a:solidFill>
@@ -109,8 +110,8 @@
         <a:cs typeface="+mn-cs"/>
       </a:defRPr>
     </a:lvl7pPr>
-    <a:lvl8pPr marL="3200400" algn="l" defTabSz="457200" rtl="0" eaLnBrk="1" latinLnBrk="0" hangingPunct="1">
-      <a:defRPr sz="1800" kern="1200">
+    <a:lvl8pPr algn="l" defTabSz="457200" eaLnBrk="1" hangingPunct="1" latinLnBrk="0" marL="3200400" rtl="0">
+      <a:defRPr kern="1200" sz="1800">
         <a:solidFill>
           <a:schemeClr val="tx1"/>
         </a:solidFill>
@@ -119,8 +120,8 @@
         <a:cs typeface="+mn-cs"/>
       </a:defRPr>
     </a:lvl8pPr>
-    <a:lvl9pPr marL="3657600" algn="l" defTabSz="457200" rtl="0" eaLnBrk="1" latinLnBrk="0" hangingPunct="1">
-      <a:defRPr sz="1800" kern="1200">
+    <a:lvl9pPr algn="l" defTabSz="457200" eaLnBrk="1" hangingPunct="1" latinLnBrk="0" marL="3657600" rtl="0">
+      <a:defRPr kern="1200" sz="1800">
         <a:solidFill>
           <a:schemeClr val="tx1"/>
         </a:solidFill>
@@ -1229,7 +1230,7 @@
           <a:p>
             <a:fld id="{18BDFEC3-8487-43E8-A154-7C12CBC1FFF2}" type="slidenum">
               <a:rPr lang="en-US"/>
-              <a:t>12</a:t>
+              <a:t>13</a:t>
             </a:fld>
             <a:endParaRPr lang="en-US"/>
           </a:p>
@@ -3743,7 +3744,7 @@
           <a:p>
             <a:fld id="{18BDFEC3-8487-43E8-A154-7C12CBC1FFF2}" type="slidenum">
               <a:rPr lang="en-US"/>
-              <a:t>13</a:t>
+              <a:t>14</a:t>
             </a:fld>
             <a:endParaRPr lang="en-US"/>
           </a:p>
@@ -3985,7 +3986,7 @@
           <a:p>
             <a:fld id="{18BDFEC3-8487-43E8-A154-7C12CBC1FFF2}" type="slidenum">
               <a:rPr lang="en-US"/>
-              <a:t>14</a:t>
+              <a:t>15</a:t>
             </a:fld>
             <a:endParaRPr lang="en-US"/>
           </a:p>
@@ -4473,7 +4474,7 @@
           <a:p>
             <a:fld id="{18BDFEC3-8487-43E8-A154-7C12CBC1FFF2}" type="slidenum">
               <a:rPr lang="en-US"/>
-              <a:t>15</a:t>
+              <a:t>16</a:t>
             </a:fld>
             <a:endParaRPr lang="en-US"/>
           </a:p>
@@ -7229,7 +7230,7 @@
           <a:p>
             <a:fld id="{18BDFEC3-8487-43E8-A154-7C12CBC1FFF2}" type="slidenum">
               <a:rPr lang="en-US"/>
-              <a:t>17</a:t>
+              <a:t>18</a:t>
             </a:fld>
             <a:endParaRPr lang="en-US"/>
           </a:p>
@@ -10067,7 +10068,7 @@
           <a:p>
             <a:fld id="{18BDFEC3-8487-43E8-A154-7C12CBC1FFF2}" type="slidenum">
               <a:rPr lang="en-US"/>
-              <a:t>18</a:t>
+              <a:t>19</a:t>
             </a:fld>
             <a:endParaRPr lang="en-US"/>
           </a:p>
@@ -11765,7 +11766,7 @@
           <a:p>
             <a:fld id="{18BDFEC3-8487-43E8-A154-7C12CBC1FFF2}" type="slidenum">
               <a:rPr lang="en-US"/>
-              <a:t>19</a:t>
+              <a:t>20</a:t>
             </a:fld>
             <a:endParaRPr lang="en-US"/>
           </a:p>
@@ -13105,7 +13106,7 @@
           <a:p>
             <a:fld id="{18BDFEC3-8487-43E8-A154-7C12CBC1FFF2}" type="slidenum">
               <a:rPr lang="en-US"/>
-              <a:t>21</a:t>
+              <a:t>22</a:t>
             </a:fld>
             <a:endParaRPr lang="en-US"/>
           </a:p>
@@ -14845,7 +14846,7 @@
           <a:p>
             <a:fld id="{18BDFEC3-8487-43E8-A154-7C12CBC1FFF2}" type="slidenum">
               <a:rPr lang="en-US"/>
-              <a:t>23</a:t>
+              <a:t>24</a:t>
             </a:fld>
             <a:endParaRPr lang="en-US"/>
           </a:p>
@@ -15557,7 +15558,7 @@
           <a:p>
             <a:fld id="{18BDFEC3-8487-43E8-A154-7C12CBC1FFF2}" type="slidenum">
               <a:rPr lang="en-US"/>
-              <a:t>24</a:t>
+              <a:t>25</a:t>
             </a:fld>
             <a:endParaRPr lang="en-US"/>
           </a:p>
@@ -32533,7 +32534,7 @@
           <a:p>
             <a:fld id="{18BDFEC3-8487-43E8-A154-7C12CBC1FFF2}" type="slidenum">
               <a:rPr lang="en-US"/>
-              <a:t>11</a:t>
+              <a:t>12</a:t>
             </a:fld>
             <a:endParaRPr lang="en-US"/>
           </a:p>
@@ -35580,7 +35581,7 @@
             <a:spLocks noGrp="1"/>
           </p:cNvSpPr>
           <p:nvPr>
-            <p:ph type="subTitle" idx="1"/>
+            <p:ph idx="1" type="subTitle"/>
           </p:nvPr>
         </p:nvSpPr>
         <p:spPr>
@@ -35858,7 +35859,15 @@
             </a:pPr>
             <a:r>
               <a:rPr/>
-              <a:t>Summarizing</a:t>
+              <a:t>Break</a:t>
+            </a:r>
+            <a:r>
+              <a:rPr/>
+              <a:t> </a:t>
+            </a:r>
+            <a:r>
+              <a:rPr/>
+              <a:t>#2</a:t>
             </a:r>
           </a:p>
         </p:txBody>
@@ -35881,28 +35890,28 @@
             <a:pPr lvl="1"/>
             <a:r>
               <a:rPr/>
-              <a:t>No direct quotes.</a:t>
+              <a:t>What have you learned</a:t>
+            </a:r>
+          </a:p>
+          <a:p>
+            <a:pPr lvl="2"/>
+            <a:r>
+              <a:rPr/>
+              <a:t>Finding articles for your literature review</a:t>
             </a:r>
           </a:p>
           <a:p>
             <a:pPr lvl="1"/>
             <a:r>
               <a:rPr/>
-              <a:t>Contextual clues</a:t>
+              <a:t>What’s next</a:t>
             </a:r>
           </a:p>
           <a:p>
             <a:pPr lvl="2"/>
             <a:r>
               <a:rPr/>
-              <a:t>Also, in addition</a:t>
-            </a:r>
-          </a:p>
-          <a:p>
-            <a:pPr lvl="2"/>
-            <a:r>
-              <a:rPr/>
-              <a:t>In contrast, on the other hand</a:t>
+              <a:t>Summarizing and analyzing your papers</a:t>
             </a:r>
           </a:p>
         </p:txBody>
@@ -35949,31 +35958,7 @@
             </a:pPr>
             <a:r>
               <a:rPr/>
-              <a:t>Example</a:t>
-            </a:r>
-            <a:r>
-              <a:rPr/>
-              <a:t> </a:t>
-            </a:r>
-            <a:r>
-              <a:rPr/>
-              <a:t>of</a:t>
-            </a:r>
-            <a:r>
-              <a:rPr/>
-              <a:t> </a:t>
-            </a:r>
-            <a:r>
-              <a:rPr/>
-              <a:t>contextual</a:t>
-            </a:r>
-            <a:r>
-              <a:rPr/>
-              <a:t> </a:t>
-            </a:r>
-            <a:r>
-              <a:rPr/>
-              <a:t>words</a:t>
+              <a:t>Summarizing</a:t>
             </a:r>
           </a:p>
         </p:txBody>
@@ -35993,35 +35978,31 @@
           <a:bodyPr/>
           <a:lstStyle/>
           <a:p>
-            <a:pPr lvl="0" marL="0" indent="0">
-              <a:buNone/>
-            </a:pPr>
-            <a:r>
-              <a:rPr/>
-              <a:t>“Dosage compensation in mammalian females is a recognized phenomenon whereby inactivation of one X chromosome …[1]. </a:t>
-            </a:r>
-            <a:r>
-              <a:rPr b="1"/>
-              <a:t>However,</a:t>
-            </a:r>
-            <a:r>
-              <a:rPr/>
-              <a:t> not all X-linked genes are inactivated. Recently, an inactivation profile…was reported by Carrel and Willard [2]. … </a:t>
-            </a:r>
-            <a:r>
-              <a:rPr b="1"/>
-              <a:t>Subsequently</a:t>
-            </a:r>
-            <a:r>
-              <a:rPr/>
-              <a:t>, Lyon [3] … enhanced our knowledge about X-chromosome inactivation…”</a:t>
-            </a:r>
-          </a:p>
-          <a:p>
             <a:pPr lvl="1"/>
             <a:r>
               <a:rPr/>
-              <a:t>Talebizadeh et al. X chromosome gene expression in human tissues: Male and female comparisons. Genomics 2006.</a:t>
+              <a:t>No direct quotes.</a:t>
+            </a:r>
+          </a:p>
+          <a:p>
+            <a:pPr lvl="1"/>
+            <a:r>
+              <a:rPr/>
+              <a:t>Contextual clues</a:t>
+            </a:r>
+          </a:p>
+          <a:p>
+            <a:pPr lvl="2"/>
+            <a:r>
+              <a:rPr/>
+              <a:t>Also, in addition</a:t>
+            </a:r>
+          </a:p>
+          <a:p>
+            <a:pPr lvl="2"/>
+            <a:r>
+              <a:rPr/>
+              <a:t>In contrast, on the other hand</a:t>
             </a:r>
           </a:p>
         </p:txBody>
@@ -36068,7 +36049,31 @@
             </a:pPr>
             <a:r>
               <a:rPr/>
-              <a:t>Analyzing</a:t>
+              <a:t>Example</a:t>
+            </a:r>
+            <a:r>
+              <a:rPr/>
+              <a:t> </a:t>
+            </a:r>
+            <a:r>
+              <a:rPr/>
+              <a:t>of</a:t>
+            </a:r>
+            <a:r>
+              <a:rPr/>
+              <a:t> </a:t>
+            </a:r>
+            <a:r>
+              <a:rPr/>
+              <a:t>contextual</a:t>
+            </a:r>
+            <a:r>
+              <a:rPr/>
+              <a:t> </a:t>
+            </a:r>
+            <a:r>
+              <a:rPr/>
+              <a:t>words</a:t>
             </a:r>
           </a:p>
         </p:txBody>
@@ -36088,59 +36093,35 @@
           <a:bodyPr/>
           <a:lstStyle/>
           <a:p>
+            <a:pPr lvl="0" marL="0" indent="0">
+              <a:buNone/>
+            </a:pPr>
+            <a:r>
+              <a:rPr/>
+              <a:t>“Dosage compensation in mammalian females is a recognized phenomenon whereby inactivation of one X chromosome …[1]. </a:t>
+            </a:r>
+            <a:r>
+              <a:rPr b="1"/>
+              <a:t>However,</a:t>
+            </a:r>
+            <a:r>
+              <a:rPr/>
+              <a:t> not all X-linked genes are inactivated. Recently, an inactivation profile…was reported by Carrel and Willard [2]. … </a:t>
+            </a:r>
+            <a:r>
+              <a:rPr b="1"/>
+              <a:t>Subsequently</a:t>
+            </a:r>
+            <a:r>
+              <a:rPr/>
+              <a:t>, Lyon [3] … enhanced our knowledge about X-chromosome inactivation…”</a:t>
+            </a:r>
+          </a:p>
+          <a:p>
             <a:pPr lvl="1"/>
             <a:r>
               <a:rPr/>
-              <a:t>More than just the abstract</a:t>
-            </a:r>
-          </a:p>
-          <a:p>
-            <a:pPr lvl="2"/>
-            <a:r>
-              <a:rPr/>
-              <a:t>Inconsistencies with main text</a:t>
-            </a:r>
-          </a:p>
-          <a:p>
-            <a:pPr lvl="2"/>
-            <a:r>
-              <a:rPr/>
-              <a:t>Misplaced emphasis in abstract</a:t>
-            </a:r>
-          </a:p>
-          <a:p>
-            <a:pPr lvl="1"/>
-            <a:r>
-              <a:rPr/>
-              <a:t>Research types</a:t>
-            </a:r>
-          </a:p>
-          <a:p>
-            <a:pPr lvl="2"/>
-            <a:r>
-              <a:rPr/>
-              <a:t>Comparative</a:t>
-            </a:r>
-          </a:p>
-          <a:p>
-            <a:pPr lvl="2"/>
-            <a:r>
-              <a:rPr/>
-              <a:t>Associational</a:t>
-            </a:r>
-          </a:p>
-          <a:p>
-            <a:pPr lvl="2"/>
-            <a:r>
-              <a:rPr/>
-              <a:t>Descriptive (Estimate, Identify)</a:t>
-            </a:r>
-          </a:p>
-          <a:p>
-            <a:pPr lvl="1"/>
-            <a:r>
-              <a:rPr/>
-              <a:t>Put in some passion</a:t>
+              <a:t>Talebizadeh et al. X chromosome gene expression in human tissues: Male and female comparisons. Genomics 2006.</a:t>
             </a:r>
           </a:p>
         </p:txBody>
@@ -36187,47 +36168,7 @@
             </a:pPr>
             <a:r>
               <a:rPr/>
-              <a:t>Example</a:t>
-            </a:r>
-            <a:r>
-              <a:rPr/>
-              <a:t> </a:t>
-            </a:r>
-            <a:r>
-              <a:rPr/>
-              <a:t>of</a:t>
-            </a:r>
-            <a:r>
-              <a:rPr/>
-              <a:t> </a:t>
-            </a:r>
-            <a:r>
-              <a:rPr/>
-              <a:t>descriptive</a:t>
-            </a:r>
-            <a:r>
-              <a:rPr/>
-              <a:t> </a:t>
-            </a:r>
-            <a:r>
-              <a:rPr/>
-              <a:t>and</a:t>
-            </a:r>
-            <a:r>
-              <a:rPr/>
-              <a:t> </a:t>
-            </a:r>
-            <a:r>
-              <a:rPr/>
-              <a:t>comparative</a:t>
-            </a:r>
-            <a:r>
-              <a:rPr/>
-              <a:t> </a:t>
-            </a:r>
-            <a:r>
-              <a:rPr/>
-              <a:t>analysis</a:t>
+              <a:t>Analyzing</a:t>
             </a:r>
           </a:p>
         </p:txBody>
@@ -36247,19 +36188,59 @@
           <a:bodyPr/>
           <a:lstStyle/>
           <a:p>
-            <a:pPr lvl="0" marL="0" indent="0">
-              <a:buNone/>
-            </a:pPr>
-            <a:r>
-              <a:rPr/>
-              <a:t>“African Americans represent nearly 45% of new HIV cases each year (1–2). Due to delayed HIV diagnosis, African Americans tend to enter HIV treatment at advanced stages and die from AIDS sooner than Whites (1).”</a:t>
-            </a:r>
-          </a:p>
-          <a:p>
             <a:pPr lvl="1"/>
             <a:r>
               <a:rPr/>
-              <a:t>Berkley-Patton et al. An HIV Testing Intervention in African American Churches: Pilot Study Findings. Ann Behav Med. 2016.</a:t>
+              <a:t>More than just the abstract</a:t>
+            </a:r>
+          </a:p>
+          <a:p>
+            <a:pPr lvl="2"/>
+            <a:r>
+              <a:rPr/>
+              <a:t>Inconsistencies with main text</a:t>
+            </a:r>
+          </a:p>
+          <a:p>
+            <a:pPr lvl="2"/>
+            <a:r>
+              <a:rPr/>
+              <a:t>Misplaced emphasis in abstract</a:t>
+            </a:r>
+          </a:p>
+          <a:p>
+            <a:pPr lvl="1"/>
+            <a:r>
+              <a:rPr/>
+              <a:t>Research types</a:t>
+            </a:r>
+          </a:p>
+          <a:p>
+            <a:pPr lvl="2"/>
+            <a:r>
+              <a:rPr/>
+              <a:t>Comparative</a:t>
+            </a:r>
+          </a:p>
+          <a:p>
+            <a:pPr lvl="2"/>
+            <a:r>
+              <a:rPr/>
+              <a:t>Associational</a:t>
+            </a:r>
+          </a:p>
+          <a:p>
+            <a:pPr lvl="2"/>
+            <a:r>
+              <a:rPr/>
+              <a:t>Descriptive (Estimate, Identify)</a:t>
+            </a:r>
+          </a:p>
+          <a:p>
+            <a:pPr lvl="1"/>
+            <a:r>
+              <a:rPr/>
+              <a:t>Put in some passion</a:t>
             </a:r>
           </a:p>
         </p:txBody>
@@ -36330,6 +36311,22 @@
             </a:r>
             <a:r>
               <a:rPr/>
+              <a:t>and</a:t>
+            </a:r>
+            <a:r>
+              <a:rPr/>
+              <a:t> </a:t>
+            </a:r>
+            <a:r>
+              <a:rPr/>
+              <a:t>comparative</a:t>
+            </a:r>
+            <a:r>
+              <a:rPr/>
+              <a:t> </a:t>
+            </a:r>
+            <a:r>
+              <a:rPr/>
               <a:t>analysis</a:t>
             </a:r>
           </a:p>
@@ -36355,14 +36352,14 @@
             </a:pPr>
             <a:r>
               <a:rPr/>
-              <a:t>“Studies suggest many African American faith leaders are willing to provide HIV education …(14–17); however, their reported challenges in doing so have included church capacity issues (e.g., lack of HIV training, church-appropriate HIV materials, time, and resources), controversial church issues (e.g., condom use, premarital sex, homophobia), and HIV stigma (18–22).”</a:t>
+              <a:t>“African Americans represent nearly 45% of new HIV cases each year (1–2). Due to delayed HIV diagnosis, African Americans tend to enter HIV treatment at advanced stages and die from AIDS sooner than Whites (1).”</a:t>
             </a:r>
           </a:p>
           <a:p>
             <a:pPr lvl="1"/>
             <a:r>
               <a:rPr/>
-              <a:t>Berkley-Patton et al 2016.</a:t>
+              <a:t>Berkley-Patton et al. An HIV Testing Intervention in African American Churches: Pilot Study Findings. Ann Behav Med. 2016.</a:t>
             </a:r>
           </a:p>
         </p:txBody>
@@ -36409,15 +36406,31 @@
             </a:pPr>
             <a:r>
               <a:rPr/>
-              <a:t>Break</a:t>
-            </a:r>
-            <a:r>
-              <a:rPr/>
-              <a:t> </a:t>
-            </a:r>
-            <a:r>
-              <a:rPr/>
-              <a:t>#2</a:t>
+              <a:t>Example</a:t>
+            </a:r>
+            <a:r>
+              <a:rPr/>
+              <a:t> </a:t>
+            </a:r>
+            <a:r>
+              <a:rPr/>
+              <a:t>of</a:t>
+            </a:r>
+            <a:r>
+              <a:rPr/>
+              <a:t> </a:t>
+            </a:r>
+            <a:r>
+              <a:rPr/>
+              <a:t>descriptive</a:t>
+            </a:r>
+            <a:r>
+              <a:rPr/>
+              <a:t> </a:t>
+            </a:r>
+            <a:r>
+              <a:rPr/>
+              <a:t>analysis</a:t>
             </a:r>
           </a:p>
         </p:txBody>
@@ -36437,31 +36450,19 @@
           <a:bodyPr/>
           <a:lstStyle/>
           <a:p>
+            <a:pPr lvl="0" marL="0" indent="0">
+              <a:buNone/>
+            </a:pPr>
+            <a:r>
+              <a:rPr/>
+              <a:t>“Studies suggest many African American faith leaders are willing to provide HIV education …(14–17); however, their reported challenges in doing so have included church capacity issues (e.g., lack of HIV training, church-appropriate HIV materials, time, and resources), controversial church issues (e.g., condom use, premarital sex, homophobia), and HIV stigma (18–22).”</a:t>
+            </a:r>
+          </a:p>
+          <a:p>
             <a:pPr lvl="1"/>
             <a:r>
               <a:rPr/>
-              <a:t>What have you learned?</a:t>
-            </a:r>
-          </a:p>
-          <a:p>
-            <a:pPr lvl="2"/>
-            <a:r>
-              <a:rPr/>
-              <a:t>Organizing your literature review</a:t>
-            </a:r>
-          </a:p>
-          <a:p>
-            <a:pPr lvl="1"/>
-            <a:r>
-              <a:rPr/>
-              <a:t>What’s next</a:t>
-            </a:r>
-          </a:p>
-          <a:p>
-            <a:pPr lvl="2"/>
-            <a:r>
-              <a:rPr/>
-              <a:t>Evaluating individual articles</a:t>
+              <a:t>Berkley-Patton et al 2016.</a:t>
             </a:r>
           </a:p>
         </p:txBody>
@@ -36508,7 +36509,15 @@
             </a:pPr>
             <a:r>
               <a:rPr/>
-              <a:t>Evaluating</a:t>
+              <a:t>Break</a:t>
+            </a:r>
+            <a:r>
+              <a:rPr/>
+              <a:t> </a:t>
+            </a:r>
+            <a:r>
+              <a:rPr/>
+              <a:t>#3</a:t>
             </a:r>
           </a:p>
         </p:txBody>
@@ -36531,49 +36540,28 @@
             <a:pPr lvl="1"/>
             <a:r>
               <a:rPr/>
-              <a:t>No “bad” or “good” studies</a:t>
+              <a:t>What have you learned?</a:t>
             </a:r>
           </a:p>
           <a:p>
             <a:pPr lvl="2"/>
             <a:r>
               <a:rPr/>
-              <a:t>Degrees of evidence</a:t>
+              <a:t>Summarizing and analyzing your papers</a:t>
+            </a:r>
+          </a:p>
+          <a:p>
+            <a:pPr lvl="1"/>
+            <a:r>
+              <a:rPr/>
+              <a:t>What’s next</a:t>
             </a:r>
           </a:p>
           <a:p>
             <a:pPr lvl="2"/>
             <a:r>
               <a:rPr/>
-              <a:t>Weak studies better than no studies</a:t>
-            </a:r>
-          </a:p>
-          <a:p>
-            <a:pPr lvl="1"/>
-            <a:r>
-              <a:rPr/>
-              <a:t>Questions you can ask</a:t>
-            </a:r>
-          </a:p>
-          <a:p>
-            <a:pPr lvl="2"/>
-            <a:r>
-              <a:rPr/>
-              <a:t>Do the results support the conclusion?</a:t>
-            </a:r>
-          </a:p>
-          <a:p>
-            <a:pPr lvl="2"/>
-            <a:r>
-              <a:rPr/>
-              <a:t>What are the stated limitations?</a:t>
-            </a:r>
-          </a:p>
-          <a:p>
-            <a:pPr lvl="2"/>
-            <a:r>
-              <a:rPr/>
-              <a:t>Can you place this article in “the bigger picture”?</a:t>
+              <a:t>Evaluating individual articles</a:t>
             </a:r>
           </a:p>
         </p:txBody>
@@ -36643,35 +36631,49 @@
             <a:pPr lvl="1"/>
             <a:r>
               <a:rPr/>
-              <a:t>Positive features</a:t>
+              <a:t>No “bad” or “good” studies</a:t>
             </a:r>
           </a:p>
           <a:p>
             <a:pPr lvl="2"/>
             <a:r>
               <a:rPr/>
-              <a:t>Randomization</a:t>
+              <a:t>Degrees of evidence</a:t>
             </a:r>
           </a:p>
           <a:p>
             <a:pPr lvl="2"/>
             <a:r>
               <a:rPr/>
-              <a:t>Blinding</a:t>
+              <a:t>Weak studies better than no studies</a:t>
+            </a:r>
+          </a:p>
+          <a:p>
+            <a:pPr lvl="1"/>
+            <a:r>
+              <a:rPr/>
+              <a:t>Questions you can ask</a:t>
             </a:r>
           </a:p>
           <a:p>
             <a:pPr lvl="2"/>
             <a:r>
               <a:rPr/>
-              <a:t>Strong effect</a:t>
+              <a:t>Do the results support the conclusion?</a:t>
             </a:r>
           </a:p>
           <a:p>
             <a:pPr lvl="2"/>
             <a:r>
               <a:rPr/>
-              <a:t>Plausible mechanism</a:t>
+              <a:t>What are the stated limitations?</a:t>
+            </a:r>
+          </a:p>
+          <a:p>
+            <a:pPr lvl="2"/>
+            <a:r>
+              <a:rPr/>
+              <a:t>Can you place this article in “the bigger picture”?</a:t>
             </a:r>
           </a:p>
         </p:txBody>
@@ -36741,49 +36743,35 @@
             <a:pPr lvl="1"/>
             <a:r>
               <a:rPr/>
-              <a:t>Negative features</a:t>
+              <a:t>Positive features</a:t>
             </a:r>
           </a:p>
           <a:p>
             <a:pPr lvl="2"/>
             <a:r>
               <a:rPr/>
-              <a:t>Post hoc changes</a:t>
+              <a:t>Randomization</a:t>
             </a:r>
           </a:p>
           <a:p>
             <a:pPr lvl="2"/>
             <a:r>
               <a:rPr/>
-              <a:t>High dropout rate</a:t>
+              <a:t>Blinding</a:t>
             </a:r>
           </a:p>
           <a:p>
             <a:pPr lvl="2"/>
             <a:r>
               <a:rPr/>
-              <a:t>Poor compliance</a:t>
-            </a:r>
-          </a:p>
-          <a:p>
-            <a:pPr lvl="1"/>
-            <a:r>
-              <a:rPr/>
-              <a:t>Things not to fuss over</a:t>
+              <a:t>Strong effect</a:t>
             </a:r>
           </a:p>
           <a:p>
             <a:pPr lvl="2"/>
             <a:r>
               <a:rPr/>
-              <a:t>Quality of the journal</a:t>
-            </a:r>
-          </a:p>
-          <a:p>
-            <a:pPr lvl="2"/>
-            <a:r>
-              <a:rPr/>
-              <a:t>Intention to treat analysis</a:t>
+              <a:t>Plausible mechanism</a:t>
             </a:r>
           </a:p>
         </p:txBody>
@@ -36919,15 +36907,7 @@
             </a:pPr>
             <a:r>
               <a:rPr/>
-              <a:t>Break</a:t>
-            </a:r>
-            <a:r>
-              <a:rPr/>
-              <a:t> </a:t>
-            </a:r>
-            <a:r>
-              <a:rPr/>
-              <a:t>#3</a:t>
+              <a:t>Evaluating</a:t>
             </a:r>
           </a:p>
         </p:txBody>
@@ -36950,28 +36930,49 @@
             <a:pPr lvl="1"/>
             <a:r>
               <a:rPr/>
-              <a:t>What have you learned?</a:t>
+              <a:t>Negative features</a:t>
             </a:r>
           </a:p>
           <a:p>
             <a:pPr lvl="2"/>
             <a:r>
               <a:rPr/>
-              <a:t>Evaluating individual articles</a:t>
+              <a:t>Post hoc changes</a:t>
+            </a:r>
+          </a:p>
+          <a:p>
+            <a:pPr lvl="2"/>
+            <a:r>
+              <a:rPr/>
+              <a:t>High dropout rate</a:t>
+            </a:r>
+          </a:p>
+          <a:p>
+            <a:pPr lvl="2"/>
+            <a:r>
+              <a:rPr/>
+              <a:t>Poor compliance</a:t>
             </a:r>
           </a:p>
           <a:p>
             <a:pPr lvl="1"/>
             <a:r>
               <a:rPr/>
-              <a:t>What’s next</a:t>
+              <a:t>Things not to fuss over</a:t>
             </a:r>
           </a:p>
           <a:p>
             <a:pPr lvl="2"/>
             <a:r>
               <a:rPr/>
-              <a:t>An organizing structure to your literature review</a:t>
+              <a:t>Quality of the journal</a:t>
+            </a:r>
+          </a:p>
+          <a:p>
+            <a:pPr lvl="2"/>
+            <a:r>
+              <a:rPr/>
+              <a:t>Intention to treat analysis</a:t>
             </a:r>
           </a:p>
         </p:txBody>
@@ -37018,7 +37019,15 @@
             </a:pPr>
             <a:r>
               <a:rPr/>
-              <a:t>Synthesizing</a:t>
+              <a:t>Break</a:t>
+            </a:r>
+            <a:r>
+              <a:rPr/>
+              <a:t> </a:t>
+            </a:r>
+            <a:r>
+              <a:rPr/>
+              <a:t>#4</a:t>
             </a:r>
           </a:p>
         </p:txBody>
@@ -37041,35 +37050,28 @@
             <a:pPr lvl="1"/>
             <a:r>
               <a:rPr/>
-              <a:t>Organization of a literature review</a:t>
+              <a:t>What have you learned?</a:t>
             </a:r>
           </a:p>
           <a:p>
             <a:pPr lvl="2"/>
             <a:r>
               <a:rPr/>
-              <a:t>Chronologic (warning: can be boring!)</a:t>
+              <a:t>Evaluating individual articles</a:t>
+            </a:r>
+          </a:p>
+          <a:p>
+            <a:pPr lvl="1"/>
+            <a:r>
+              <a:rPr/>
+              <a:t>What’s next</a:t>
             </a:r>
           </a:p>
           <a:p>
             <a:pPr lvl="2"/>
             <a:r>
               <a:rPr/>
-              <a:t>From general to specific</a:t>
-            </a:r>
-          </a:p>
-          <a:p>
-            <a:pPr lvl="2"/>
-            <a:r>
-              <a:rPr/>
-              <a:t>Thematic</a:t>
-            </a:r>
-          </a:p>
-          <a:p>
-            <a:pPr lvl="1"/>
-            <a:r>
-              <a:rPr/>
-              <a:t>End with your research</a:t>
+              <a:t>An organizing structure to your literature review</a:t>
             </a:r>
           </a:p>
         </p:txBody>
@@ -37116,39 +37118,7 @@
             </a:pPr>
             <a:r>
               <a:rPr/>
-              <a:t>Example</a:t>
-            </a:r>
-            <a:r>
-              <a:rPr/>
-              <a:t> </a:t>
-            </a:r>
-            <a:r>
-              <a:rPr/>
-              <a:t>of</a:t>
-            </a:r>
-            <a:r>
-              <a:rPr/>
-              <a:t> </a:t>
-            </a:r>
-            <a:r>
-              <a:rPr/>
-              <a:t>general</a:t>
-            </a:r>
-            <a:r>
-              <a:rPr/>
-              <a:t> </a:t>
-            </a:r>
-            <a:r>
-              <a:rPr/>
-              <a:t>to</a:t>
-            </a:r>
-            <a:r>
-              <a:rPr/>
-              <a:t> </a:t>
-            </a:r>
-            <a:r>
-              <a:rPr/>
-              <a:t>specific</a:t>
+              <a:t>Synthesizing</a:t>
             </a:r>
           </a:p>
         </p:txBody>
@@ -37168,37 +37138,38 @@
           <a:bodyPr/>
           <a:lstStyle/>
           <a:p>
-            <a:pPr lvl="0" marL="0" indent="0">
-              <a:buNone/>
-            </a:pPr>
-            <a:r>
-              <a:rPr/>
-              <a:t>1st paragraph. “African Americans represent nearly 45% of new HIV cases each year (1–2).”</a:t>
-            </a:r>
-          </a:p>
-          <a:p>
-            <a:pPr lvl="0" marL="0" indent="0">
-              <a:buNone/>
-            </a:pPr>
-            <a:r>
-              <a:rPr/>
-              <a:t>2nd paragraph. “The Black Church is a powerful institution with a history of mobilizing African American communities for social change (5)…”</a:t>
-            </a:r>
-          </a:p>
-          <a:p>
-            <a:pPr lvl="0" marL="0" indent="0">
-              <a:buNone/>
-            </a:pPr>
-            <a:r>
-              <a:rPr/>
-              <a:t>3rd paragraph. “Studies suggest many African American faith leaders are willing to provide HIV education and testing for their church/community members (14–17)…”</a:t>
-            </a:r>
-          </a:p>
-          <a:p>
             <a:pPr lvl="1"/>
             <a:r>
               <a:rPr/>
-              <a:t>Berkley-Patton et al 2016.</a:t>
+              <a:t>Organization of a literature review</a:t>
+            </a:r>
+          </a:p>
+          <a:p>
+            <a:pPr lvl="2"/>
+            <a:r>
+              <a:rPr/>
+              <a:t>Chronologic (warning: can be boring!)</a:t>
+            </a:r>
+          </a:p>
+          <a:p>
+            <a:pPr lvl="2"/>
+            <a:r>
+              <a:rPr/>
+              <a:t>From general to specific</a:t>
+            </a:r>
+          </a:p>
+          <a:p>
+            <a:pPr lvl="2"/>
+            <a:r>
+              <a:rPr/>
+              <a:t>Thematic</a:t>
+            </a:r>
+          </a:p>
+          <a:p>
+            <a:pPr lvl="1"/>
+            <a:r>
+              <a:rPr/>
+              <a:t>End with your research</a:t>
             </a:r>
           </a:p>
         </p:txBody>
@@ -37245,7 +37216,39 @@
             </a:pPr>
             <a:r>
               <a:rPr/>
-              <a:t>Synthesizing</a:t>
+              <a:t>Example</a:t>
+            </a:r>
+            <a:r>
+              <a:rPr/>
+              <a:t> </a:t>
+            </a:r>
+            <a:r>
+              <a:rPr/>
+              <a:t>of</a:t>
+            </a:r>
+            <a:r>
+              <a:rPr/>
+              <a:t> </a:t>
+            </a:r>
+            <a:r>
+              <a:rPr/>
+              <a:t>general</a:t>
+            </a:r>
+            <a:r>
+              <a:rPr/>
+              <a:t> </a:t>
+            </a:r>
+            <a:r>
+              <a:rPr/>
+              <a:t>to</a:t>
+            </a:r>
+            <a:r>
+              <a:rPr/>
+              <a:t> </a:t>
+            </a:r>
+            <a:r>
+              <a:rPr/>
+              <a:t>specific</a:t>
             </a:r>
           </a:p>
         </p:txBody>
@@ -37265,52 +37268,37 @@
           <a:bodyPr/>
           <a:lstStyle/>
           <a:p>
+            <a:pPr lvl="0" marL="0" indent="0">
+              <a:buNone/>
+            </a:pPr>
+            <a:r>
+              <a:rPr/>
+              <a:t>1st paragraph. “African Americans represent nearly 45% of new HIV cases each year (1–2).”</a:t>
+            </a:r>
+          </a:p>
+          <a:p>
+            <a:pPr lvl="0" marL="0" indent="0">
+              <a:buNone/>
+            </a:pPr>
+            <a:r>
+              <a:rPr/>
+              <a:t>2nd paragraph. “The Black Church is a powerful institution with a history of mobilizing African American communities for social change (5)…”</a:t>
+            </a:r>
+          </a:p>
+          <a:p>
+            <a:pPr lvl="0" marL="0" indent="0">
+              <a:buNone/>
+            </a:pPr>
+            <a:r>
+              <a:rPr/>
+              <a:t>3rd paragraph. “Studies suggest many African American faith leaders are willing to provide HIV education and testing for their church/community members (14–17)…”</a:t>
+            </a:r>
+          </a:p>
+          <a:p>
             <a:pPr lvl="1"/>
             <a:r>
               <a:rPr/>
-              <a:t>Possible themes</a:t>
-            </a:r>
-          </a:p>
-          <a:p>
-            <a:pPr lvl="2"/>
-            <a:r>
-              <a:rPr/>
-              <a:t>Consensus, disagreements, the unknown</a:t>
-            </a:r>
-          </a:p>
-          <a:p>
-            <a:pPr lvl="2"/>
-            <a:r>
-              <a:rPr/>
-              <a:t>Problem, old remedies, new needs</a:t>
-            </a:r>
-          </a:p>
-          <a:p>
-            <a:pPr lvl="2"/>
-            <a:r>
-              <a:rPr/>
-              <a:t>Supportive, then non-supportive</a:t>
-            </a:r>
-          </a:p>
-          <a:p>
-            <a:pPr lvl="2"/>
-            <a:r>
-              <a:rPr/>
-              <a:t>Methodologies</a:t>
-            </a:r>
-          </a:p>
-          <a:p>
-            <a:pPr lvl="2"/>
-            <a:r>
-              <a:rPr/>
-              <a:t>Theories</a:t>
-            </a:r>
-          </a:p>
-          <a:p>
-            <a:pPr lvl="2"/>
-            <a:r>
-              <a:rPr/>
-              <a:t>Schools of thought</a:t>
+              <a:t>Berkley-Patton et al 2016.</a:t>
             </a:r>
           </a:p>
         </p:txBody>
@@ -37321,6 +37309,118 @@
 </file>
 
 <file path=ppt/slides/slide24.xml><?xml version="1.0" encoding="utf-8"?>
+<p:sld xmlns:a="http://schemas.openxmlformats.org/drawingml/2006/main" xmlns:r="http://schemas.openxmlformats.org/officeDocument/2006/relationships" xmlns:p="http://schemas.openxmlformats.org/presentationml/2006/main">
+  <p:cSld>
+    <p:spTree>
+      <p:nvGrpSpPr>
+        <p:cNvPr id="1" name=""/>
+        <p:cNvGrpSpPr/>
+        <p:nvPr/>
+      </p:nvGrpSpPr>
+      <p:grpSpPr>
+        <a:xfrm>
+          <a:off x="0" y="0"/>
+          <a:ext cx="0" cy="0"/>
+          <a:chOff x="0" y="0"/>
+          <a:chExt cx="0" cy="0"/>
+        </a:xfrm>
+      </p:grpSpPr>
+      <p:sp>
+        <p:nvSpPr>
+          <p:cNvPr id="2" name="Title 1"/>
+          <p:cNvSpPr>
+            <a:spLocks noGrp="1"/>
+          </p:cNvSpPr>
+          <p:nvPr>
+            <p:ph type="title"/>
+          </p:nvPr>
+        </p:nvSpPr>
+        <p:spPr/>
+        <p:txBody>
+          <a:bodyPr/>
+          <a:lstStyle/>
+          <a:p>
+            <a:pPr lvl="0" marL="0" indent="0">
+              <a:buNone/>
+            </a:pPr>
+            <a:r>
+              <a:rPr/>
+              <a:t>Synthesizing</a:t>
+            </a:r>
+          </a:p>
+        </p:txBody>
+      </p:sp>
+      <p:sp>
+        <p:nvSpPr>
+          <p:cNvPr id="3" name="Content Placeholder 2"/>
+          <p:cNvSpPr>
+            <a:spLocks noGrp="1"/>
+          </p:cNvSpPr>
+          <p:nvPr>
+            <p:ph idx="1"/>
+          </p:nvPr>
+        </p:nvSpPr>
+        <p:spPr/>
+        <p:txBody>
+          <a:bodyPr/>
+          <a:lstStyle/>
+          <a:p>
+            <a:pPr lvl="1"/>
+            <a:r>
+              <a:rPr/>
+              <a:t>Possible themes</a:t>
+            </a:r>
+          </a:p>
+          <a:p>
+            <a:pPr lvl="2"/>
+            <a:r>
+              <a:rPr/>
+              <a:t>Consensus, disagreements, the unknown</a:t>
+            </a:r>
+          </a:p>
+          <a:p>
+            <a:pPr lvl="2"/>
+            <a:r>
+              <a:rPr/>
+              <a:t>Problem, old remedies, new needs</a:t>
+            </a:r>
+          </a:p>
+          <a:p>
+            <a:pPr lvl="2"/>
+            <a:r>
+              <a:rPr/>
+              <a:t>Supportive, then non-supportive</a:t>
+            </a:r>
+          </a:p>
+          <a:p>
+            <a:pPr lvl="2"/>
+            <a:r>
+              <a:rPr/>
+              <a:t>Methodologies</a:t>
+            </a:r>
+          </a:p>
+          <a:p>
+            <a:pPr lvl="2"/>
+            <a:r>
+              <a:rPr/>
+              <a:t>Theories</a:t>
+            </a:r>
+          </a:p>
+          <a:p>
+            <a:pPr lvl="2"/>
+            <a:r>
+              <a:rPr/>
+              <a:t>Schools of thought</a:t>
+            </a:r>
+          </a:p>
+        </p:txBody>
+      </p:sp>
+    </p:spTree>
+  </p:cSld>
+</p:sld>
+</file>
+
+<file path=ppt/slides/slide25.xml><?xml version="1.0" encoding="utf-8"?>
 <p:sld xmlns:a="http://schemas.openxmlformats.org/drawingml/2006/main" xmlns:r="http://schemas.openxmlformats.org/officeDocument/2006/relationships" xmlns:p="http://schemas.openxmlformats.org/presentationml/2006/main">
   <p:cSld>
     <p:spTree>

</xml_diff>